<commit_message>
improved model dream recall
</commit_message>
<xml_diff>
--- a/Fig/Discussion/schema_dream_recall.pptx
+++ b/Fig/Discussion/schema_dream_recall.pptx
@@ -6,11 +6,10 @@
   </p:sldMasterIdLst>
   <p:sldIdLst>
     <p:sldId id="261" r:id="rId2"/>
-    <p:sldId id="262" r:id="rId3"/>
-    <p:sldId id="260" r:id="rId4"/>
+    <p:sldId id="263" r:id="rId3"/>
+    <p:sldId id="262" r:id="rId4"/>
     <p:sldId id="256" r:id="rId5"/>
-    <p:sldId id="257" r:id="rId6"/>
-    <p:sldId id="258" r:id="rId7"/>
+    <p:sldId id="258" r:id="rId6"/>
   </p:sldIdLst>
   <p:sldSz cx="14400213" cy="6858000"/>
   <p:notesSz cx="6858000" cy="9144000"/>
@@ -117,7 +116,22 @@
             <a:srgbClr val="A4A3A4"/>
           </p15:clr>
         </p15:guide>
-        <p15:guide id="2" pos="1905" userDrawn="1">
+        <p15:guide id="2" pos="2517" userDrawn="1">
+          <p15:clr>
+            <a:srgbClr val="A4A3A4"/>
+          </p15:clr>
+        </p15:guide>
+        <p15:guide id="3" orient="horz" pos="2387" userDrawn="1">
+          <p15:clr>
+            <a:srgbClr val="A4A3A4"/>
+          </p15:clr>
+        </p15:guide>
+        <p15:guide id="4" pos="6713" userDrawn="1">
+          <p15:clr>
+            <a:srgbClr val="A4A3A4"/>
+          </p15:clr>
+        </p15:guide>
+        <p15:guide id="5" pos="2744" userDrawn="1">
           <p15:clr>
             <a:srgbClr val="A4A3A4"/>
           </p15:clr>
@@ -259,7 +273,7 @@
           <a:p>
             <a:fld id="{39F55FEC-1300-4CA0-95F5-21250F10457E}" type="datetimeFigureOut">
               <a:rPr lang="en-US" smtClean="0"/>
-              <a:t>10/23/2017</a:t>
+              <a:t>10/24/2017</a:t>
             </a:fld>
             <a:endParaRPr lang="en-US"/>
           </a:p>
@@ -429,7 +443,7 @@
           <a:p>
             <a:fld id="{39F55FEC-1300-4CA0-95F5-21250F10457E}" type="datetimeFigureOut">
               <a:rPr lang="en-US" smtClean="0"/>
-              <a:t>10/23/2017</a:t>
+              <a:t>10/24/2017</a:t>
             </a:fld>
             <a:endParaRPr lang="en-US"/>
           </a:p>
@@ -609,7 +623,7 @@
           <a:p>
             <a:fld id="{39F55FEC-1300-4CA0-95F5-21250F10457E}" type="datetimeFigureOut">
               <a:rPr lang="en-US" smtClean="0"/>
-              <a:t>10/23/2017</a:t>
+              <a:t>10/24/2017</a:t>
             </a:fld>
             <a:endParaRPr lang="en-US"/>
           </a:p>
@@ -779,7 +793,7 @@
           <a:p>
             <a:fld id="{39F55FEC-1300-4CA0-95F5-21250F10457E}" type="datetimeFigureOut">
               <a:rPr lang="en-US" smtClean="0"/>
-              <a:t>10/23/2017</a:t>
+              <a:t>10/24/2017</a:t>
             </a:fld>
             <a:endParaRPr lang="en-US"/>
           </a:p>
@@ -1025,7 +1039,7 @@
           <a:p>
             <a:fld id="{39F55FEC-1300-4CA0-95F5-21250F10457E}" type="datetimeFigureOut">
               <a:rPr lang="en-US" smtClean="0"/>
-              <a:t>10/23/2017</a:t>
+              <a:t>10/24/2017</a:t>
             </a:fld>
             <a:endParaRPr lang="en-US"/>
           </a:p>
@@ -1257,7 +1271,7 @@
           <a:p>
             <a:fld id="{39F55FEC-1300-4CA0-95F5-21250F10457E}" type="datetimeFigureOut">
               <a:rPr lang="en-US" smtClean="0"/>
-              <a:t>10/23/2017</a:t>
+              <a:t>10/24/2017</a:t>
             </a:fld>
             <a:endParaRPr lang="en-US"/>
           </a:p>
@@ -1624,7 +1638,7 @@
           <a:p>
             <a:fld id="{39F55FEC-1300-4CA0-95F5-21250F10457E}" type="datetimeFigureOut">
               <a:rPr lang="en-US" smtClean="0"/>
-              <a:t>10/23/2017</a:t>
+              <a:t>10/24/2017</a:t>
             </a:fld>
             <a:endParaRPr lang="en-US"/>
           </a:p>
@@ -1742,7 +1756,7 @@
           <a:p>
             <a:fld id="{39F55FEC-1300-4CA0-95F5-21250F10457E}" type="datetimeFigureOut">
               <a:rPr lang="en-US" smtClean="0"/>
-              <a:t>10/23/2017</a:t>
+              <a:t>10/24/2017</a:t>
             </a:fld>
             <a:endParaRPr lang="en-US"/>
           </a:p>
@@ -1837,7 +1851,7 @@
           <a:p>
             <a:fld id="{39F55FEC-1300-4CA0-95F5-21250F10457E}" type="datetimeFigureOut">
               <a:rPr lang="en-US" smtClean="0"/>
-              <a:t>10/23/2017</a:t>
+              <a:t>10/24/2017</a:t>
             </a:fld>
             <a:endParaRPr lang="en-US"/>
           </a:p>
@@ -2114,7 +2128,7 @@
           <a:p>
             <a:fld id="{39F55FEC-1300-4CA0-95F5-21250F10457E}" type="datetimeFigureOut">
               <a:rPr lang="en-US" smtClean="0"/>
-              <a:t>10/23/2017</a:t>
+              <a:t>10/24/2017</a:t>
             </a:fld>
             <a:endParaRPr lang="en-US"/>
           </a:p>
@@ -2371,7 +2385,7 @@
           <a:p>
             <a:fld id="{39F55FEC-1300-4CA0-95F5-21250F10457E}" type="datetimeFigureOut">
               <a:rPr lang="en-US" smtClean="0"/>
-              <a:t>10/23/2017</a:t>
+              <a:t>10/24/2017</a:t>
             </a:fld>
             <a:endParaRPr lang="en-US"/>
           </a:p>
@@ -2584,7 +2598,7 @@
           <a:p>
             <a:fld id="{39F55FEC-1300-4CA0-95F5-21250F10457E}" type="datetimeFigureOut">
               <a:rPr lang="en-US" smtClean="0"/>
-              <a:t>10/23/2017</a:t>
+              <a:t>10/24/2017</a:t>
             </a:fld>
             <a:endParaRPr lang="en-US"/>
           </a:p>
@@ -2997,7 +3011,7 @@
         </p:nvSpPr>
         <p:spPr>
           <a:xfrm>
-            <a:off x="4436668" y="2709936"/>
+            <a:off x="4436668" y="3353029"/>
             <a:ext cx="1440000" cy="872358"/>
           </a:xfrm>
           <a:prstGeom prst="rect">
@@ -3157,8 +3171,8 @@
         </p:nvSpPr>
         <p:spPr>
           <a:xfrm>
-            <a:off x="6404698" y="3908758"/>
-            <a:ext cx="1502979" cy="276999"/>
+            <a:off x="6266152" y="3908758"/>
+            <a:ext cx="763202" cy="461665"/>
           </a:xfrm>
           <a:prstGeom prst="rect">
             <a:avLst/>
@@ -3176,7 +3190,19 @@
               <a:rPr lang="en-US" sz="1200" dirty="0" smtClean="0">
                 <a:latin typeface="Helvetica Neue" panose="02000503000000020004" pitchFamily="50"/>
               </a:rPr>
-              <a:t>Sleep inertia</a:t>
+              <a:t>Sleep </a:t>
+            </a:r>
+            <a:endParaRPr lang="en-US" sz="1200" dirty="0" smtClean="0">
+              <a:latin typeface="Helvetica Neue" panose="02000503000000020004" pitchFamily="50"/>
+            </a:endParaRPr>
+          </a:p>
+          <a:p>
+            <a:pPr algn="ctr"/>
+            <a:r>
+              <a:rPr lang="en-US" sz="1200" dirty="0" smtClean="0">
+                <a:latin typeface="Helvetica Neue" panose="02000503000000020004" pitchFamily="50"/>
+              </a:rPr>
+              <a:t>inertia</a:t>
             </a:r>
             <a:endParaRPr lang="en-US" sz="1200" baseline="30000" dirty="0">
               <a:latin typeface="Helvetica Neue" panose="02000503000000020004" pitchFamily="50"/>
@@ -3192,7 +3218,7 @@
         </p:nvSpPr>
         <p:spPr>
           <a:xfrm>
-            <a:off x="6290523" y="4443964"/>
+            <a:off x="6290523" y="4666701"/>
             <a:ext cx="1735696" cy="276999"/>
           </a:xfrm>
           <a:prstGeom prst="rect">
@@ -3227,7 +3253,7 @@
         </p:nvCxnSpPr>
         <p:spPr>
           <a:xfrm flipV="1">
-            <a:off x="7156187" y="4190161"/>
+            <a:off x="6640797" y="4412898"/>
             <a:ext cx="0" cy="216000"/>
           </a:xfrm>
           <a:prstGeom prst="straightConnector1">
@@ -3266,7 +3292,7 @@
         </p:nvCxnSpPr>
         <p:spPr>
           <a:xfrm flipV="1">
-            <a:off x="7156188" y="3667014"/>
+            <a:off x="6647408" y="3667014"/>
             <a:ext cx="0" cy="216000"/>
           </a:xfrm>
           <a:prstGeom prst="straightConnector1">
@@ -3299,13 +3325,13 @@
       </p:cxnSp>
       <p:sp>
         <p:nvSpPr>
-          <p:cNvPr id="6" name="Rectangle 5"/>
+          <p:cNvPr id="26" name="Rectangle 25"/>
           <p:cNvSpPr/>
           <p:nvPr/>
         </p:nvSpPr>
         <p:spPr>
           <a:xfrm>
-            <a:off x="4436668" y="3979759"/>
+            <a:off x="4436668" y="2083206"/>
             <a:ext cx="1440000" cy="872358"/>
           </a:xfrm>
           <a:prstGeom prst="rect">
@@ -3357,7 +3383,25 @@
                 </a:solidFill>
                 <a:latin typeface="Helvetica Neue" panose="02000503000000020004" pitchFamily="50"/>
               </a:rPr>
-              <a:t>BRAIN REACTIVITY </a:t>
+              <a:t>SALIENCE </a:t>
+            </a:r>
+            <a:r>
+              <a:rPr lang="en-US" sz="1150" b="1" dirty="0">
+                <a:solidFill>
+                  <a:schemeClr val="tx1"/>
+                </a:solidFill>
+                <a:latin typeface="Helvetica Neue" panose="02000503000000020004" pitchFamily="50"/>
+              </a:rPr>
+              <a:t> </a:t>
+            </a:r>
+            <a:r>
+              <a:rPr lang="en-US" sz="1150" b="1" dirty="0" smtClean="0">
+                <a:solidFill>
+                  <a:schemeClr val="tx1"/>
+                </a:solidFill>
+                <a:latin typeface="Helvetica Neue" panose="02000503000000020004" pitchFamily="50"/>
+              </a:rPr>
+              <a:t>        </a:t>
             </a:r>
             <a:r>
               <a:rPr lang="en-US" sz="1150" dirty="0" smtClean="0">
@@ -3366,7 +3410,7 @@
                 </a:solidFill>
                 <a:latin typeface="Helvetica Neue" panose="02000503000000020004" pitchFamily="50"/>
               </a:rPr>
-              <a:t>TO STIMULI</a:t>
+              <a:t>OF DREAM CONTENT</a:t>
             </a:r>
             <a:endParaRPr lang="en-US" sz="1150" baseline="30000" dirty="0">
               <a:solidFill>
@@ -3377,152 +3421,6 @@
           </a:p>
         </p:txBody>
       </p:sp>
-      <p:sp>
-        <p:nvSpPr>
-          <p:cNvPr id="26" name="Rectangle 25"/>
-          <p:cNvSpPr/>
-          <p:nvPr/>
-        </p:nvSpPr>
-        <p:spPr>
-          <a:xfrm>
-            <a:off x="4436668" y="1440113"/>
-            <a:ext cx="1440000" cy="872358"/>
-          </a:xfrm>
-          <a:prstGeom prst="rect">
-            <a:avLst/>
-          </a:prstGeom>
-          <a:noFill/>
-          <a:ln w="12700">
-            <a:solidFill>
-              <a:schemeClr val="tx2">
-                <a:lumMod val="75000"/>
-              </a:schemeClr>
-            </a:solidFill>
-          </a:ln>
-        </p:spPr>
-        <p:style>
-          <a:lnRef idx="2">
-            <a:schemeClr val="accent1">
-              <a:shade val="50000"/>
-            </a:schemeClr>
-          </a:lnRef>
-          <a:fillRef idx="1">
-            <a:schemeClr val="accent1"/>
-          </a:fillRef>
-          <a:effectRef idx="0">
-            <a:schemeClr val="accent1"/>
-          </a:effectRef>
-          <a:fontRef idx="minor">
-            <a:schemeClr val="lt1"/>
-          </a:fontRef>
-        </p:style>
-        <p:txBody>
-          <a:bodyPr rot="0" spcFirstLastPara="0" vertOverflow="overflow" horzOverflow="overflow" vert="horz" wrap="square" lIns="91440" tIns="45720" rIns="91440" bIns="45720" numCol="1" spcCol="0" rtlCol="0" fromWordArt="0" anchor="ctr" anchorCtr="0" forceAA="0" compatLnSpc="1">
-            <a:prstTxWarp prst="textNoShape">
-              <a:avLst/>
-            </a:prstTxWarp>
-            <a:noAutofit/>
-          </a:bodyPr>
-          <a:lstStyle/>
-          <a:p>
-            <a:pPr algn="ctr">
-              <a:lnSpc>
-                <a:spcPct val="150000"/>
-              </a:lnSpc>
-            </a:pPr>
-            <a:r>
-              <a:rPr lang="en-US" sz="1150" b="1" dirty="0" smtClean="0">
-                <a:solidFill>
-                  <a:schemeClr val="tx1"/>
-                </a:solidFill>
-                <a:latin typeface="Helvetica Neue" panose="02000503000000020004" pitchFamily="50"/>
-              </a:rPr>
-              <a:t>SALIENCE </a:t>
-            </a:r>
-            <a:r>
-              <a:rPr lang="en-US" sz="1150" b="1" dirty="0">
-                <a:solidFill>
-                  <a:schemeClr val="tx1"/>
-                </a:solidFill>
-                <a:latin typeface="Helvetica Neue" panose="02000503000000020004" pitchFamily="50"/>
-              </a:rPr>
-              <a:t> </a:t>
-            </a:r>
-            <a:r>
-              <a:rPr lang="en-US" sz="1150" b="1" dirty="0" smtClean="0">
-                <a:solidFill>
-                  <a:schemeClr val="tx1"/>
-                </a:solidFill>
-                <a:latin typeface="Helvetica Neue" panose="02000503000000020004" pitchFamily="50"/>
-              </a:rPr>
-              <a:t>        </a:t>
-            </a:r>
-            <a:r>
-              <a:rPr lang="en-US" sz="1150" dirty="0" smtClean="0">
-                <a:solidFill>
-                  <a:schemeClr val="tx1"/>
-                </a:solidFill>
-                <a:latin typeface="Helvetica Neue" panose="02000503000000020004" pitchFamily="50"/>
-              </a:rPr>
-              <a:t>OF </a:t>
-            </a:r>
-            <a:r>
-              <a:rPr lang="en-US" sz="1150" dirty="0" smtClean="0">
-                <a:solidFill>
-                  <a:schemeClr val="tx1"/>
-                </a:solidFill>
-                <a:latin typeface="Helvetica Neue" panose="02000503000000020004" pitchFamily="50"/>
-              </a:rPr>
-              <a:t>DREAM CONTENT</a:t>
-            </a:r>
-            <a:endParaRPr lang="en-US" sz="1150" baseline="30000" dirty="0">
-              <a:solidFill>
-                <a:schemeClr val="tx1"/>
-              </a:solidFill>
-              <a:latin typeface="Helvetica Neue" panose="02000503000000020004" pitchFamily="50"/>
-            </a:endParaRPr>
-          </a:p>
-        </p:txBody>
-      </p:sp>
-      <p:cxnSp>
-        <p:nvCxnSpPr>
-          <p:cNvPr id="27" name="Connecteur droit avec flèche 26"/>
-          <p:cNvCxnSpPr/>
-          <p:nvPr/>
-        </p:nvCxnSpPr>
-        <p:spPr>
-          <a:xfrm>
-            <a:off x="5960106" y="3154176"/>
-            <a:ext cx="360000" cy="0"/>
-          </a:xfrm>
-          <a:prstGeom prst="straightConnector1">
-            <a:avLst/>
-          </a:prstGeom>
-          <a:ln w="28575">
-            <a:solidFill>
-              <a:schemeClr val="tx1">
-                <a:lumMod val="85000"/>
-                <a:lumOff val="15000"/>
-              </a:schemeClr>
-            </a:solidFill>
-            <a:tailEnd type="triangle"/>
-          </a:ln>
-        </p:spPr>
-        <p:style>
-          <a:lnRef idx="1">
-            <a:schemeClr val="dk1"/>
-          </a:lnRef>
-          <a:fillRef idx="0">
-            <a:schemeClr val="dk1"/>
-          </a:fillRef>
-          <a:effectRef idx="0">
-            <a:schemeClr val="dk1"/>
-          </a:effectRef>
-          <a:fontRef idx="minor">
-            <a:schemeClr val="tx1"/>
-          </a:fontRef>
-        </p:style>
-      </p:cxnSp>
       <p:cxnSp>
         <p:nvCxnSpPr>
           <p:cNvPr id="42" name="Connecteur droit avec flèche 41"/>
@@ -3597,45 +3495,6 @@
           </a:p>
         </p:txBody>
       </p:sp>
-      <p:cxnSp>
-        <p:nvCxnSpPr>
-          <p:cNvPr id="49" name="Connecteur droit avec flèche 48"/>
-          <p:cNvCxnSpPr/>
-          <p:nvPr/>
-        </p:nvCxnSpPr>
-        <p:spPr>
-          <a:xfrm flipV="1">
-            <a:off x="5188158" y="3637864"/>
-            <a:ext cx="0" cy="288000"/>
-          </a:xfrm>
-          <a:prstGeom prst="straightConnector1">
-            <a:avLst/>
-          </a:prstGeom>
-          <a:ln w="19050">
-            <a:solidFill>
-              <a:schemeClr val="tx1">
-                <a:lumMod val="85000"/>
-                <a:lumOff val="15000"/>
-              </a:schemeClr>
-            </a:solidFill>
-            <a:tailEnd type="triangle"/>
-          </a:ln>
-        </p:spPr>
-        <p:style>
-          <a:lnRef idx="3">
-            <a:schemeClr val="dk1"/>
-          </a:lnRef>
-          <a:fillRef idx="0">
-            <a:schemeClr val="dk1"/>
-          </a:fillRef>
-          <a:effectRef idx="2">
-            <a:schemeClr val="dk1"/>
-          </a:effectRef>
-          <a:fontRef idx="minor">
-            <a:schemeClr val="tx1"/>
-          </a:fontRef>
-        </p:style>
-      </p:cxnSp>
       <p:grpSp>
         <p:nvGrpSpPr>
           <p:cNvPr id="55" name="Groupe 54"/>
@@ -3837,47 +3696,8 @@
         </p:nvCxnSpPr>
         <p:spPr>
           <a:xfrm>
-            <a:off x="3994260" y="3150294"/>
+            <a:off x="3994260" y="2511861"/>
             <a:ext cx="360000" cy="0"/>
-          </a:xfrm>
-          <a:prstGeom prst="straightConnector1">
-            <a:avLst/>
-          </a:prstGeom>
-          <a:ln w="28575">
-            <a:solidFill>
-              <a:schemeClr val="tx1">
-                <a:lumMod val="85000"/>
-                <a:lumOff val="15000"/>
-              </a:schemeClr>
-            </a:solidFill>
-            <a:tailEnd type="triangle"/>
-          </a:ln>
-        </p:spPr>
-        <p:style>
-          <a:lnRef idx="1">
-            <a:schemeClr val="dk1"/>
-          </a:lnRef>
-          <a:fillRef idx="0">
-            <a:schemeClr val="dk1"/>
-          </a:fillRef>
-          <a:effectRef idx="0">
-            <a:schemeClr val="dk1"/>
-          </a:effectRef>
-          <a:fontRef idx="minor">
-            <a:schemeClr val="tx1"/>
-          </a:fontRef>
-        </p:style>
-      </p:cxnSp>
-      <p:cxnSp>
-        <p:nvCxnSpPr>
-          <p:cNvPr id="67" name="Connecteur droit avec flèche 66"/>
-          <p:cNvCxnSpPr/>
-          <p:nvPr/>
-        </p:nvCxnSpPr>
-        <p:spPr>
-          <a:xfrm flipV="1">
-            <a:off x="3993182" y="2276264"/>
-            <a:ext cx="361078" cy="216000"/>
           </a:xfrm>
           <a:prstGeom prst="straightConnector1">
             <a:avLst/>
@@ -3995,7 +3815,25 @@
                     </a:solidFill>
                     <a:latin typeface="Helvetica Neue" panose="02000503000000020004" pitchFamily="50"/>
                   </a:rPr>
-                  <a:t>PERSONALITY, LIFE-STYLE, CREATIVITY</a:t>
+                  <a:t>PERSONALITY, </a:t>
+                </a:r>
+                <a:r>
+                  <a:rPr lang="en-US" sz="1150" dirty="0" smtClean="0">
+                    <a:solidFill>
+                      <a:schemeClr val="tx1"/>
+                    </a:solidFill>
+                    <a:latin typeface="Helvetica Neue" panose="02000503000000020004" pitchFamily="50"/>
+                  </a:rPr>
+                  <a:t>LIFE-STYLE, </a:t>
+                </a:r>
+                <a:r>
+                  <a:rPr lang="en-US" sz="1150" b="1" dirty="0" smtClean="0">
+                    <a:solidFill>
+                      <a:schemeClr val="tx1"/>
+                    </a:solidFill>
+                    <a:latin typeface="Helvetica Neue" panose="02000503000000020004" pitchFamily="50"/>
+                  </a:rPr>
+                  <a:t>CREATIVITY</a:t>
                 </a:r>
                 <a:endParaRPr lang="en-US" sz="1150" b="1" baseline="30000" dirty="0">
                   <a:solidFill>
@@ -4066,9 +3904,18 @@
                     </a:solidFill>
                     <a:latin typeface="Helvetica Neue" panose="02000503000000020004" pitchFamily="50"/>
                   </a:rPr>
-                  <a:t>BRAIN FUNCTIONING</a:t>
+                  <a:t>DEFAULT NETWORK </a:t>
                 </a:r>
-                <a:endParaRPr lang="en-US" sz="1150" b="1" baseline="30000" dirty="0">
+                <a:r>
+                  <a:rPr lang="en-US" sz="1150" dirty="0" smtClean="0">
+                    <a:solidFill>
+                      <a:schemeClr val="tx1"/>
+                    </a:solidFill>
+                    <a:latin typeface="Helvetica Neue" panose="02000503000000020004" pitchFamily="50"/>
+                  </a:rPr>
+                  <a:t>FUNCTIONING</a:t>
+                </a:r>
+                <a:endParaRPr lang="en-US" sz="1150" baseline="30000" dirty="0">
                   <a:solidFill>
                     <a:schemeClr val="tx1"/>
                   </a:solidFill>
@@ -4160,14 +4007,14 @@
       </p:cxnSp>
       <p:cxnSp>
         <p:nvCxnSpPr>
-          <p:cNvPr id="32" name="Connecteur droit avec flèche 31"/>
+          <p:cNvPr id="33" name="Connecteur droit avec flèche 32"/>
           <p:cNvCxnSpPr/>
           <p:nvPr/>
         </p:nvCxnSpPr>
         <p:spPr>
           <a:xfrm>
-            <a:off x="3987020" y="3789607"/>
-            <a:ext cx="361078" cy="216000"/>
+            <a:off x="5961483" y="2517641"/>
+            <a:ext cx="370622" cy="191569"/>
           </a:xfrm>
           <a:prstGeom prst="straightConnector1">
             <a:avLst/>
@@ -4197,16 +4044,252 @@
           </a:fontRef>
         </p:style>
       </p:cxnSp>
+      <p:sp>
+        <p:nvSpPr>
+          <p:cNvPr id="31" name="ZoneTexte 30"/>
+          <p:cNvSpPr txBox="1"/>
+          <p:nvPr/>
+        </p:nvSpPr>
+        <p:spPr>
+          <a:xfrm>
+            <a:off x="7342961" y="3908758"/>
+            <a:ext cx="763202" cy="461665"/>
+          </a:xfrm>
+          <a:prstGeom prst="rect">
+            <a:avLst/>
+          </a:prstGeom>
+          <a:noFill/>
+        </p:spPr>
+        <p:txBody>
+          <a:bodyPr wrap="square" rtlCol="0">
+            <a:spAutoFit/>
+          </a:bodyPr>
+          <a:lstStyle/>
+          <a:p>
+            <a:pPr algn="ctr"/>
+            <a:r>
+              <a:rPr lang="en-US" sz="1200" dirty="0" smtClean="0">
+                <a:latin typeface="Helvetica Neue" panose="02000503000000020004" pitchFamily="50"/>
+              </a:rPr>
+              <a:t>Stage shift</a:t>
+            </a:r>
+            <a:endParaRPr lang="en-US" sz="1200" baseline="30000" dirty="0">
+              <a:latin typeface="Helvetica Neue" panose="02000503000000020004" pitchFamily="50"/>
+            </a:endParaRPr>
+          </a:p>
+        </p:txBody>
+      </p:sp>
       <p:cxnSp>
         <p:nvCxnSpPr>
-          <p:cNvPr id="33" name="Connecteur droit avec flèche 32"/>
+          <p:cNvPr id="34" name="Connecteur droit avec flèche 33"/>
           <p:cNvCxnSpPr/>
           <p:nvPr/>
         </p:nvCxnSpPr>
         <p:spPr>
-          <a:xfrm>
-            <a:off x="5956085" y="2312471"/>
-            <a:ext cx="345492" cy="259181"/>
+          <a:xfrm flipV="1">
+            <a:off x="7724217" y="3667014"/>
+            <a:ext cx="0" cy="216000"/>
+          </a:xfrm>
+          <a:prstGeom prst="straightConnector1">
+            <a:avLst/>
+          </a:prstGeom>
+          <a:ln w="12700">
+            <a:solidFill>
+              <a:schemeClr val="tx1">
+                <a:lumMod val="85000"/>
+                <a:lumOff val="15000"/>
+              </a:schemeClr>
+            </a:solidFill>
+            <a:tailEnd type="triangle"/>
+          </a:ln>
+        </p:spPr>
+        <p:style>
+          <a:lnRef idx="3">
+            <a:schemeClr val="dk1"/>
+          </a:lnRef>
+          <a:fillRef idx="0">
+            <a:schemeClr val="dk1"/>
+          </a:fillRef>
+          <a:effectRef idx="2">
+            <a:schemeClr val="dk1"/>
+          </a:effectRef>
+          <a:fontRef idx="minor">
+            <a:schemeClr val="tx1"/>
+          </a:fontRef>
+        </p:style>
+      </p:cxnSp>
+      <p:cxnSp>
+        <p:nvCxnSpPr>
+          <p:cNvPr id="35" name="Connecteur droit avec flèche 34"/>
+          <p:cNvCxnSpPr/>
+          <p:nvPr/>
+        </p:nvCxnSpPr>
+        <p:spPr>
+          <a:xfrm rot="16200000" flipV="1">
+            <a:off x="7204503" y="3922984"/>
+            <a:ext cx="0" cy="432000"/>
+          </a:xfrm>
+          <a:prstGeom prst="straightConnector1">
+            <a:avLst/>
+          </a:prstGeom>
+          <a:ln w="12700">
+            <a:solidFill>
+              <a:schemeClr val="tx1">
+                <a:lumMod val="85000"/>
+                <a:lumOff val="15000"/>
+              </a:schemeClr>
+            </a:solidFill>
+            <a:headEnd type="triangle" w="med" len="med"/>
+            <a:tailEnd type="triangle" w="med" len="med"/>
+          </a:ln>
+        </p:spPr>
+        <p:style>
+          <a:lnRef idx="3">
+            <a:schemeClr val="dk1"/>
+          </a:lnRef>
+          <a:fillRef idx="0">
+            <a:schemeClr val="dk1"/>
+          </a:fillRef>
+          <a:effectRef idx="2">
+            <a:schemeClr val="dk1"/>
+          </a:effectRef>
+          <a:fontRef idx="minor">
+            <a:schemeClr val="tx1"/>
+          </a:fontRef>
+        </p:style>
+      </p:cxnSp>
+      <p:cxnSp>
+        <p:nvCxnSpPr>
+          <p:cNvPr id="36" name="Connecteur droit avec flèche 35"/>
+          <p:cNvCxnSpPr/>
+          <p:nvPr/>
+        </p:nvCxnSpPr>
+        <p:spPr>
+          <a:xfrm flipV="1">
+            <a:off x="7724217" y="4412898"/>
+            <a:ext cx="0" cy="216000"/>
+          </a:xfrm>
+          <a:prstGeom prst="straightConnector1">
+            <a:avLst/>
+          </a:prstGeom>
+          <a:ln w="12700">
+            <a:solidFill>
+              <a:schemeClr val="tx1">
+                <a:lumMod val="85000"/>
+                <a:lumOff val="15000"/>
+              </a:schemeClr>
+            </a:solidFill>
+            <a:tailEnd type="triangle"/>
+          </a:ln>
+        </p:spPr>
+        <p:style>
+          <a:lnRef idx="3">
+            <a:schemeClr val="dk1"/>
+          </a:lnRef>
+          <a:fillRef idx="0">
+            <a:schemeClr val="dk1"/>
+          </a:fillRef>
+          <a:effectRef idx="2">
+            <a:schemeClr val="dk1"/>
+          </a:effectRef>
+          <a:fontRef idx="minor">
+            <a:schemeClr val="tx1"/>
+          </a:fontRef>
+        </p:style>
+      </p:cxnSp>
+      <p:sp>
+        <p:nvSpPr>
+          <p:cNvPr id="37" name="Rectangle 36"/>
+          <p:cNvSpPr/>
+          <p:nvPr/>
+        </p:nvSpPr>
+        <p:spPr>
+          <a:xfrm>
+            <a:off x="1249503" y="2721638"/>
+            <a:ext cx="866945" cy="879614"/>
+          </a:xfrm>
+          <a:prstGeom prst="rect">
+            <a:avLst/>
+          </a:prstGeom>
+          <a:noFill/>
+          <a:ln w="12700">
+            <a:noFill/>
+          </a:ln>
+        </p:spPr>
+        <p:style>
+          <a:lnRef idx="2">
+            <a:schemeClr val="accent1">
+              <a:shade val="50000"/>
+            </a:schemeClr>
+          </a:lnRef>
+          <a:fillRef idx="1">
+            <a:schemeClr val="accent1"/>
+          </a:fillRef>
+          <a:effectRef idx="0">
+            <a:schemeClr val="accent1"/>
+          </a:effectRef>
+          <a:fontRef idx="minor">
+            <a:schemeClr val="lt1"/>
+          </a:fontRef>
+        </p:style>
+        <p:txBody>
+          <a:bodyPr rot="0" spcFirstLastPara="0" vertOverflow="overflow" horzOverflow="overflow" vert="horz" wrap="square" lIns="91440" tIns="45720" rIns="91440" bIns="45720" numCol="1" spcCol="0" rtlCol="0" fromWordArt="0" anchor="ctr" anchorCtr="0" forceAA="0" compatLnSpc="1">
+            <a:prstTxWarp prst="textNoShape">
+              <a:avLst/>
+            </a:prstTxWarp>
+            <a:noAutofit/>
+          </a:bodyPr>
+          <a:lstStyle/>
+          <a:p>
+            <a:pPr algn="ctr">
+              <a:lnSpc>
+                <a:spcPct val="150000"/>
+              </a:lnSpc>
+            </a:pPr>
+            <a:r>
+              <a:rPr lang="en-US" sz="1150" b="1" dirty="0" smtClean="0">
+                <a:solidFill>
+                  <a:schemeClr val="tx1"/>
+                </a:solidFill>
+                <a:latin typeface="Helvetica Neue" panose="02000503000000020004" pitchFamily="50"/>
+              </a:rPr>
+              <a:t>AGE, </a:t>
+            </a:r>
+          </a:p>
+          <a:p>
+            <a:pPr algn="ctr">
+              <a:lnSpc>
+                <a:spcPct val="150000"/>
+              </a:lnSpc>
+            </a:pPr>
+            <a:r>
+              <a:rPr lang="en-US" sz="1150" b="1" dirty="0" smtClean="0">
+                <a:solidFill>
+                  <a:schemeClr val="tx1"/>
+                </a:solidFill>
+                <a:latin typeface="Helvetica Neue" panose="02000503000000020004" pitchFamily="50"/>
+              </a:rPr>
+              <a:t>SEX</a:t>
+            </a:r>
+            <a:endParaRPr lang="en-US" sz="1150" b="1" baseline="30000" dirty="0">
+              <a:solidFill>
+                <a:schemeClr val="tx1"/>
+              </a:solidFill>
+              <a:latin typeface="Helvetica Neue" panose="02000503000000020004" pitchFamily="50"/>
+            </a:endParaRPr>
+          </a:p>
+        </p:txBody>
+      </p:sp>
+      <p:cxnSp>
+        <p:nvCxnSpPr>
+          <p:cNvPr id="38" name="Connecteur droit avec flèche 37"/>
+          <p:cNvCxnSpPr/>
+          <p:nvPr/>
+        </p:nvCxnSpPr>
+        <p:spPr>
+          <a:xfrm flipV="1">
+            <a:off x="2115548" y="2709210"/>
+            <a:ext cx="361078" cy="216000"/>
           </a:xfrm>
           <a:prstGeom prst="straightConnector1">
             <a:avLst/>
@@ -4216,6 +4299,201 @@
               <a:schemeClr val="tx1">
                 <a:lumMod val="85000"/>
                 <a:lumOff val="15000"/>
+              </a:schemeClr>
+            </a:solidFill>
+            <a:tailEnd type="triangle"/>
+          </a:ln>
+        </p:spPr>
+        <p:style>
+          <a:lnRef idx="1">
+            <a:schemeClr val="dk1"/>
+          </a:lnRef>
+          <a:fillRef idx="0">
+            <a:schemeClr val="dk1"/>
+          </a:fillRef>
+          <a:effectRef idx="0">
+            <a:schemeClr val="dk1"/>
+          </a:effectRef>
+          <a:fontRef idx="minor">
+            <a:schemeClr val="tx1"/>
+          </a:fontRef>
+        </p:style>
+      </p:cxnSp>
+      <p:cxnSp>
+        <p:nvCxnSpPr>
+          <p:cNvPr id="39" name="Connecteur droit avec flèche 38"/>
+          <p:cNvCxnSpPr/>
+          <p:nvPr/>
+        </p:nvCxnSpPr>
+        <p:spPr>
+          <a:xfrm>
+            <a:off x="2113372" y="3421864"/>
+            <a:ext cx="361078" cy="216000"/>
+          </a:xfrm>
+          <a:prstGeom prst="straightConnector1">
+            <a:avLst/>
+          </a:prstGeom>
+          <a:ln w="28575">
+            <a:solidFill>
+              <a:schemeClr val="tx1">
+                <a:lumMod val="85000"/>
+                <a:lumOff val="15000"/>
+              </a:schemeClr>
+            </a:solidFill>
+            <a:tailEnd type="triangle"/>
+          </a:ln>
+        </p:spPr>
+        <p:style>
+          <a:lnRef idx="1">
+            <a:schemeClr val="dk1"/>
+          </a:lnRef>
+          <a:fillRef idx="0">
+            <a:schemeClr val="dk1"/>
+          </a:fillRef>
+          <a:effectRef idx="0">
+            <a:schemeClr val="dk1"/>
+          </a:effectRef>
+          <a:fontRef idx="minor">
+            <a:schemeClr val="tx1"/>
+          </a:fontRef>
+        </p:style>
+      </p:cxnSp>
+      <p:cxnSp>
+        <p:nvCxnSpPr>
+          <p:cNvPr id="40" name="Connecteur droit avec flèche 39"/>
+          <p:cNvCxnSpPr/>
+          <p:nvPr/>
+        </p:nvCxnSpPr>
+        <p:spPr>
+          <a:xfrm>
+            <a:off x="3994260" y="3788683"/>
+            <a:ext cx="360000" cy="0"/>
+          </a:xfrm>
+          <a:prstGeom prst="straightConnector1">
+            <a:avLst/>
+          </a:prstGeom>
+          <a:ln w="28575">
+            <a:solidFill>
+              <a:schemeClr val="tx1">
+                <a:lumMod val="85000"/>
+                <a:lumOff val="15000"/>
+              </a:schemeClr>
+            </a:solidFill>
+            <a:tailEnd type="triangle"/>
+          </a:ln>
+        </p:spPr>
+        <p:style>
+          <a:lnRef idx="1">
+            <a:schemeClr val="dk1"/>
+          </a:lnRef>
+          <a:fillRef idx="0">
+            <a:schemeClr val="dk1"/>
+          </a:fillRef>
+          <a:effectRef idx="0">
+            <a:schemeClr val="dk1"/>
+          </a:effectRef>
+          <a:fontRef idx="minor">
+            <a:schemeClr val="tx1"/>
+          </a:fontRef>
+        </p:style>
+      </p:cxnSp>
+      <p:cxnSp>
+        <p:nvCxnSpPr>
+          <p:cNvPr id="41" name="Connecteur droit avec flèche 40"/>
+          <p:cNvCxnSpPr/>
+          <p:nvPr/>
+        </p:nvCxnSpPr>
+        <p:spPr>
+          <a:xfrm flipV="1">
+            <a:off x="5961483" y="3593445"/>
+            <a:ext cx="370622" cy="191569"/>
+          </a:xfrm>
+          <a:prstGeom prst="straightConnector1">
+            <a:avLst/>
+          </a:prstGeom>
+          <a:ln w="28575">
+            <a:solidFill>
+              <a:schemeClr val="tx1">
+                <a:lumMod val="85000"/>
+                <a:lumOff val="15000"/>
+              </a:schemeClr>
+            </a:solidFill>
+            <a:tailEnd type="triangle"/>
+          </a:ln>
+        </p:spPr>
+        <p:style>
+          <a:lnRef idx="1">
+            <a:schemeClr val="dk1"/>
+          </a:lnRef>
+          <a:fillRef idx="0">
+            <a:schemeClr val="dk1"/>
+          </a:fillRef>
+          <a:effectRef idx="0">
+            <a:schemeClr val="dk1"/>
+          </a:effectRef>
+          <a:fontRef idx="minor">
+            <a:schemeClr val="tx1"/>
+          </a:fontRef>
+        </p:style>
+      </p:cxnSp>
+      <p:cxnSp>
+        <p:nvCxnSpPr>
+          <p:cNvPr id="50" name="Connecteur droit avec flèche 49"/>
+          <p:cNvCxnSpPr/>
+          <p:nvPr/>
+        </p:nvCxnSpPr>
+        <p:spPr>
+          <a:xfrm flipV="1">
+            <a:off x="3999876" y="3018077"/>
+            <a:ext cx="356224" cy="304852"/>
+          </a:xfrm>
+          <a:prstGeom prst="straightConnector1">
+            <a:avLst/>
+          </a:prstGeom>
+          <a:ln w="9525">
+            <a:solidFill>
+              <a:schemeClr val="tx1">
+                <a:lumMod val="75000"/>
+                <a:lumOff val="25000"/>
+              </a:schemeClr>
+            </a:solidFill>
+            <a:tailEnd type="triangle"/>
+          </a:ln>
+        </p:spPr>
+        <p:style>
+          <a:lnRef idx="1">
+            <a:schemeClr val="dk1"/>
+          </a:lnRef>
+          <a:fillRef idx="0">
+            <a:schemeClr val="dk1"/>
+          </a:fillRef>
+          <a:effectRef idx="0">
+            <a:schemeClr val="dk1"/>
+          </a:effectRef>
+          <a:fontRef idx="minor">
+            <a:schemeClr val="tx1"/>
+          </a:fontRef>
+        </p:style>
+      </p:cxnSp>
+      <p:cxnSp>
+        <p:nvCxnSpPr>
+          <p:cNvPr id="52" name="Connecteur droit avec flèche 51"/>
+          <p:cNvCxnSpPr/>
+          <p:nvPr/>
+        </p:nvCxnSpPr>
+        <p:spPr>
+          <a:xfrm>
+            <a:off x="3986935" y="3016774"/>
+            <a:ext cx="356224" cy="304852"/>
+          </a:xfrm>
+          <a:prstGeom prst="straightConnector1">
+            <a:avLst/>
+          </a:prstGeom>
+          <a:ln w="9525">
+            <a:solidFill>
+              <a:schemeClr val="tx1">
+                <a:lumMod val="75000"/>
+                <a:lumOff val="25000"/>
               </a:schemeClr>
             </a:solidFill>
             <a:tailEnd type="triangle"/>
@@ -4275,16 +4553,18 @@
         <p:spPr>
           <a:xfrm>
             <a:off x="4436668" y="2709936"/>
-            <a:ext cx="1502980" cy="872358"/>
+            <a:ext cx="1440000" cy="872358"/>
           </a:xfrm>
           <a:prstGeom prst="rect">
             <a:avLst/>
           </a:prstGeom>
-          <a:solidFill>
-            <a:srgbClr val="6EBCBF"/>
-          </a:solidFill>
-          <a:ln w="19050">
-            <a:noFill/>
+          <a:noFill/>
+          <a:ln w="12700">
+            <a:solidFill>
+              <a:schemeClr val="tx2">
+                <a:lumMod val="75000"/>
+              </a:schemeClr>
+            </a:solidFill>
           </a:ln>
         </p:spPr>
         <p:style>
@@ -4318,15 +4598,24 @@
               </a:lnSpc>
             </a:pPr>
             <a:r>
-              <a:rPr lang="en-US" sz="1150" smtClean="0">
+              <a:rPr lang="en-US" sz="1150" dirty="0" smtClean="0">
                 <a:solidFill>
                   <a:schemeClr val="tx1"/>
                 </a:solidFill>
                 <a:latin typeface="Helvetica Neue" panose="02000503000000020004" pitchFamily="50"/>
               </a:rPr>
-              <a:t>INTRA-SLEEP AWAKENINGS</a:t>
-            </a:r>
-            <a:endParaRPr lang="en-US" sz="1150" baseline="30000" dirty="0">
+              <a:t>INTRA-SLEEP </a:t>
+            </a:r>
+            <a:r>
+              <a:rPr lang="en-US" sz="1150" b="1" dirty="0" smtClean="0">
+                <a:solidFill>
+                  <a:schemeClr val="tx1"/>
+                </a:solidFill>
+                <a:latin typeface="Helvetica Neue" panose="02000503000000020004" pitchFamily="50"/>
+              </a:rPr>
+              <a:t>AWAKENINGS</a:t>
+            </a:r>
+            <a:endParaRPr lang="en-US" sz="1150" b="1" baseline="30000" dirty="0">
               <a:solidFill>
                 <a:schemeClr val="tx1"/>
               </a:solidFill>
@@ -4343,17 +4632,19 @@
         </p:nvSpPr>
         <p:spPr>
           <a:xfrm>
-            <a:off x="6616568" y="2709936"/>
+            <a:off x="6404699" y="2721087"/>
             <a:ext cx="1502980" cy="872358"/>
           </a:xfrm>
           <a:prstGeom prst="rect">
             <a:avLst/>
           </a:prstGeom>
-          <a:solidFill>
-            <a:srgbClr val="61567C"/>
-          </a:solidFill>
-          <a:ln w="19050">
-            <a:noFill/>
+          <a:noFill/>
+          <a:ln w="12700">
+            <a:solidFill>
+              <a:schemeClr val="tx2">
+                <a:lumMod val="75000"/>
+              </a:schemeClr>
+            </a:solidFill>
           </a:ln>
         </p:spPr>
         <p:style>
@@ -4387,17 +4678,26 @@
               </a:lnSpc>
             </a:pPr>
             <a:r>
-              <a:rPr lang="en-US" sz="1150" dirty="0" smtClean="0">
-                <a:solidFill>
-                  <a:schemeClr val="bg1"/>
+              <a:rPr lang="en-US" sz="1100" b="1" dirty="0" smtClean="0">
+                <a:solidFill>
+                  <a:schemeClr val="tx1"/>
                 </a:solidFill>
                 <a:latin typeface="Helvetica Neue" panose="02000503000000020004" pitchFamily="50"/>
               </a:rPr>
-              <a:t>ENCODING OF DREAM IN LONG TERM MEMORY</a:t>
-            </a:r>
-            <a:endParaRPr lang="en-US" sz="1150" baseline="30000" dirty="0">
+              <a:t>ENCODING</a:t>
+            </a:r>
+            <a:r>
+              <a:rPr lang="en-US" sz="1100" dirty="0" smtClean="0">
+                <a:solidFill>
+                  <a:schemeClr val="tx1"/>
+                </a:solidFill>
+                <a:latin typeface="Helvetica Neue" panose="02000503000000020004" pitchFamily="50"/>
+              </a:rPr>
+              <a:t> OF DREAM IN LONG TERM MEMORY</a:t>
+            </a:r>
+            <a:endParaRPr lang="en-US" sz="1100" baseline="30000" dirty="0">
               <a:solidFill>
-                <a:schemeClr val="bg1"/>
+                <a:schemeClr val="tx1"/>
               </a:solidFill>
               <a:latin typeface="Helvetica Neue" panose="02000503000000020004" pitchFamily="50"/>
             </a:endParaRPr>
@@ -4412,7 +4712,7 @@
         </p:nvSpPr>
         <p:spPr>
           <a:xfrm>
-            <a:off x="6616567" y="3897607"/>
+            <a:off x="6404698" y="3908758"/>
             <a:ext cx="1502979" cy="276999"/>
           </a:xfrm>
           <a:prstGeom prst="rect">
@@ -4428,12 +4728,12 @@
           <a:p>
             <a:pPr algn="ctr"/>
             <a:r>
-              <a:rPr lang="en-US" sz="1150" dirty="0" smtClean="0">
+              <a:rPr lang="en-US" sz="1200" dirty="0" smtClean="0">
                 <a:latin typeface="Helvetica Neue" panose="02000503000000020004" pitchFamily="50"/>
               </a:rPr>
               <a:t>Sleep inertia</a:t>
             </a:r>
-            <a:endParaRPr lang="en-US" sz="1150" baseline="30000" dirty="0">
+            <a:endParaRPr lang="en-US" sz="1200" baseline="30000" dirty="0">
               <a:latin typeface="Helvetica Neue" panose="02000503000000020004" pitchFamily="50"/>
             </a:endParaRPr>
           </a:p>
@@ -4447,7 +4747,7 @@
         </p:nvSpPr>
         <p:spPr>
           <a:xfrm>
-            <a:off x="6502392" y="4432813"/>
+            <a:off x="6290523" y="4443964"/>
             <a:ext cx="1735696" cy="276999"/>
           </a:xfrm>
           <a:prstGeom prst="rect">
@@ -4463,56 +4763,17 @@
           <a:p>
             <a:pPr algn="ctr"/>
             <a:r>
-              <a:rPr lang="en-US" sz="1150" dirty="0" smtClean="0">
+              <a:rPr lang="en-US" sz="1200" dirty="0" smtClean="0">
                 <a:latin typeface="Helvetica Neue" panose="02000503000000020004" pitchFamily="50"/>
               </a:rPr>
               <a:t>Physiological context</a:t>
             </a:r>
-            <a:endParaRPr lang="en-US" sz="1150" baseline="30000" dirty="0">
+            <a:endParaRPr lang="en-US" sz="1200" baseline="30000" dirty="0">
               <a:latin typeface="Helvetica Neue" panose="02000503000000020004" pitchFamily="50"/>
             </a:endParaRPr>
           </a:p>
         </p:txBody>
       </p:sp>
-      <p:cxnSp>
-        <p:nvCxnSpPr>
-          <p:cNvPr id="16" name="Connecteur droit avec flèche 15"/>
-          <p:cNvCxnSpPr/>
-          <p:nvPr/>
-        </p:nvCxnSpPr>
-        <p:spPr>
-          <a:xfrm>
-            <a:off x="8265064" y="3151599"/>
-            <a:ext cx="430922" cy="0"/>
-          </a:xfrm>
-          <a:prstGeom prst="straightConnector1">
-            <a:avLst/>
-          </a:prstGeom>
-          <a:ln w="28575">
-            <a:solidFill>
-              <a:schemeClr val="tx1">
-                <a:lumMod val="85000"/>
-                <a:lumOff val="15000"/>
-              </a:schemeClr>
-            </a:solidFill>
-            <a:tailEnd type="triangle"/>
-          </a:ln>
-        </p:spPr>
-        <p:style>
-          <a:lnRef idx="1">
-            <a:schemeClr val="dk1"/>
-          </a:lnRef>
-          <a:fillRef idx="0">
-            <a:schemeClr val="dk1"/>
-          </a:fillRef>
-          <a:effectRef idx="0">
-            <a:schemeClr val="dk1"/>
-          </a:effectRef>
-          <a:fontRef idx="minor">
-            <a:schemeClr val="tx1"/>
-          </a:fontRef>
-        </p:style>
-      </p:cxnSp>
       <p:cxnSp>
         <p:nvCxnSpPr>
           <p:cNvPr id="19" name="Connecteur droit avec flèche 18"/>
@@ -4521,7 +4782,7 @@
         </p:nvCxnSpPr>
         <p:spPr>
           <a:xfrm flipV="1">
-            <a:off x="7368056" y="4179010"/>
+            <a:off x="7156187" y="4190161"/>
             <a:ext cx="0" cy="216000"/>
           </a:xfrm>
           <a:prstGeom prst="straightConnector1">
@@ -4560,7 +4821,7 @@
         </p:nvCxnSpPr>
         <p:spPr>
           <a:xfrm flipV="1">
-            <a:off x="7368057" y="3655863"/>
+            <a:off x="7156188" y="3667014"/>
             <a:ext cx="0" cy="216000"/>
           </a:xfrm>
           <a:prstGeom prst="straightConnector1">
@@ -4600,16 +4861,18 @@
         <p:spPr>
           <a:xfrm>
             <a:off x="4436668" y="3979759"/>
-            <a:ext cx="1502980" cy="872358"/>
+            <a:ext cx="1440000" cy="872358"/>
           </a:xfrm>
           <a:prstGeom prst="rect">
             <a:avLst/>
           </a:prstGeom>
-          <a:solidFill>
-            <a:srgbClr val="4B84AF"/>
-          </a:solidFill>
-          <a:ln w="19050">
-            <a:noFill/>
+          <a:noFill/>
+          <a:ln w="12700">
+            <a:solidFill>
+              <a:schemeClr val="tx2">
+                <a:lumMod val="75000"/>
+              </a:schemeClr>
+            </a:solidFill>
           </a:ln>
         </p:spPr>
         <p:style>
@@ -4643,13 +4906,22 @@
               </a:lnSpc>
             </a:pPr>
             <a:r>
+              <a:rPr lang="en-US" sz="1150" b="1" dirty="0" smtClean="0">
+                <a:solidFill>
+                  <a:schemeClr val="tx1"/>
+                </a:solidFill>
+                <a:latin typeface="Helvetica Neue" panose="02000503000000020004" pitchFamily="50"/>
+              </a:rPr>
+              <a:t>BRAIN REACTIVITY </a:t>
+            </a:r>
+            <a:r>
               <a:rPr lang="en-US" sz="1150" dirty="0" smtClean="0">
                 <a:solidFill>
                   <a:schemeClr val="tx1"/>
                 </a:solidFill>
                 <a:latin typeface="Helvetica Neue" panose="02000503000000020004" pitchFamily="50"/>
               </a:rPr>
-              <a:t>BRAIN REACTIVITY TO STIMULI</a:t>
+              <a:t>TO STIMULI</a:t>
             </a:r>
             <a:endParaRPr lang="en-US" sz="1150" baseline="30000" dirty="0">
               <a:solidFill>
@@ -4669,16 +4941,18 @@
         <p:spPr>
           <a:xfrm>
             <a:off x="4436668" y="1440113"/>
-            <a:ext cx="1502980" cy="872358"/>
+            <a:ext cx="1440000" cy="872358"/>
           </a:xfrm>
           <a:prstGeom prst="rect">
             <a:avLst/>
           </a:prstGeom>
-          <a:solidFill>
-            <a:srgbClr val="99D398"/>
-          </a:solidFill>
-          <a:ln w="19050">
-            <a:noFill/>
+          <a:noFill/>
+          <a:ln w="12700">
+            <a:solidFill>
+              <a:schemeClr val="tx2">
+                <a:lumMod val="75000"/>
+              </a:schemeClr>
+            </a:solidFill>
           </a:ln>
         </p:spPr>
         <p:style>
@@ -4712,13 +4986,40 @@
               </a:lnSpc>
             </a:pPr>
             <a:r>
+              <a:rPr lang="en-US" sz="1150" b="1" dirty="0" smtClean="0">
+                <a:solidFill>
+                  <a:schemeClr val="tx1"/>
+                </a:solidFill>
+                <a:latin typeface="Helvetica Neue" panose="02000503000000020004" pitchFamily="50"/>
+              </a:rPr>
+              <a:t>SALIENCE </a:t>
+            </a:r>
+            <a:r>
+              <a:rPr lang="en-US" sz="1150" b="1" dirty="0">
+                <a:solidFill>
+                  <a:schemeClr val="tx1"/>
+                </a:solidFill>
+                <a:latin typeface="Helvetica Neue" panose="02000503000000020004" pitchFamily="50"/>
+              </a:rPr>
+              <a:t> </a:t>
+            </a:r>
+            <a:r>
+              <a:rPr lang="en-US" sz="1150" b="1" dirty="0" smtClean="0">
+                <a:solidFill>
+                  <a:schemeClr val="tx1"/>
+                </a:solidFill>
+                <a:latin typeface="Helvetica Neue" panose="02000503000000020004" pitchFamily="50"/>
+              </a:rPr>
+              <a:t>        </a:t>
+            </a:r>
+            <a:r>
               <a:rPr lang="en-US" sz="1150" dirty="0" smtClean="0">
                 <a:solidFill>
                   <a:schemeClr val="tx1"/>
                 </a:solidFill>
                 <a:latin typeface="Helvetica Neue" panose="02000503000000020004" pitchFamily="50"/>
               </a:rPr>
-              <a:t>SALIENCE OF DREAM CONTENT</a:t>
+              <a:t>OF DREAM CONTENT</a:t>
             </a:r>
             <a:endParaRPr lang="en-US" sz="1150" baseline="30000" dirty="0">
               <a:solidFill>
@@ -4737,8 +5038,8 @@
         </p:nvCxnSpPr>
         <p:spPr>
           <a:xfrm>
-            <a:off x="6049314" y="3143025"/>
-            <a:ext cx="430922" cy="0"/>
+            <a:off x="5960106" y="3154176"/>
+            <a:ext cx="360000" cy="0"/>
           </a:xfrm>
           <a:prstGeom prst="straightConnector1">
             <a:avLst/>
@@ -4776,7 +5077,7 @@
         </p:nvCxnSpPr>
         <p:spPr>
           <a:xfrm>
-            <a:off x="7369098" y="2398490"/>
+            <a:off x="7157229" y="2409641"/>
             <a:ext cx="0" cy="216000"/>
           </a:xfrm>
           <a:prstGeom prst="straightConnector1">
@@ -4815,7 +5116,7 @@
         </p:nvSpPr>
         <p:spPr>
           <a:xfrm>
-            <a:off x="6616566" y="2107265"/>
+            <a:off x="6404697" y="2118416"/>
             <a:ext cx="1502979" cy="276999"/>
           </a:xfrm>
           <a:prstGeom prst="rect">
@@ -4831,12 +5132,12 @@
           <a:p>
             <a:pPr algn="ctr"/>
             <a:r>
-              <a:rPr lang="en-US" sz="1150" dirty="0" smtClean="0">
+              <a:rPr lang="en-US" sz="1200" dirty="0" smtClean="0">
                 <a:latin typeface="Helvetica Neue" panose="02000503000000020004" pitchFamily="50"/>
               </a:rPr>
               <a:t>Interference</a:t>
             </a:r>
-            <a:endParaRPr lang="en-US" sz="1150" dirty="0">
+            <a:endParaRPr lang="en-US" sz="1200" dirty="0">
               <a:latin typeface="Helvetica Neue" panose="02000503000000020004" pitchFamily="50"/>
             </a:endParaRPr>
           </a:p>
@@ -4889,7 +5190,7 @@
         </p:nvGrpSpPr>
         <p:grpSpPr>
           <a:xfrm>
-            <a:off x="8796468" y="2118836"/>
+            <a:off x="8246920" y="2129987"/>
             <a:ext cx="1311519" cy="1463458"/>
             <a:chOff x="10828802" y="1497165"/>
             <a:chExt cx="1311519" cy="1463458"/>
@@ -5008,7 +5309,7 @@
         </p:nvCxnSpPr>
         <p:spPr>
           <a:xfrm>
-            <a:off x="7369916" y="1848676"/>
+            <a:off x="7158047" y="1859827"/>
             <a:ext cx="0" cy="216000"/>
           </a:xfrm>
           <a:prstGeom prst="straightConnector1">
@@ -5047,8 +5348,8 @@
         </p:nvSpPr>
         <p:spPr>
           <a:xfrm>
-            <a:off x="6616566" y="1542588"/>
-            <a:ext cx="1502979" cy="269304"/>
+            <a:off x="6404697" y="1553739"/>
+            <a:ext cx="1502979" cy="276999"/>
           </a:xfrm>
           <a:prstGeom prst="rect">
             <a:avLst/>
@@ -5063,56 +5364,17 @@
           <a:p>
             <a:pPr algn="ctr"/>
             <a:r>
-              <a:rPr lang="en-US" sz="1150" dirty="0" smtClean="0">
+              <a:rPr lang="en-US" sz="1200" dirty="0" smtClean="0">
                 <a:latin typeface="Helvetica Neue" panose="02000503000000020004" pitchFamily="50"/>
               </a:rPr>
               <a:t>Interest in dreams</a:t>
             </a:r>
-            <a:endParaRPr lang="en-US" sz="1150" baseline="30000" dirty="0">
+            <a:endParaRPr lang="en-US" sz="1200" baseline="30000" dirty="0">
               <a:latin typeface="Helvetica Neue" panose="02000503000000020004" pitchFamily="50"/>
             </a:endParaRPr>
           </a:p>
         </p:txBody>
       </p:sp>
-      <p:cxnSp>
-        <p:nvCxnSpPr>
-          <p:cNvPr id="61" name="Connecteur droit avec flèche 60"/>
-          <p:cNvCxnSpPr/>
-          <p:nvPr/>
-        </p:nvCxnSpPr>
-        <p:spPr>
-          <a:xfrm>
-            <a:off x="6048236" y="2398490"/>
-            <a:ext cx="432000" cy="247800"/>
-          </a:xfrm>
-          <a:prstGeom prst="straightConnector1">
-            <a:avLst/>
-          </a:prstGeom>
-          <a:ln w="28575">
-            <a:solidFill>
-              <a:schemeClr val="tx1">
-                <a:lumMod val="85000"/>
-                <a:lumOff val="15000"/>
-              </a:schemeClr>
-            </a:solidFill>
-            <a:tailEnd type="triangle"/>
-          </a:ln>
-        </p:spPr>
-        <p:style>
-          <a:lnRef idx="1">
-            <a:schemeClr val="dk1"/>
-          </a:lnRef>
-          <a:fillRef idx="0">
-            <a:schemeClr val="dk1"/>
-          </a:fillRef>
-          <a:effectRef idx="0">
-            <a:schemeClr val="dk1"/>
-          </a:effectRef>
-          <a:fontRef idx="minor">
-            <a:schemeClr val="tx1"/>
-          </a:fontRef>
-        </p:style>
-      </p:cxnSp>
       <p:cxnSp>
         <p:nvCxnSpPr>
           <p:cNvPr id="64" name="Connecteur droit avec flèche 63"/>
@@ -5121,47 +5383,8 @@
         </p:nvCxnSpPr>
         <p:spPr>
           <a:xfrm>
-            <a:off x="3860448" y="3150294"/>
-            <a:ext cx="430922" cy="0"/>
-          </a:xfrm>
-          <a:prstGeom prst="straightConnector1">
-            <a:avLst/>
-          </a:prstGeom>
-          <a:ln w="28575">
-            <a:solidFill>
-              <a:schemeClr val="tx1">
-                <a:lumMod val="85000"/>
-                <a:lumOff val="15000"/>
-              </a:schemeClr>
-            </a:solidFill>
-            <a:tailEnd type="triangle"/>
-          </a:ln>
-        </p:spPr>
-        <p:style>
-          <a:lnRef idx="1">
-            <a:schemeClr val="dk1"/>
-          </a:lnRef>
-          <a:fillRef idx="0">
-            <a:schemeClr val="dk1"/>
-          </a:fillRef>
-          <a:effectRef idx="0">
-            <a:schemeClr val="dk1"/>
-          </a:effectRef>
-          <a:fontRef idx="minor">
-            <a:schemeClr val="tx1"/>
-          </a:fontRef>
-        </p:style>
-      </p:cxnSp>
-      <p:cxnSp>
-        <p:nvCxnSpPr>
-          <p:cNvPr id="66" name="Connecteur droit avec flèche 65"/>
-          <p:cNvCxnSpPr/>
-          <p:nvPr/>
-        </p:nvCxnSpPr>
-        <p:spPr>
-          <a:xfrm>
-            <a:off x="3859370" y="3655863"/>
-            <a:ext cx="432000" cy="247800"/>
+            <a:off x="3994260" y="3150294"/>
+            <a:ext cx="360000" cy="0"/>
           </a:xfrm>
           <a:prstGeom prst="straightConnector1">
             <a:avLst/>
@@ -5199,8 +5422,8 @@
         </p:nvCxnSpPr>
         <p:spPr>
           <a:xfrm flipV="1">
-            <a:off x="3859370" y="2366690"/>
-            <a:ext cx="432000" cy="247800"/>
+            <a:off x="3993182" y="2276264"/>
+            <a:ext cx="361078" cy="216000"/>
           </a:xfrm>
           <a:prstGeom prst="straightConnector1">
             <a:avLst/>
@@ -5232,190 +5455,326 @@
       </p:cxnSp>
       <p:grpSp>
         <p:nvGrpSpPr>
-          <p:cNvPr id="2" name="Groupe 1"/>
+          <p:cNvPr id="3" name="Groupe 2"/>
           <p:cNvGrpSpPr/>
           <p:nvPr/>
         </p:nvGrpSpPr>
         <p:grpSpPr>
           <a:xfrm>
-            <a:off x="2256770" y="2071934"/>
-            <a:ext cx="1502981" cy="2142181"/>
-            <a:chOff x="2256769" y="2709936"/>
-            <a:chExt cx="1502981" cy="2142181"/>
+            <a:off x="2600927" y="2070294"/>
+            <a:ext cx="1296000" cy="2160000"/>
+            <a:chOff x="2379431" y="2071934"/>
+            <a:chExt cx="1296000" cy="2142181"/>
           </a:xfrm>
         </p:grpSpPr>
-        <p:sp>
-          <p:nvSpPr>
-            <p:cNvPr id="63" name="Rectangle 62"/>
-            <p:cNvSpPr/>
+        <p:grpSp>
+          <p:nvGrpSpPr>
+            <p:cNvPr id="2" name="Groupe 1"/>
+            <p:cNvGrpSpPr/>
             <p:nvPr/>
-          </p:nvSpPr>
-          <p:spPr>
+          </p:nvGrpSpPr>
+          <p:grpSpPr>
             <a:xfrm>
-              <a:off x="2256770" y="2709936"/>
-              <a:ext cx="1502980" cy="872358"/>
+              <a:off x="2379431" y="2071934"/>
+              <a:ext cx="1296000" cy="2142181"/>
+              <a:chOff x="2256769" y="2709936"/>
+              <a:chExt cx="1502981" cy="2142181"/>
             </a:xfrm>
-            <a:prstGeom prst="rect">
-              <a:avLst/>
-            </a:prstGeom>
-            <a:solidFill>
-              <a:srgbClr val="E9F2B5"/>
-            </a:solidFill>
-            <a:ln w="19050">
+          </p:grpSpPr>
+          <p:sp>
+            <p:nvSpPr>
+              <p:cNvPr id="63" name="Rectangle 62"/>
+              <p:cNvSpPr/>
+              <p:nvPr/>
+            </p:nvSpPr>
+            <p:spPr>
+              <a:xfrm>
+                <a:off x="2256770" y="2709936"/>
+                <a:ext cx="1502980" cy="872358"/>
+              </a:xfrm>
+              <a:prstGeom prst="rect">
+                <a:avLst/>
+              </a:prstGeom>
               <a:noFill/>
-            </a:ln>
-          </p:spPr>
-          <p:style>
-            <a:lnRef idx="2">
-              <a:schemeClr val="accent1">
-                <a:shade val="50000"/>
-              </a:schemeClr>
-            </a:lnRef>
-            <a:fillRef idx="1">
-              <a:schemeClr val="accent1"/>
-            </a:fillRef>
-            <a:effectRef idx="0">
-              <a:schemeClr val="accent1"/>
-            </a:effectRef>
-            <a:fontRef idx="minor">
-              <a:schemeClr val="lt1"/>
-            </a:fontRef>
-          </p:style>
-          <p:txBody>
-            <a:bodyPr rot="0" spcFirstLastPara="0" vertOverflow="overflow" horzOverflow="overflow" vert="horz" wrap="square" lIns="91440" tIns="45720" rIns="91440" bIns="45720" numCol="1" spcCol="0" rtlCol="0" fromWordArt="0" anchor="ctr" anchorCtr="0" forceAA="0" compatLnSpc="1">
-              <a:prstTxWarp prst="textNoShape">
-                <a:avLst/>
-              </a:prstTxWarp>
-              <a:noAutofit/>
-            </a:bodyPr>
-            <a:lstStyle/>
-            <a:p>
-              <a:pPr algn="ctr">
-                <a:lnSpc>
-                  <a:spcPct val="150000"/>
-                </a:lnSpc>
-              </a:pPr>
-              <a:r>
-                <a:rPr lang="en-US" sz="1150" dirty="0" smtClean="0">
+              <a:ln w="12700">
+                <a:solidFill>
+                  <a:schemeClr val="tx2">
+                    <a:lumMod val="75000"/>
+                  </a:schemeClr>
+                </a:solidFill>
+              </a:ln>
+            </p:spPr>
+            <p:style>
+              <a:lnRef idx="2">
+                <a:schemeClr val="accent1">
+                  <a:shade val="50000"/>
+                </a:schemeClr>
+              </a:lnRef>
+              <a:fillRef idx="1">
+                <a:schemeClr val="accent1"/>
+              </a:fillRef>
+              <a:effectRef idx="0">
+                <a:schemeClr val="accent1"/>
+              </a:effectRef>
+              <a:fontRef idx="minor">
+                <a:schemeClr val="lt1"/>
+              </a:fontRef>
+            </p:style>
+            <p:txBody>
+              <a:bodyPr rot="0" spcFirstLastPara="0" vertOverflow="overflow" horzOverflow="overflow" vert="horz" wrap="square" lIns="91440" tIns="45720" rIns="91440" bIns="45720" numCol="1" spcCol="0" rtlCol="0" fromWordArt="0" anchor="ctr" anchorCtr="0" forceAA="0" compatLnSpc="1">
+                <a:prstTxWarp prst="textNoShape">
+                  <a:avLst/>
+                </a:prstTxWarp>
+                <a:noAutofit/>
+              </a:bodyPr>
+              <a:lstStyle/>
+              <a:p>
+                <a:pPr algn="ctr">
+                  <a:lnSpc>
+                    <a:spcPct val="150000"/>
+                  </a:lnSpc>
+                </a:pPr>
+                <a:r>
+                  <a:rPr lang="en-US" sz="1150" b="1" dirty="0" smtClean="0">
+                    <a:solidFill>
+                      <a:schemeClr val="tx1"/>
+                    </a:solidFill>
+                    <a:latin typeface="Helvetica Neue" panose="02000503000000020004" pitchFamily="50"/>
+                  </a:rPr>
+                  <a:t>PERSONALITY, LIFE-STYLE, CREATIVITY</a:t>
+                </a:r>
+                <a:endParaRPr lang="en-US" sz="1150" b="1" baseline="30000" dirty="0">
                   <a:solidFill>
                     <a:schemeClr val="tx1"/>
                   </a:solidFill>
                   <a:latin typeface="Helvetica Neue" panose="02000503000000020004" pitchFamily="50"/>
-                </a:rPr>
-                <a:t>PERSONALITY, LIFE-STYLE, CREATIVITY</a:t>
-              </a:r>
-              <a:endParaRPr lang="en-US" sz="1150" baseline="30000" dirty="0">
-                <a:solidFill>
-                  <a:schemeClr val="tx1"/>
-                </a:solidFill>
-                <a:latin typeface="Helvetica Neue" panose="02000503000000020004" pitchFamily="50"/>
-              </a:endParaRPr>
-            </a:p>
-          </p:txBody>
-        </p:sp>
-        <p:sp>
-          <p:nvSpPr>
-            <p:cNvPr id="25" name="Rectangle 24"/>
-            <p:cNvSpPr/>
-            <p:nvPr/>
-          </p:nvSpPr>
-          <p:spPr>
-            <a:xfrm>
-              <a:off x="2256769" y="3979759"/>
-              <a:ext cx="1502980" cy="872358"/>
-            </a:xfrm>
-            <a:prstGeom prst="rect">
-              <a:avLst/>
-            </a:prstGeom>
-            <a:solidFill>
-              <a:srgbClr val="C7E7C6"/>
-            </a:solidFill>
-            <a:ln w="19050">
+                </a:endParaRPr>
+              </a:p>
+            </p:txBody>
+          </p:sp>
+          <p:sp>
+            <p:nvSpPr>
+              <p:cNvPr id="25" name="Rectangle 24"/>
+              <p:cNvSpPr/>
+              <p:nvPr/>
+            </p:nvSpPr>
+            <p:spPr>
+              <a:xfrm>
+                <a:off x="2256769" y="3979759"/>
+                <a:ext cx="1502980" cy="872358"/>
+              </a:xfrm>
+              <a:prstGeom prst="rect">
+                <a:avLst/>
+              </a:prstGeom>
               <a:noFill/>
-            </a:ln>
-          </p:spPr>
-          <p:style>
-            <a:lnRef idx="2">
-              <a:schemeClr val="accent1">
-                <a:shade val="50000"/>
-              </a:schemeClr>
-            </a:lnRef>
-            <a:fillRef idx="1">
-              <a:schemeClr val="accent1"/>
-            </a:fillRef>
-            <a:effectRef idx="0">
-              <a:schemeClr val="accent1"/>
-            </a:effectRef>
-            <a:fontRef idx="minor">
-              <a:schemeClr val="lt1"/>
-            </a:fontRef>
-          </p:style>
-          <p:txBody>
-            <a:bodyPr rot="0" spcFirstLastPara="0" vertOverflow="overflow" horzOverflow="overflow" vert="horz" wrap="square" lIns="91440" tIns="45720" rIns="91440" bIns="45720" numCol="1" spcCol="0" rtlCol="0" fromWordArt="0" anchor="ctr" anchorCtr="0" forceAA="0" compatLnSpc="1">
-              <a:prstTxWarp prst="textNoShape">
-                <a:avLst/>
-              </a:prstTxWarp>
-              <a:noAutofit/>
-            </a:bodyPr>
-            <a:lstStyle/>
-            <a:p>
-              <a:pPr algn="ctr">
-                <a:lnSpc>
-                  <a:spcPct val="150000"/>
-                </a:lnSpc>
-              </a:pPr>
-              <a:r>
-                <a:rPr lang="en-US" sz="1150" dirty="0" smtClean="0">
+              <a:ln w="12700">
+                <a:solidFill>
+                  <a:schemeClr val="tx2">
+                    <a:lumMod val="75000"/>
+                  </a:schemeClr>
+                </a:solidFill>
+              </a:ln>
+            </p:spPr>
+            <p:style>
+              <a:lnRef idx="2">
+                <a:schemeClr val="accent1">
+                  <a:shade val="50000"/>
+                </a:schemeClr>
+              </a:lnRef>
+              <a:fillRef idx="1">
+                <a:schemeClr val="accent1"/>
+              </a:fillRef>
+              <a:effectRef idx="0">
+                <a:schemeClr val="accent1"/>
+              </a:effectRef>
+              <a:fontRef idx="minor">
+                <a:schemeClr val="lt1"/>
+              </a:fontRef>
+            </p:style>
+            <p:txBody>
+              <a:bodyPr rot="0" spcFirstLastPara="0" vertOverflow="overflow" horzOverflow="overflow" vert="horz" wrap="square" lIns="91440" tIns="45720" rIns="91440" bIns="45720" numCol="1" spcCol="0" rtlCol="0" fromWordArt="0" anchor="ctr" anchorCtr="0" forceAA="0" compatLnSpc="1">
+                <a:prstTxWarp prst="textNoShape">
+                  <a:avLst/>
+                </a:prstTxWarp>
+                <a:noAutofit/>
+              </a:bodyPr>
+              <a:lstStyle/>
+              <a:p>
+                <a:pPr algn="ctr">
+                  <a:lnSpc>
+                    <a:spcPct val="150000"/>
+                  </a:lnSpc>
+                </a:pPr>
+                <a:r>
+                  <a:rPr lang="en-US" sz="1150" b="1" dirty="0" smtClean="0">
+                    <a:solidFill>
+                      <a:schemeClr val="tx1"/>
+                    </a:solidFill>
+                    <a:latin typeface="Helvetica Neue" panose="02000503000000020004" pitchFamily="50"/>
+                  </a:rPr>
+                  <a:t>BRAIN FUNCTIONING</a:t>
+                </a:r>
+                <a:endParaRPr lang="en-US" sz="1150" b="1" baseline="30000" dirty="0">
                   <a:solidFill>
                     <a:schemeClr val="tx1"/>
                   </a:solidFill>
                   <a:latin typeface="Helvetica Neue" panose="02000503000000020004" pitchFamily="50"/>
-                </a:rPr>
-                <a:t>BRAIN FUNCTIONING</a:t>
-              </a:r>
-              <a:endParaRPr lang="en-US" sz="1150" baseline="30000" dirty="0">
-                <a:solidFill>
-                  <a:schemeClr val="tx1"/>
-                </a:solidFill>
-                <a:latin typeface="Helvetica Neue" panose="02000503000000020004" pitchFamily="50"/>
-              </a:endParaRPr>
-            </a:p>
-          </p:txBody>
-        </p:sp>
+                </a:endParaRPr>
+              </a:p>
+            </p:txBody>
+          </p:sp>
+        </p:grpSp>
+        <p:cxnSp>
+          <p:nvCxnSpPr>
+            <p:cNvPr id="29" name="Connecteur droit avec flèche 28"/>
+            <p:cNvCxnSpPr/>
+            <p:nvPr/>
+          </p:nvCxnSpPr>
+          <p:spPr>
+            <a:xfrm flipV="1">
+              <a:off x="3027430" y="2979638"/>
+              <a:ext cx="0" cy="326773"/>
+            </a:xfrm>
+            <a:prstGeom prst="straightConnector1">
+              <a:avLst/>
+            </a:prstGeom>
+            <a:ln w="28575">
+              <a:solidFill>
+                <a:schemeClr val="tx1">
+                  <a:lumMod val="85000"/>
+                  <a:lumOff val="15000"/>
+                </a:schemeClr>
+              </a:solidFill>
+              <a:headEnd type="triangle" w="med" len="med"/>
+              <a:tailEnd type="triangle" w="med" len="med"/>
+            </a:ln>
+          </p:spPr>
+          <p:style>
+            <a:lnRef idx="3">
+              <a:schemeClr val="dk1"/>
+            </a:lnRef>
+            <a:fillRef idx="0">
+              <a:schemeClr val="dk1"/>
+            </a:fillRef>
+            <a:effectRef idx="2">
+              <a:schemeClr val="dk1"/>
+            </a:effectRef>
+            <a:fontRef idx="minor">
+              <a:schemeClr val="tx1"/>
+            </a:fontRef>
+          </p:style>
+        </p:cxnSp>
       </p:grpSp>
       <p:cxnSp>
         <p:nvCxnSpPr>
-          <p:cNvPr id="29" name="Connecteur droit avec flèche 28"/>
+          <p:cNvPr id="16" name="Connecteur droit avec flèche 15"/>
           <p:cNvCxnSpPr/>
           <p:nvPr/>
         </p:nvCxnSpPr>
         <p:spPr>
-          <a:xfrm flipV="1">
-            <a:off x="2999365" y="3007288"/>
-            <a:ext cx="0" cy="288000"/>
+          <a:xfrm>
+            <a:off x="7982857" y="3151599"/>
+            <a:ext cx="324000" cy="0"/>
           </a:xfrm>
           <a:prstGeom prst="straightConnector1">
             <a:avLst/>
           </a:prstGeom>
-          <a:ln w="19050">
+          <a:ln w="28575">
             <a:solidFill>
               <a:schemeClr val="tx1">
                 <a:lumMod val="85000"/>
                 <a:lumOff val="15000"/>
               </a:schemeClr>
             </a:solidFill>
-            <a:headEnd type="triangle" w="med" len="med"/>
-            <a:tailEnd type="triangle" w="med" len="med"/>
+            <a:tailEnd type="triangle"/>
           </a:ln>
         </p:spPr>
         <p:style>
-          <a:lnRef idx="3">
+          <a:lnRef idx="1">
             <a:schemeClr val="dk1"/>
           </a:lnRef>
           <a:fillRef idx="0">
             <a:schemeClr val="dk1"/>
           </a:fillRef>
-          <a:effectRef idx="2">
+          <a:effectRef idx="0">
+            <a:schemeClr val="dk1"/>
+          </a:effectRef>
+          <a:fontRef idx="minor">
+            <a:schemeClr val="tx1"/>
+          </a:fontRef>
+        </p:style>
+      </p:cxnSp>
+      <p:cxnSp>
+        <p:nvCxnSpPr>
+          <p:cNvPr id="32" name="Connecteur droit avec flèche 31"/>
+          <p:cNvCxnSpPr/>
+          <p:nvPr/>
+        </p:nvCxnSpPr>
+        <p:spPr>
+          <a:xfrm>
+            <a:off x="3987020" y="3789607"/>
+            <a:ext cx="361078" cy="216000"/>
+          </a:xfrm>
+          <a:prstGeom prst="straightConnector1">
+            <a:avLst/>
+          </a:prstGeom>
+          <a:ln w="28575">
+            <a:solidFill>
+              <a:schemeClr val="tx1">
+                <a:lumMod val="85000"/>
+                <a:lumOff val="15000"/>
+              </a:schemeClr>
+            </a:solidFill>
+            <a:tailEnd type="triangle"/>
+          </a:ln>
+        </p:spPr>
+        <p:style>
+          <a:lnRef idx="1">
+            <a:schemeClr val="dk1"/>
+          </a:lnRef>
+          <a:fillRef idx="0">
+            <a:schemeClr val="dk1"/>
+          </a:fillRef>
+          <a:effectRef idx="0">
+            <a:schemeClr val="dk1"/>
+          </a:effectRef>
+          <a:fontRef idx="minor">
+            <a:schemeClr val="tx1"/>
+          </a:fontRef>
+        </p:style>
+      </p:cxnSp>
+      <p:cxnSp>
+        <p:nvCxnSpPr>
+          <p:cNvPr id="33" name="Connecteur droit avec flèche 32"/>
+          <p:cNvCxnSpPr/>
+          <p:nvPr/>
+        </p:nvCxnSpPr>
+        <p:spPr>
+          <a:xfrm>
+            <a:off x="5956085" y="2312471"/>
+            <a:ext cx="345492" cy="259181"/>
+          </a:xfrm>
+          <a:prstGeom prst="straightConnector1">
+            <a:avLst/>
+          </a:prstGeom>
+          <a:ln w="28575">
+            <a:solidFill>
+              <a:schemeClr val="tx1">
+                <a:lumMod val="85000"/>
+                <a:lumOff val="15000"/>
+              </a:schemeClr>
+            </a:solidFill>
+            <a:tailEnd type="triangle"/>
+          </a:ln>
+        </p:spPr>
+        <p:style>
+          <a:lnRef idx="1">
+            <a:schemeClr val="dk1"/>
+          </a:lnRef>
+          <a:fillRef idx="0">
+            <a:schemeClr val="dk1"/>
+          </a:fillRef>
+          <a:effectRef idx="0">
             <a:schemeClr val="dk1"/>
           </a:effectRef>
           <a:fontRef idx="minor">
@@ -5426,7 +5785,7 @@
     </p:spTree>
     <p:extLst>
       <p:ext uri="{BB962C8B-B14F-4D97-AF65-F5344CB8AC3E}">
-        <p14:creationId xmlns:p14="http://schemas.microsoft.com/office/powerpoint/2010/main" val="2935773351"/>
+        <p14:creationId xmlns:p14="http://schemas.microsoft.com/office/powerpoint/2010/main" val="2895864941"/>
       </p:ext>
     </p:extLst>
   </p:cSld>
@@ -5505,13 +5864,13 @@
               </a:lnSpc>
             </a:pPr>
             <a:r>
-              <a:rPr lang="en-US" sz="1150" dirty="0" smtClean="0">
+              <a:rPr lang="en-US" sz="1150" smtClean="0">
                 <a:solidFill>
                   <a:schemeClr val="tx1"/>
                 </a:solidFill>
                 <a:latin typeface="Helvetica Neue" panose="02000503000000020004" pitchFamily="50"/>
               </a:rPr>
-              <a:t>NOCTURNAL AWAKENINGS</a:t>
+              <a:t>INTRA-SLEEP AWAKENINGS</a:t>
             </a:r>
             <a:endParaRPr lang="en-US" sz="1150" baseline="30000" dirty="0">
               <a:solidFill>
@@ -5618,7 +5977,7 @@
               <a:rPr lang="en-US" sz="1150" dirty="0" smtClean="0">
                 <a:latin typeface="Helvetica Neue" panose="02000503000000020004" pitchFamily="50"/>
               </a:rPr>
-              <a:t>Interference</a:t>
+              <a:t>Sleep inertia</a:t>
             </a:r>
             <a:endParaRPr lang="en-US" sz="1150" baseline="30000" dirty="0">
               <a:latin typeface="Helvetica Neue" panose="02000503000000020004" pitchFamily="50"/>
@@ -5653,19 +6012,7 @@
               <a:rPr lang="en-US" sz="1150" dirty="0" smtClean="0">
                 <a:latin typeface="Helvetica Neue" panose="02000503000000020004" pitchFamily="50"/>
               </a:rPr>
-              <a:t>Interest </a:t>
-            </a:r>
-            <a:r>
-              <a:rPr lang="en-US" sz="1150" dirty="0">
-                <a:latin typeface="Helvetica Neue" panose="02000503000000020004" pitchFamily="50"/>
-              </a:rPr>
-              <a:t>in </a:t>
-            </a:r>
-            <a:r>
-              <a:rPr lang="en-US" sz="1150" dirty="0" smtClean="0">
-                <a:latin typeface="Helvetica Neue" panose="02000503000000020004" pitchFamily="50"/>
-              </a:rPr>
-              <a:t>dreams </a:t>
+              <a:t>Physiological context</a:t>
             </a:r>
             <a:endParaRPr lang="en-US" sz="1150" baseline="30000" dirty="0">
               <a:latin typeface="Helvetica Neue" panose="02000503000000020004" pitchFamily="50"/>
@@ -5848,7 +6195,7 @@
                 </a:solidFill>
                 <a:latin typeface="Helvetica Neue" panose="02000503000000020004" pitchFamily="50"/>
               </a:rPr>
-              <a:t>BRAIN FUNCTIONING</a:t>
+              <a:t>BRAIN REACTIVITY TO STIMULI</a:t>
             </a:r>
             <a:endParaRPr lang="en-US" sz="1150" baseline="30000" dirty="0">
               <a:solidFill>
@@ -6033,7 +6380,7 @@
               <a:rPr lang="en-US" sz="1150" dirty="0" smtClean="0">
                 <a:latin typeface="Helvetica Neue" panose="02000503000000020004" pitchFamily="50"/>
               </a:rPr>
-              <a:t>Sleep inertia</a:t>
+              <a:t>Interference</a:t>
             </a:r>
             <a:endParaRPr lang="en-US" sz="1150" dirty="0">
               <a:latin typeface="Helvetica Neue" panose="02000503000000020004" pitchFamily="50"/>
@@ -6050,12 +6397,12 @@
         <p:spPr>
           <a:xfrm flipV="1">
             <a:off x="5188158" y="3637864"/>
-            <a:ext cx="0" cy="252000"/>
+            <a:ext cx="0" cy="288000"/>
           </a:xfrm>
           <a:prstGeom prst="straightConnector1">
             <a:avLst/>
           </a:prstGeom>
-          <a:ln w="12700">
+          <a:ln w="19050">
             <a:solidFill>
               <a:schemeClr val="tx1">
                 <a:lumMod val="85000"/>
@@ -6246,8 +6593,8 @@
         </p:nvSpPr>
         <p:spPr>
           <a:xfrm>
-            <a:off x="6616566" y="1367608"/>
-            <a:ext cx="1502979" cy="461665"/>
+            <a:off x="6616566" y="1542588"/>
+            <a:ext cx="1502979" cy="269304"/>
           </a:xfrm>
           <a:prstGeom prst="rect">
             <a:avLst/>
@@ -6265,7 +6612,7 @@
               <a:rPr lang="en-US" sz="1150" dirty="0" smtClean="0">
                 <a:latin typeface="Helvetica Neue" panose="02000503000000020004" pitchFamily="50"/>
               </a:rPr>
-              <a:t>Physiological context</a:t>
+              <a:t>Interest in dreams</a:t>
             </a:r>
             <a:endParaRPr lang="en-US" sz="1150" baseline="30000" dirty="0">
               <a:latin typeface="Helvetica Neue" panose="02000503000000020004" pitchFamily="50"/>
@@ -6312,75 +6659,6 @@
           </a:fontRef>
         </p:style>
       </p:cxnSp>
-      <p:sp>
-        <p:nvSpPr>
-          <p:cNvPr id="63" name="Rectangle 62"/>
-          <p:cNvSpPr/>
-          <p:nvPr/>
-        </p:nvSpPr>
-        <p:spPr>
-          <a:xfrm>
-            <a:off x="2256770" y="2709936"/>
-            <a:ext cx="1502980" cy="872358"/>
-          </a:xfrm>
-          <a:prstGeom prst="rect">
-            <a:avLst/>
-          </a:prstGeom>
-          <a:solidFill>
-            <a:srgbClr val="E9F2B5"/>
-          </a:solidFill>
-          <a:ln w="19050">
-            <a:noFill/>
-          </a:ln>
-        </p:spPr>
-        <p:style>
-          <a:lnRef idx="2">
-            <a:schemeClr val="accent1">
-              <a:shade val="50000"/>
-            </a:schemeClr>
-          </a:lnRef>
-          <a:fillRef idx="1">
-            <a:schemeClr val="accent1"/>
-          </a:fillRef>
-          <a:effectRef idx="0">
-            <a:schemeClr val="accent1"/>
-          </a:effectRef>
-          <a:fontRef idx="minor">
-            <a:schemeClr val="lt1"/>
-          </a:fontRef>
-        </p:style>
-        <p:txBody>
-          <a:bodyPr rot="0" spcFirstLastPara="0" vertOverflow="overflow" horzOverflow="overflow" vert="horz" wrap="square" lIns="91440" tIns="45720" rIns="91440" bIns="45720" numCol="1" spcCol="0" rtlCol="0" fromWordArt="0" anchor="ctr" anchorCtr="0" forceAA="0" compatLnSpc="1">
-            <a:prstTxWarp prst="textNoShape">
-              <a:avLst/>
-            </a:prstTxWarp>
-            <a:noAutofit/>
-          </a:bodyPr>
-          <a:lstStyle/>
-          <a:p>
-            <a:pPr algn="ctr">
-              <a:lnSpc>
-                <a:spcPct val="150000"/>
-              </a:lnSpc>
-            </a:pPr>
-            <a:r>
-              <a:rPr lang="en-US" sz="1150" dirty="0" smtClean="0">
-                <a:solidFill>
-                  <a:schemeClr val="tx1"/>
-                </a:solidFill>
-                <a:latin typeface="Helvetica Neue" panose="02000503000000020004" pitchFamily="50"/>
-              </a:rPr>
-              <a:t>PERSONALITY, LIFE-STYLE, CREATIVITY</a:t>
-            </a:r>
-            <a:endParaRPr lang="en-US" sz="1150" baseline="30000" dirty="0">
-              <a:solidFill>
-                <a:schemeClr val="tx1"/>
-              </a:solidFill>
-              <a:latin typeface="Helvetica Neue" panose="02000503000000020004" pitchFamily="50"/>
-            </a:endParaRPr>
-          </a:p>
-        </p:txBody>
-      </p:sp>
       <p:cxnSp>
         <p:nvCxnSpPr>
           <p:cNvPr id="64" name="Connecteur droit avec flèche 63"/>
@@ -6498,10 +6776,203 @@
           </a:fontRef>
         </p:style>
       </p:cxnSp>
+      <p:grpSp>
+        <p:nvGrpSpPr>
+          <p:cNvPr id="2" name="Groupe 1"/>
+          <p:cNvGrpSpPr/>
+          <p:nvPr/>
+        </p:nvGrpSpPr>
+        <p:grpSpPr>
+          <a:xfrm>
+            <a:off x="2256770" y="2071934"/>
+            <a:ext cx="1502981" cy="2142181"/>
+            <a:chOff x="2256769" y="2709936"/>
+            <a:chExt cx="1502981" cy="2142181"/>
+          </a:xfrm>
+        </p:grpSpPr>
+        <p:sp>
+          <p:nvSpPr>
+            <p:cNvPr id="63" name="Rectangle 62"/>
+            <p:cNvSpPr/>
+            <p:nvPr/>
+          </p:nvSpPr>
+          <p:spPr>
+            <a:xfrm>
+              <a:off x="2256770" y="2709936"/>
+              <a:ext cx="1502980" cy="872358"/>
+            </a:xfrm>
+            <a:prstGeom prst="rect">
+              <a:avLst/>
+            </a:prstGeom>
+            <a:solidFill>
+              <a:srgbClr val="E9F2B5"/>
+            </a:solidFill>
+            <a:ln w="19050">
+              <a:noFill/>
+            </a:ln>
+          </p:spPr>
+          <p:style>
+            <a:lnRef idx="2">
+              <a:schemeClr val="accent1">
+                <a:shade val="50000"/>
+              </a:schemeClr>
+            </a:lnRef>
+            <a:fillRef idx="1">
+              <a:schemeClr val="accent1"/>
+            </a:fillRef>
+            <a:effectRef idx="0">
+              <a:schemeClr val="accent1"/>
+            </a:effectRef>
+            <a:fontRef idx="minor">
+              <a:schemeClr val="lt1"/>
+            </a:fontRef>
+          </p:style>
+          <p:txBody>
+            <a:bodyPr rot="0" spcFirstLastPara="0" vertOverflow="overflow" horzOverflow="overflow" vert="horz" wrap="square" lIns="91440" tIns="45720" rIns="91440" bIns="45720" numCol="1" spcCol="0" rtlCol="0" fromWordArt="0" anchor="ctr" anchorCtr="0" forceAA="0" compatLnSpc="1">
+              <a:prstTxWarp prst="textNoShape">
+                <a:avLst/>
+              </a:prstTxWarp>
+              <a:noAutofit/>
+            </a:bodyPr>
+            <a:lstStyle/>
+            <a:p>
+              <a:pPr algn="ctr">
+                <a:lnSpc>
+                  <a:spcPct val="150000"/>
+                </a:lnSpc>
+              </a:pPr>
+              <a:r>
+                <a:rPr lang="en-US" sz="1150" dirty="0" smtClean="0">
+                  <a:solidFill>
+                    <a:schemeClr val="tx1"/>
+                  </a:solidFill>
+                  <a:latin typeface="Helvetica Neue" panose="02000503000000020004" pitchFamily="50"/>
+                </a:rPr>
+                <a:t>PERSONALITY, LIFE-STYLE, CREATIVITY</a:t>
+              </a:r>
+              <a:endParaRPr lang="en-US" sz="1150" baseline="30000" dirty="0">
+                <a:solidFill>
+                  <a:schemeClr val="tx1"/>
+                </a:solidFill>
+                <a:latin typeface="Helvetica Neue" panose="02000503000000020004" pitchFamily="50"/>
+              </a:endParaRPr>
+            </a:p>
+          </p:txBody>
+        </p:sp>
+        <p:sp>
+          <p:nvSpPr>
+            <p:cNvPr id="25" name="Rectangle 24"/>
+            <p:cNvSpPr/>
+            <p:nvPr/>
+          </p:nvSpPr>
+          <p:spPr>
+            <a:xfrm>
+              <a:off x="2256769" y="3979759"/>
+              <a:ext cx="1502980" cy="872358"/>
+            </a:xfrm>
+            <a:prstGeom prst="rect">
+              <a:avLst/>
+            </a:prstGeom>
+            <a:solidFill>
+              <a:srgbClr val="C7E7C6"/>
+            </a:solidFill>
+            <a:ln w="19050">
+              <a:noFill/>
+            </a:ln>
+          </p:spPr>
+          <p:style>
+            <a:lnRef idx="2">
+              <a:schemeClr val="accent1">
+                <a:shade val="50000"/>
+              </a:schemeClr>
+            </a:lnRef>
+            <a:fillRef idx="1">
+              <a:schemeClr val="accent1"/>
+            </a:fillRef>
+            <a:effectRef idx="0">
+              <a:schemeClr val="accent1"/>
+            </a:effectRef>
+            <a:fontRef idx="minor">
+              <a:schemeClr val="lt1"/>
+            </a:fontRef>
+          </p:style>
+          <p:txBody>
+            <a:bodyPr rot="0" spcFirstLastPara="0" vertOverflow="overflow" horzOverflow="overflow" vert="horz" wrap="square" lIns="91440" tIns="45720" rIns="91440" bIns="45720" numCol="1" spcCol="0" rtlCol="0" fromWordArt="0" anchor="ctr" anchorCtr="0" forceAA="0" compatLnSpc="1">
+              <a:prstTxWarp prst="textNoShape">
+                <a:avLst/>
+              </a:prstTxWarp>
+              <a:noAutofit/>
+            </a:bodyPr>
+            <a:lstStyle/>
+            <a:p>
+              <a:pPr algn="ctr">
+                <a:lnSpc>
+                  <a:spcPct val="150000"/>
+                </a:lnSpc>
+              </a:pPr>
+              <a:r>
+                <a:rPr lang="en-US" sz="1150" dirty="0" smtClean="0">
+                  <a:solidFill>
+                    <a:schemeClr val="tx1"/>
+                  </a:solidFill>
+                  <a:latin typeface="Helvetica Neue" panose="02000503000000020004" pitchFamily="50"/>
+                </a:rPr>
+                <a:t>BRAIN FUNCTIONING</a:t>
+              </a:r>
+              <a:endParaRPr lang="en-US" sz="1150" baseline="30000" dirty="0">
+                <a:solidFill>
+                  <a:schemeClr val="tx1"/>
+                </a:solidFill>
+                <a:latin typeface="Helvetica Neue" panose="02000503000000020004" pitchFamily="50"/>
+              </a:endParaRPr>
+            </a:p>
+          </p:txBody>
+        </p:sp>
+      </p:grpSp>
+      <p:cxnSp>
+        <p:nvCxnSpPr>
+          <p:cNvPr id="29" name="Connecteur droit avec flèche 28"/>
+          <p:cNvCxnSpPr/>
+          <p:nvPr/>
+        </p:nvCxnSpPr>
+        <p:spPr>
+          <a:xfrm flipV="1">
+            <a:off x="2999365" y="3007288"/>
+            <a:ext cx="0" cy="288000"/>
+          </a:xfrm>
+          <a:prstGeom prst="straightConnector1">
+            <a:avLst/>
+          </a:prstGeom>
+          <a:ln w="19050">
+            <a:solidFill>
+              <a:schemeClr val="tx1">
+                <a:lumMod val="85000"/>
+                <a:lumOff val="15000"/>
+              </a:schemeClr>
+            </a:solidFill>
+            <a:headEnd type="triangle" w="med" len="med"/>
+            <a:tailEnd type="triangle" w="med" len="med"/>
+          </a:ln>
+        </p:spPr>
+        <p:style>
+          <a:lnRef idx="3">
+            <a:schemeClr val="dk1"/>
+          </a:lnRef>
+          <a:fillRef idx="0">
+            <a:schemeClr val="dk1"/>
+          </a:fillRef>
+          <a:effectRef idx="2">
+            <a:schemeClr val="dk1"/>
+          </a:effectRef>
+          <a:fontRef idx="minor">
+            <a:schemeClr val="tx1"/>
+          </a:fontRef>
+        </p:style>
+      </p:cxnSp>
     </p:spTree>
     <p:extLst>
       <p:ext uri="{BB962C8B-B14F-4D97-AF65-F5344CB8AC3E}">
-        <p14:creationId xmlns:p14="http://schemas.microsoft.com/office/powerpoint/2010/main" val="859260222"/>
+        <p14:creationId xmlns:p14="http://schemas.microsoft.com/office/powerpoint/2010/main" val="2935773351"/>
       </p:ext>
     </p:extLst>
   </p:cSld>
@@ -8432,920 +8903,6 @@
 </file>
 
 <file path=ppt/slides/slide5.xml><?xml version="1.0" encoding="utf-8"?>
-<p:sld xmlns:a="http://schemas.openxmlformats.org/drawingml/2006/main" xmlns:r="http://schemas.openxmlformats.org/officeDocument/2006/relationships" xmlns:p="http://schemas.openxmlformats.org/presentationml/2006/main">
-  <p:cSld>
-    <p:spTree>
-      <p:nvGrpSpPr>
-        <p:cNvPr id="1" name=""/>
-        <p:cNvGrpSpPr/>
-        <p:nvPr/>
-      </p:nvGrpSpPr>
-      <p:grpSpPr>
-        <a:xfrm>
-          <a:off x="0" y="0"/>
-          <a:ext cx="0" cy="0"/>
-          <a:chOff x="0" y="0"/>
-          <a:chExt cx="0" cy="0"/>
-        </a:xfrm>
-      </p:grpSpPr>
-      <p:sp>
-        <p:nvSpPr>
-          <p:cNvPr id="26" name="Rectangle 25"/>
-          <p:cNvSpPr/>
-          <p:nvPr/>
-        </p:nvSpPr>
-        <p:spPr>
-          <a:xfrm>
-            <a:off x="3255653" y="2881539"/>
-            <a:ext cx="2787347" cy="872358"/>
-          </a:xfrm>
-          <a:prstGeom prst="rect">
-            <a:avLst/>
-          </a:prstGeom>
-          <a:solidFill>
-            <a:srgbClr val="61567C"/>
-          </a:solidFill>
-          <a:ln w="19050">
-            <a:noFill/>
-          </a:ln>
-        </p:spPr>
-        <p:style>
-          <a:lnRef idx="2">
-            <a:schemeClr val="accent1">
-              <a:shade val="50000"/>
-            </a:schemeClr>
-          </a:lnRef>
-          <a:fillRef idx="1">
-            <a:schemeClr val="accent1"/>
-          </a:fillRef>
-          <a:effectRef idx="0">
-            <a:schemeClr val="accent1"/>
-          </a:effectRef>
-          <a:fontRef idx="minor">
-            <a:schemeClr val="lt1"/>
-          </a:fontRef>
-        </p:style>
-        <p:txBody>
-          <a:bodyPr rot="0" spcFirstLastPara="0" vertOverflow="overflow" horzOverflow="overflow" vert="horz" wrap="square" lIns="91440" tIns="45720" rIns="91440" bIns="45720" numCol="1" spcCol="0" rtlCol="0" fromWordArt="0" anchor="t" anchorCtr="0" forceAA="0" compatLnSpc="1">
-            <a:prstTxWarp prst="textNoShape">
-              <a:avLst/>
-            </a:prstTxWarp>
-            <a:noAutofit/>
-          </a:bodyPr>
-          <a:lstStyle/>
-          <a:p>
-            <a:pPr algn="ctr">
-              <a:spcAft>
-                <a:spcPts val="600"/>
-              </a:spcAft>
-            </a:pPr>
-            <a:r>
-              <a:rPr lang="en-US" sz="1200" b="1" dirty="0" smtClean="0">
-                <a:solidFill>
-                  <a:schemeClr val="bg1"/>
-                </a:solidFill>
-                <a:latin typeface="Helvetica Neue" panose="02000503000000020004" pitchFamily="50"/>
-              </a:rPr>
-              <a:t>DREAM CONTENT</a:t>
-            </a:r>
-          </a:p>
-          <a:p>
-            <a:pPr marL="171450" indent="-171450" algn="just">
-              <a:buFont typeface="Lato" panose="020F0502020204030203" pitchFamily="34" charset="0"/>
-              <a:buChar char="–"/>
-            </a:pPr>
-            <a:r>
-              <a:rPr lang="en-US" sz="1200" dirty="0" smtClean="0">
-                <a:solidFill>
-                  <a:schemeClr val="bg1"/>
-                </a:solidFill>
-                <a:latin typeface="Helvetica Neue" panose="02000503000000020004" pitchFamily="50"/>
-                <a:sym typeface="Wingdings" panose="05000000000000000000" pitchFamily="2" charset="2"/>
-              </a:rPr>
-              <a:t>Salience</a:t>
-            </a:r>
-          </a:p>
-          <a:p>
-            <a:pPr marL="171450" indent="-171450" algn="just">
-              <a:buFont typeface="Lato" panose="020F0502020204030203" pitchFamily="34" charset="0"/>
-              <a:buChar char="–"/>
-            </a:pPr>
-            <a:r>
-              <a:rPr lang="en-US" sz="1200" dirty="0" smtClean="0">
-                <a:solidFill>
-                  <a:schemeClr val="bg1"/>
-                </a:solidFill>
-                <a:latin typeface="Helvetica Neue" panose="02000503000000020004" pitchFamily="50"/>
-                <a:sym typeface="Wingdings" panose="05000000000000000000" pitchFamily="2" charset="2"/>
-              </a:rPr>
-              <a:t>Creativity</a:t>
-            </a:r>
-          </a:p>
-        </p:txBody>
-      </p:sp>
-      <p:grpSp>
-        <p:nvGrpSpPr>
-          <p:cNvPr id="51" name="Groupe 50"/>
-          <p:cNvGrpSpPr/>
-          <p:nvPr/>
-        </p:nvGrpSpPr>
-        <p:grpSpPr>
-          <a:xfrm>
-            <a:off x="12052801" y="698611"/>
-            <a:ext cx="1311519" cy="1463458"/>
-            <a:chOff x="10828802" y="1497165"/>
-            <a:chExt cx="1311519" cy="1463458"/>
-          </a:xfrm>
-        </p:grpSpPr>
-        <p:pic>
-          <p:nvPicPr>
-            <p:cNvPr id="52" name="Image 51"/>
-            <p:cNvPicPr>
-              <a:picLocks noChangeAspect="1"/>
-            </p:cNvPicPr>
-            <p:nvPr/>
-          </p:nvPicPr>
-          <p:blipFill>
-            <a:blip r:embed="rId2" cstate="print">
-              <a:extLst>
-                <a:ext uri="{28A0092B-C50C-407E-A947-70E740481C1C}">
-                  <a14:useLocalDpi xmlns:a14="http://schemas.microsoft.com/office/drawing/2010/main" val="0"/>
-                </a:ext>
-              </a:extLst>
-            </a:blip>
-            <a:stretch>
-              <a:fillRect/>
-            </a:stretch>
-          </p:blipFill>
-          <p:spPr>
-            <a:xfrm>
-              <a:off x="11060321" y="1497165"/>
-              <a:ext cx="1080000" cy="1080000"/>
-            </a:xfrm>
-            <a:prstGeom prst="rect">
-              <a:avLst/>
-            </a:prstGeom>
-          </p:spPr>
-        </p:pic>
-        <p:sp>
-          <p:nvSpPr>
-            <p:cNvPr id="53" name="Rectangle 52"/>
-            <p:cNvSpPr/>
-            <p:nvPr/>
-          </p:nvSpPr>
-          <p:spPr>
-            <a:xfrm>
-              <a:off x="10828802" y="2528623"/>
-              <a:ext cx="1224000" cy="432000"/>
-            </a:xfrm>
-            <a:prstGeom prst="rect">
-              <a:avLst/>
-            </a:prstGeom>
-            <a:solidFill>
-              <a:schemeClr val="bg1"/>
-            </a:solidFill>
-            <a:ln w="19050">
-              <a:noFill/>
-            </a:ln>
-          </p:spPr>
-          <p:style>
-            <a:lnRef idx="2">
-              <a:schemeClr val="accent1">
-                <a:shade val="50000"/>
-              </a:schemeClr>
-            </a:lnRef>
-            <a:fillRef idx="1">
-              <a:schemeClr val="accent1"/>
-            </a:fillRef>
-            <a:effectRef idx="0">
-              <a:schemeClr val="accent1"/>
-            </a:effectRef>
-            <a:fontRef idx="minor">
-              <a:schemeClr val="lt1"/>
-            </a:fontRef>
-          </p:style>
-          <p:txBody>
-            <a:bodyPr rot="0" spcFirstLastPara="0" vertOverflow="overflow" horzOverflow="overflow" vert="horz" wrap="square" lIns="91440" tIns="45720" rIns="91440" bIns="45720" numCol="1" spcCol="0" rtlCol="0" fromWordArt="0" anchor="t" anchorCtr="0" forceAA="0" compatLnSpc="1">
-              <a:prstTxWarp prst="textNoShape">
-                <a:avLst/>
-              </a:prstTxWarp>
-              <a:noAutofit/>
-            </a:bodyPr>
-            <a:lstStyle/>
-            <a:p>
-              <a:pPr algn="ctr"/>
-              <a:r>
-                <a:rPr lang="en-US" sz="1200" b="1" dirty="0" smtClean="0">
-                  <a:solidFill>
-                    <a:srgbClr val="C82829"/>
-                  </a:solidFill>
-                  <a:latin typeface="Helvetica Neue" panose="02000503000000020004" pitchFamily="50"/>
-                </a:rPr>
-                <a:t>HIGH DREAM</a:t>
-              </a:r>
-            </a:p>
-            <a:p>
-              <a:pPr algn="ctr"/>
-              <a:r>
-                <a:rPr lang="en-US" sz="1200" b="1" dirty="0" smtClean="0">
-                  <a:solidFill>
-                    <a:srgbClr val="C82829"/>
-                  </a:solidFill>
-                  <a:latin typeface="Helvetica Neue" panose="02000503000000020004" pitchFamily="50"/>
-                </a:rPr>
-                <a:t>RECALLERS</a:t>
-              </a:r>
-              <a:endParaRPr lang="en-US" sz="1200" b="1" dirty="0">
-                <a:solidFill>
-                  <a:srgbClr val="C82829"/>
-                </a:solidFill>
-                <a:latin typeface="Helvetica Neue" panose="02000503000000020004" pitchFamily="50"/>
-              </a:endParaRPr>
-            </a:p>
-          </p:txBody>
-        </p:sp>
-      </p:grpSp>
-      <p:sp>
-        <p:nvSpPr>
-          <p:cNvPr id="10" name="ZoneTexte 9"/>
-          <p:cNvSpPr txBox="1"/>
-          <p:nvPr/>
-        </p:nvSpPr>
-        <p:spPr>
-          <a:xfrm>
-            <a:off x="3256101" y="1430340"/>
-            <a:ext cx="2772000" cy="369332"/>
-          </a:xfrm>
-          <a:prstGeom prst="rect">
-            <a:avLst/>
-          </a:prstGeom>
-          <a:noFill/>
-        </p:spPr>
-        <p:txBody>
-          <a:bodyPr wrap="square" rtlCol="0">
-            <a:spAutoFit/>
-          </a:bodyPr>
-          <a:lstStyle/>
-          <a:p>
-            <a:r>
-              <a:rPr lang="en-US" dirty="0" smtClean="0">
-                <a:latin typeface="Helvetica Neue" panose="02000503000000020004" pitchFamily="50"/>
-              </a:rPr>
-              <a:t>	SLEEP</a:t>
-            </a:r>
-            <a:endParaRPr lang="en-US" dirty="0">
-              <a:latin typeface="Helvetica Neue" panose="02000503000000020004" pitchFamily="50"/>
-            </a:endParaRPr>
-          </a:p>
-        </p:txBody>
-      </p:sp>
-      <p:sp>
-        <p:nvSpPr>
-          <p:cNvPr id="38" name="ZoneTexte 37"/>
-          <p:cNvSpPr txBox="1"/>
-          <p:nvPr/>
-        </p:nvSpPr>
-        <p:spPr>
-          <a:xfrm>
-            <a:off x="6632033" y="1431836"/>
-            <a:ext cx="2772000" cy="369332"/>
-          </a:xfrm>
-          <a:prstGeom prst="rect">
-            <a:avLst/>
-          </a:prstGeom>
-          <a:noFill/>
-        </p:spPr>
-        <p:txBody>
-          <a:bodyPr wrap="square" rtlCol="0">
-            <a:spAutoFit/>
-          </a:bodyPr>
-          <a:lstStyle/>
-          <a:p>
-            <a:r>
-              <a:rPr lang="en-US" dirty="0" smtClean="0">
-                <a:latin typeface="Helvetica Neue" panose="02000503000000020004" pitchFamily="50"/>
-              </a:rPr>
-              <a:t>	WAKEFULNESS</a:t>
-            </a:r>
-            <a:endParaRPr lang="en-US" dirty="0">
-              <a:latin typeface="Helvetica Neue" panose="02000503000000020004" pitchFamily="50"/>
-            </a:endParaRPr>
-          </a:p>
-        </p:txBody>
-      </p:sp>
-      <p:pic>
-        <p:nvPicPr>
-          <p:cNvPr id="14" name="Image 13"/>
-          <p:cNvPicPr>
-            <a:picLocks noChangeAspect="1"/>
-          </p:cNvPicPr>
-          <p:nvPr/>
-        </p:nvPicPr>
-        <p:blipFill rotWithShape="1">
-          <a:blip r:embed="rId3" cstate="print">
-            <a:extLst>
-              <a:ext uri="{28A0092B-C50C-407E-A947-70E740481C1C}">
-                <a14:useLocalDpi xmlns:a14="http://schemas.microsoft.com/office/drawing/2010/main" val="0"/>
-              </a:ext>
-            </a:extLst>
-          </a:blip>
-          <a:srcRect b="9428"/>
-          <a:stretch/>
-        </p:blipFill>
-        <p:spPr>
-          <a:xfrm>
-            <a:off x="6632577" y="1229240"/>
-            <a:ext cx="720000" cy="652111"/>
-          </a:xfrm>
-          <a:prstGeom prst="rect">
-            <a:avLst/>
-          </a:prstGeom>
-        </p:spPr>
-      </p:pic>
-      <p:sp>
-        <p:nvSpPr>
-          <p:cNvPr id="48" name="Rectangle 47"/>
-          <p:cNvSpPr/>
-          <p:nvPr/>
-        </p:nvSpPr>
-        <p:spPr>
-          <a:xfrm>
-            <a:off x="3255653" y="4318076"/>
-            <a:ext cx="2787347" cy="872358"/>
-          </a:xfrm>
-          <a:prstGeom prst="rect">
-            <a:avLst/>
-          </a:prstGeom>
-          <a:solidFill>
-            <a:srgbClr val="4B84AF"/>
-          </a:solidFill>
-          <a:ln w="19050">
-            <a:noFill/>
-          </a:ln>
-        </p:spPr>
-        <p:style>
-          <a:lnRef idx="2">
-            <a:schemeClr val="accent1">
-              <a:shade val="50000"/>
-            </a:schemeClr>
-          </a:lnRef>
-          <a:fillRef idx="1">
-            <a:schemeClr val="accent1"/>
-          </a:fillRef>
-          <a:effectRef idx="0">
-            <a:schemeClr val="accent1"/>
-          </a:effectRef>
-          <a:fontRef idx="minor">
-            <a:schemeClr val="lt1"/>
-          </a:fontRef>
-        </p:style>
-        <p:txBody>
-          <a:bodyPr rot="0" spcFirstLastPara="0" vertOverflow="overflow" horzOverflow="overflow" vert="horz" wrap="square" lIns="91440" tIns="45720" rIns="91440" bIns="45720" numCol="1" spcCol="0" rtlCol="0" fromWordArt="0" anchor="t" anchorCtr="0" forceAA="0" compatLnSpc="1">
-            <a:prstTxWarp prst="textNoShape">
-              <a:avLst/>
-            </a:prstTxWarp>
-            <a:noAutofit/>
-          </a:bodyPr>
-          <a:lstStyle/>
-          <a:p>
-            <a:pPr algn="ctr">
-              <a:spcAft>
-                <a:spcPts val="600"/>
-              </a:spcAft>
-            </a:pPr>
-            <a:r>
-              <a:rPr lang="en-US" sz="1200" b="1" dirty="0" smtClean="0">
-                <a:solidFill>
-                  <a:schemeClr val="bg1"/>
-                </a:solidFill>
-                <a:latin typeface="Helvetica Neue" panose="02000503000000020004" pitchFamily="50"/>
-              </a:rPr>
-              <a:t>PHYSIOLOGICAL STATE</a:t>
-            </a:r>
-          </a:p>
-          <a:p>
-            <a:pPr marL="171450" indent="-171450" algn="just">
-              <a:buFont typeface="Lato" panose="020F0502020204030203" pitchFamily="34" charset="0"/>
-              <a:buChar char="–"/>
-            </a:pPr>
-            <a:r>
-              <a:rPr lang="en-US" sz="1200" dirty="0" smtClean="0">
-                <a:solidFill>
-                  <a:schemeClr val="bg1"/>
-                </a:solidFill>
-                <a:latin typeface="Helvetica Neue" panose="02000503000000020004" pitchFamily="50"/>
-                <a:sym typeface="Wingdings" panose="05000000000000000000" pitchFamily="2" charset="2"/>
-              </a:rPr>
-              <a:t>Sleep stages</a:t>
-            </a:r>
-          </a:p>
-          <a:p>
-            <a:pPr marL="171450" indent="-171450" algn="just">
-              <a:buFont typeface="Lato" panose="020F0502020204030203" pitchFamily="34" charset="0"/>
-              <a:buChar char="–"/>
-            </a:pPr>
-            <a:r>
-              <a:rPr lang="en-US" sz="1200" dirty="0" smtClean="0">
-                <a:solidFill>
-                  <a:schemeClr val="bg1"/>
-                </a:solidFill>
-                <a:latin typeface="Helvetica Neue" panose="02000503000000020004" pitchFamily="50"/>
-                <a:sym typeface="Wingdings" panose="05000000000000000000" pitchFamily="2" charset="2"/>
-              </a:rPr>
-              <a:t>Brain reactivity</a:t>
-            </a:r>
-          </a:p>
-          <a:p>
-            <a:pPr marL="171450" indent="-171450" algn="just">
-              <a:buFont typeface="Lato" panose="020F0502020204030203" pitchFamily="34" charset="0"/>
-              <a:buChar char="–"/>
-            </a:pPr>
-            <a:r>
-              <a:rPr lang="en-US" sz="1200" dirty="0" smtClean="0">
-                <a:solidFill>
-                  <a:schemeClr val="bg1"/>
-                </a:solidFill>
-                <a:latin typeface="Helvetica Neue" panose="02000503000000020004" pitchFamily="50"/>
-                <a:sym typeface="Wingdings" panose="05000000000000000000" pitchFamily="2" charset="2"/>
-              </a:rPr>
-              <a:t>DMN functional connectivity</a:t>
-            </a:r>
-          </a:p>
-        </p:txBody>
-      </p:sp>
-      <p:cxnSp>
-        <p:nvCxnSpPr>
-          <p:cNvPr id="23" name="Connecteur droit avec flèche 22"/>
-          <p:cNvCxnSpPr/>
-          <p:nvPr/>
-        </p:nvCxnSpPr>
-        <p:spPr>
-          <a:xfrm>
-            <a:off x="4641653" y="3857553"/>
-            <a:ext cx="0" cy="360000"/>
-          </a:xfrm>
-          <a:prstGeom prst="straightConnector1">
-            <a:avLst/>
-          </a:prstGeom>
-          <a:ln w="28575">
-            <a:headEnd type="triangle"/>
-            <a:tailEnd type="triangle"/>
-          </a:ln>
-        </p:spPr>
-        <p:style>
-          <a:lnRef idx="1">
-            <a:schemeClr val="dk1"/>
-          </a:lnRef>
-          <a:fillRef idx="0">
-            <a:schemeClr val="dk1"/>
-          </a:fillRef>
-          <a:effectRef idx="0">
-            <a:schemeClr val="dk1"/>
-          </a:effectRef>
-          <a:fontRef idx="minor">
-            <a:schemeClr val="tx1"/>
-          </a:fontRef>
-        </p:style>
-      </p:cxnSp>
-      <p:cxnSp>
-        <p:nvCxnSpPr>
-          <p:cNvPr id="49" name="Connecteur droit avec flèche 48"/>
-          <p:cNvCxnSpPr/>
-          <p:nvPr/>
-        </p:nvCxnSpPr>
-        <p:spPr>
-          <a:xfrm rot="16200000">
-            <a:off x="6315652" y="4574255"/>
-            <a:ext cx="0" cy="360000"/>
-          </a:xfrm>
-          <a:prstGeom prst="straightConnector1">
-            <a:avLst/>
-          </a:prstGeom>
-          <a:ln w="57150">
-            <a:headEnd type="none" w="med" len="med"/>
-            <a:tailEnd type="triangle" w="med" len="med"/>
-          </a:ln>
-        </p:spPr>
-        <p:style>
-          <a:lnRef idx="1">
-            <a:schemeClr val="dk1"/>
-          </a:lnRef>
-          <a:fillRef idx="0">
-            <a:schemeClr val="dk1"/>
-          </a:fillRef>
-          <a:effectRef idx="0">
-            <a:schemeClr val="dk1"/>
-          </a:effectRef>
-          <a:fontRef idx="minor">
-            <a:schemeClr val="tx1"/>
-          </a:fontRef>
-        </p:style>
-      </p:cxnSp>
-      <p:sp>
-        <p:nvSpPr>
-          <p:cNvPr id="50" name="Rectangle 49"/>
-          <p:cNvSpPr/>
-          <p:nvPr/>
-        </p:nvSpPr>
-        <p:spPr>
-          <a:xfrm>
-            <a:off x="6631585" y="4318076"/>
-            <a:ext cx="2787347" cy="872358"/>
-          </a:xfrm>
-          <a:prstGeom prst="rect">
-            <a:avLst/>
-          </a:prstGeom>
-          <a:solidFill>
-            <a:srgbClr val="99D398"/>
-          </a:solidFill>
-          <a:ln w="19050">
-            <a:noFill/>
-          </a:ln>
-        </p:spPr>
-        <p:style>
-          <a:lnRef idx="2">
-            <a:schemeClr val="accent1">
-              <a:shade val="50000"/>
-            </a:schemeClr>
-          </a:lnRef>
-          <a:fillRef idx="1">
-            <a:schemeClr val="accent1"/>
-          </a:fillRef>
-          <a:effectRef idx="0">
-            <a:schemeClr val="accent1"/>
-          </a:effectRef>
-          <a:fontRef idx="minor">
-            <a:schemeClr val="lt1"/>
-          </a:fontRef>
-        </p:style>
-        <p:txBody>
-          <a:bodyPr rot="0" spcFirstLastPara="0" vertOverflow="overflow" horzOverflow="overflow" vert="horz" wrap="square" lIns="91440" tIns="45720" rIns="91440" bIns="45720" numCol="1" spcCol="0" rtlCol="0" fromWordArt="0" anchor="t" anchorCtr="0" forceAA="0" compatLnSpc="1">
-            <a:prstTxWarp prst="textNoShape">
-              <a:avLst/>
-            </a:prstTxWarp>
-            <a:noAutofit/>
-          </a:bodyPr>
-          <a:lstStyle/>
-          <a:p>
-            <a:pPr algn="ctr">
-              <a:spcAft>
-                <a:spcPts val="600"/>
-              </a:spcAft>
-            </a:pPr>
-            <a:r>
-              <a:rPr lang="en-US" sz="1200" b="1" dirty="0" smtClean="0">
-                <a:solidFill>
-                  <a:schemeClr val="tx1"/>
-                </a:solidFill>
-                <a:latin typeface="Helvetica Neue" panose="02000503000000020004" pitchFamily="50"/>
-              </a:rPr>
-              <a:t>SLEEP INERTIA</a:t>
-            </a:r>
-          </a:p>
-          <a:p>
-            <a:pPr marL="228600" indent="-228600" algn="just">
-              <a:buFont typeface="Lato" panose="020F0502020204030203" pitchFamily="34" charset="0"/>
-              <a:buChar char="–"/>
-            </a:pPr>
-            <a:r>
-              <a:rPr lang="en-US" sz="1200" dirty="0" smtClean="0">
-                <a:solidFill>
-                  <a:schemeClr val="tx1"/>
-                </a:solidFill>
-                <a:latin typeface="Helvetica Neue" panose="02000503000000020004" pitchFamily="50"/>
-                <a:sym typeface="Wingdings" panose="05000000000000000000" pitchFamily="2" charset="2"/>
-              </a:rPr>
-              <a:t> Brain functioning upon awakening</a:t>
-            </a:r>
-            <a:endParaRPr lang="en-US" sz="1200" dirty="0" smtClean="0">
-              <a:solidFill>
-                <a:schemeClr val="tx1"/>
-              </a:solidFill>
-              <a:latin typeface="Helvetica Neue" panose="02000503000000020004" pitchFamily="50"/>
-            </a:endParaRPr>
-          </a:p>
-        </p:txBody>
-      </p:sp>
-      <p:sp>
-        <p:nvSpPr>
-          <p:cNvPr id="28" name="ZoneTexte 27"/>
-          <p:cNvSpPr txBox="1"/>
-          <p:nvPr/>
-        </p:nvSpPr>
-        <p:spPr>
-          <a:xfrm>
-            <a:off x="3256100" y="2032302"/>
-            <a:ext cx="2772001" cy="523220"/>
-          </a:xfrm>
-          <a:prstGeom prst="rect">
-            <a:avLst/>
-          </a:prstGeom>
-          <a:noFill/>
-        </p:spPr>
-        <p:txBody>
-          <a:bodyPr wrap="square" rtlCol="0">
-            <a:spAutoFit/>
-          </a:bodyPr>
-          <a:lstStyle/>
-          <a:p>
-            <a:pPr algn="ctr"/>
-            <a:r>
-              <a:rPr lang="en-US" sz="1400" b="1" dirty="0" smtClean="0">
-                <a:latin typeface="Helvetica Neue" panose="02000503000000020004" pitchFamily="50"/>
-              </a:rPr>
-              <a:t>Dream content is in short term memory</a:t>
-            </a:r>
-            <a:endParaRPr lang="en-US" sz="1400" b="1" dirty="0">
-              <a:latin typeface="Helvetica Neue" panose="02000503000000020004" pitchFamily="50"/>
-            </a:endParaRPr>
-          </a:p>
-        </p:txBody>
-      </p:sp>
-      <p:sp>
-        <p:nvSpPr>
-          <p:cNvPr id="55" name="ZoneTexte 54"/>
-          <p:cNvSpPr txBox="1"/>
-          <p:nvPr/>
-        </p:nvSpPr>
-        <p:spPr>
-          <a:xfrm>
-            <a:off x="6632032" y="2032302"/>
-            <a:ext cx="2772001" cy="523220"/>
-          </a:xfrm>
-          <a:prstGeom prst="rect">
-            <a:avLst/>
-          </a:prstGeom>
-          <a:noFill/>
-        </p:spPr>
-        <p:txBody>
-          <a:bodyPr wrap="square" rtlCol="0">
-            <a:spAutoFit/>
-          </a:bodyPr>
-          <a:lstStyle/>
-          <a:p>
-            <a:pPr algn="ctr"/>
-            <a:r>
-              <a:rPr lang="en-US" sz="1400" b="1" dirty="0" smtClean="0">
-                <a:latin typeface="Helvetica Neue" panose="02000503000000020004" pitchFamily="50"/>
-              </a:rPr>
-              <a:t>Dream content is encoded in long-term memory</a:t>
-            </a:r>
-            <a:endParaRPr lang="en-US" sz="1400" b="1" dirty="0">
-              <a:latin typeface="Helvetica Neue" panose="02000503000000020004" pitchFamily="50"/>
-            </a:endParaRPr>
-          </a:p>
-        </p:txBody>
-      </p:sp>
-      <p:pic>
-        <p:nvPicPr>
-          <p:cNvPr id="29" name="Image 28"/>
-          <p:cNvPicPr>
-            <a:picLocks noChangeAspect="1"/>
-          </p:cNvPicPr>
-          <p:nvPr/>
-        </p:nvPicPr>
-        <p:blipFill>
-          <a:blip r:embed="rId4" cstate="print">
-            <a:extLst>
-              <a:ext uri="{28A0092B-C50C-407E-A947-70E740481C1C}">
-                <a14:useLocalDpi xmlns:a14="http://schemas.microsoft.com/office/drawing/2010/main" val="0"/>
-              </a:ext>
-            </a:extLst>
-          </a:blip>
-          <a:stretch>
-            <a:fillRect/>
-          </a:stretch>
-        </p:blipFill>
-        <p:spPr>
-          <a:xfrm>
-            <a:off x="3255653" y="1197710"/>
-            <a:ext cx="720000" cy="720000"/>
-          </a:xfrm>
-          <a:prstGeom prst="rect">
-            <a:avLst/>
-          </a:prstGeom>
-        </p:spPr>
-      </p:pic>
-      <p:cxnSp>
-        <p:nvCxnSpPr>
-          <p:cNvPr id="31" name="Connecteur droit 30"/>
-          <p:cNvCxnSpPr/>
-          <p:nvPr/>
-        </p:nvCxnSpPr>
-        <p:spPr>
-          <a:xfrm>
-            <a:off x="3255653" y="1867560"/>
-            <a:ext cx="6148380" cy="0"/>
-          </a:xfrm>
-          <a:prstGeom prst="line">
-            <a:avLst/>
-          </a:prstGeom>
-          <a:ln w="28575">
-            <a:solidFill>
-              <a:schemeClr val="tx2">
-                <a:lumMod val="50000"/>
-              </a:schemeClr>
-            </a:solidFill>
-          </a:ln>
-        </p:spPr>
-        <p:style>
-          <a:lnRef idx="1">
-            <a:schemeClr val="dk1"/>
-          </a:lnRef>
-          <a:fillRef idx="0">
-            <a:schemeClr val="dk1"/>
-          </a:fillRef>
-          <a:effectRef idx="0">
-            <a:schemeClr val="dk1"/>
-          </a:effectRef>
-          <a:fontRef idx="minor">
-            <a:schemeClr val="tx1"/>
-          </a:fontRef>
-        </p:style>
-      </p:cxnSp>
-      <p:cxnSp>
-        <p:nvCxnSpPr>
-          <p:cNvPr id="58" name="Connecteur droit avec flèche 57"/>
-          <p:cNvCxnSpPr/>
-          <p:nvPr/>
-        </p:nvCxnSpPr>
-        <p:spPr>
-          <a:xfrm rot="16200000">
-            <a:off x="6315652" y="3144697"/>
-            <a:ext cx="0" cy="360000"/>
-          </a:xfrm>
-          <a:prstGeom prst="straightConnector1">
-            <a:avLst/>
-          </a:prstGeom>
-          <a:ln w="57150">
-            <a:headEnd type="none" w="med" len="med"/>
-            <a:tailEnd type="triangle" w="med" len="med"/>
-          </a:ln>
-        </p:spPr>
-        <p:style>
-          <a:lnRef idx="1">
-            <a:schemeClr val="dk1"/>
-          </a:lnRef>
-          <a:fillRef idx="0">
-            <a:schemeClr val="dk1"/>
-          </a:fillRef>
-          <a:effectRef idx="0">
-            <a:schemeClr val="dk1"/>
-          </a:effectRef>
-          <a:fontRef idx="minor">
-            <a:schemeClr val="tx1"/>
-          </a:fontRef>
-        </p:style>
-      </p:cxnSp>
-      <p:sp>
-        <p:nvSpPr>
-          <p:cNvPr id="59" name="Rectangle 58"/>
-          <p:cNvSpPr/>
-          <p:nvPr/>
-        </p:nvSpPr>
-        <p:spPr>
-          <a:xfrm>
-            <a:off x="6631584" y="2884871"/>
-            <a:ext cx="2787347" cy="872358"/>
-          </a:xfrm>
-          <a:prstGeom prst="rect">
-            <a:avLst/>
-          </a:prstGeom>
-          <a:solidFill>
-            <a:srgbClr val="E9F2B5"/>
-          </a:solidFill>
-          <a:ln w="19050">
-            <a:noFill/>
-          </a:ln>
-        </p:spPr>
-        <p:style>
-          <a:lnRef idx="2">
-            <a:schemeClr val="accent1">
-              <a:shade val="50000"/>
-            </a:schemeClr>
-          </a:lnRef>
-          <a:fillRef idx="1">
-            <a:schemeClr val="accent1"/>
-          </a:fillRef>
-          <a:effectRef idx="0">
-            <a:schemeClr val="accent1"/>
-          </a:effectRef>
-          <a:fontRef idx="minor">
-            <a:schemeClr val="lt1"/>
-          </a:fontRef>
-        </p:style>
-        <p:txBody>
-          <a:bodyPr rot="0" spcFirstLastPara="0" vertOverflow="overflow" horzOverflow="overflow" vert="horz" wrap="square" lIns="91440" tIns="45720" rIns="91440" bIns="45720" numCol="1" spcCol="0" rtlCol="0" fromWordArt="0" anchor="t" anchorCtr="0" forceAA="0" compatLnSpc="1">
-            <a:prstTxWarp prst="textNoShape">
-              <a:avLst/>
-            </a:prstTxWarp>
-            <a:noAutofit/>
-          </a:bodyPr>
-          <a:lstStyle/>
-          <a:p>
-            <a:pPr algn="ctr">
-              <a:spcAft>
-                <a:spcPts val="600"/>
-              </a:spcAft>
-            </a:pPr>
-            <a:r>
-              <a:rPr lang="en-US" sz="1200" b="1" dirty="0" smtClean="0">
-                <a:solidFill>
-                  <a:schemeClr val="tx1"/>
-                </a:solidFill>
-                <a:latin typeface="Helvetica Neue" panose="02000503000000020004" pitchFamily="50"/>
-              </a:rPr>
-              <a:t>PERSONALITY</a:t>
-            </a:r>
-          </a:p>
-          <a:p>
-            <a:pPr marL="171450" indent="-171450" algn="just">
-              <a:buFont typeface="Lato" panose="020F0502020204030203" pitchFamily="34" charset="0"/>
-              <a:buChar char="–"/>
-            </a:pPr>
-            <a:r>
-              <a:rPr lang="en-US" sz="1200" dirty="0" smtClean="0">
-                <a:solidFill>
-                  <a:schemeClr val="tx1"/>
-                </a:solidFill>
-                <a:latin typeface="Helvetica Neue" panose="02000503000000020004" pitchFamily="50"/>
-                <a:sym typeface="Wingdings" panose="05000000000000000000" pitchFamily="2" charset="2"/>
-              </a:rPr>
-              <a:t>Attitude towards dreams</a:t>
-            </a:r>
-          </a:p>
-          <a:p>
-            <a:pPr marL="171450" indent="-171450" algn="just">
-              <a:buFont typeface="Lato" panose="020F0502020204030203" pitchFamily="34" charset="0"/>
-              <a:buChar char="–"/>
-            </a:pPr>
-            <a:r>
-              <a:rPr lang="en-US" sz="1200" dirty="0" smtClean="0">
-                <a:solidFill>
-                  <a:schemeClr val="tx1"/>
-                </a:solidFill>
-                <a:latin typeface="Helvetica Neue" panose="02000503000000020004" pitchFamily="50"/>
-                <a:sym typeface="Wingdings" panose="05000000000000000000" pitchFamily="2" charset="2"/>
-              </a:rPr>
-              <a:t>Less interference</a:t>
-            </a:r>
-            <a:endParaRPr lang="en-US" sz="1200" dirty="0" smtClean="0">
-              <a:solidFill>
-                <a:schemeClr val="tx1"/>
-              </a:solidFill>
-              <a:latin typeface="Helvetica Neue" panose="02000503000000020004" pitchFamily="50"/>
-            </a:endParaRPr>
-          </a:p>
-        </p:txBody>
-      </p:sp>
-      <p:cxnSp>
-        <p:nvCxnSpPr>
-          <p:cNvPr id="60" name="Connecteur droit avec flèche 59"/>
-          <p:cNvCxnSpPr/>
-          <p:nvPr/>
-        </p:nvCxnSpPr>
-        <p:spPr>
-          <a:xfrm>
-            <a:off x="8025257" y="3857553"/>
-            <a:ext cx="0" cy="360000"/>
-          </a:xfrm>
-          <a:prstGeom prst="straightConnector1">
-            <a:avLst/>
-          </a:prstGeom>
-          <a:ln w="28575">
-            <a:headEnd type="triangle"/>
-            <a:tailEnd type="triangle"/>
-          </a:ln>
-        </p:spPr>
-        <p:style>
-          <a:lnRef idx="1">
-            <a:schemeClr val="dk1"/>
-          </a:lnRef>
-          <a:fillRef idx="0">
-            <a:schemeClr val="dk1"/>
-          </a:fillRef>
-          <a:effectRef idx="0">
-            <a:schemeClr val="dk1"/>
-          </a:effectRef>
-          <a:fontRef idx="minor">
-            <a:schemeClr val="tx1"/>
-          </a:fontRef>
-        </p:style>
-      </p:cxnSp>
-    </p:spTree>
-    <p:extLst>
-      <p:ext uri="{BB962C8B-B14F-4D97-AF65-F5344CB8AC3E}">
-        <p14:creationId xmlns:p14="http://schemas.microsoft.com/office/powerpoint/2010/main" val="2291372226"/>
-      </p:ext>
-    </p:extLst>
-  </p:cSld>
-  <p:clrMapOvr>
-    <a:masterClrMapping/>
-  </p:clrMapOvr>
-</p:sld>
-</file>
-
-<file path=ppt/slides/slide6.xml><?xml version="1.0" encoding="utf-8"?>
 <p:sld xmlns:a="http://schemas.openxmlformats.org/drawingml/2006/main" xmlns:r="http://schemas.openxmlformats.org/officeDocument/2006/relationships" xmlns:p="http://schemas.openxmlformats.org/presentationml/2006/main">
   <p:cSld>
     <p:spTree>

</xml_diff>

<commit_message>
MAJOR: finished discussion WLE
</commit_message>
<xml_diff>
--- a/Fig/Discussion/schema_dream_recall.pptx
+++ b/Fig/Discussion/schema_dream_recall.pptx
@@ -6,10 +6,11 @@
   </p:sldMasterIdLst>
   <p:sldIdLst>
     <p:sldId id="261" r:id="rId2"/>
-    <p:sldId id="263" r:id="rId3"/>
-    <p:sldId id="262" r:id="rId4"/>
-    <p:sldId id="256" r:id="rId5"/>
-    <p:sldId id="258" r:id="rId6"/>
+    <p:sldId id="264" r:id="rId3"/>
+    <p:sldId id="263" r:id="rId4"/>
+    <p:sldId id="262" r:id="rId5"/>
+    <p:sldId id="256" r:id="rId6"/>
+    <p:sldId id="258" r:id="rId7"/>
   </p:sldIdLst>
   <p:sldSz cx="14400213" cy="6858000"/>
   <p:notesSz cx="6858000" cy="9144000"/>
@@ -116,12 +117,12 @@
             <a:srgbClr val="A4A3A4"/>
           </p15:clr>
         </p15:guide>
-        <p15:guide id="2" pos="2517" userDrawn="1">
+        <p15:guide id="2" pos="2540" userDrawn="1">
           <p15:clr>
             <a:srgbClr val="A4A3A4"/>
           </p15:clr>
         </p15:guide>
-        <p15:guide id="3" orient="horz" pos="2387" userDrawn="1">
+        <p15:guide id="3" orient="horz" pos="3203" userDrawn="1">
           <p15:clr>
             <a:srgbClr val="A4A3A4"/>
           </p15:clr>
@@ -3017,12 +3018,12 @@
           <a:prstGeom prst="rect">
             <a:avLst/>
           </a:prstGeom>
-          <a:noFill/>
+          <a:solidFill>
+            <a:srgbClr val="222A29"/>
+          </a:solidFill>
           <a:ln w="12700">
             <a:solidFill>
-              <a:schemeClr val="tx2">
-                <a:lumMod val="75000"/>
-              </a:schemeClr>
+              <a:schemeClr val="tx1"/>
             </a:solidFill>
           </a:ln>
         </p:spPr>
@@ -3059,24 +3060,15 @@
             <a:r>
               <a:rPr lang="en-US" sz="1150" dirty="0" smtClean="0">
                 <a:solidFill>
-                  <a:schemeClr val="tx1"/>
+                  <a:schemeClr val="bg1"/>
                 </a:solidFill>
                 <a:latin typeface="Helvetica Neue" panose="02000503000000020004" pitchFamily="50"/>
               </a:rPr>
-              <a:t>INTRA-SLEEP </a:t>
-            </a:r>
-            <a:r>
-              <a:rPr lang="en-US" sz="1150" b="1" dirty="0" smtClean="0">
-                <a:solidFill>
-                  <a:schemeClr val="tx1"/>
-                </a:solidFill>
-                <a:latin typeface="Helvetica Neue" panose="02000503000000020004" pitchFamily="50"/>
-              </a:rPr>
-              <a:t>AWAKENINGS</a:t>
-            </a:r>
-            <a:endParaRPr lang="en-US" sz="1150" b="1" baseline="30000" dirty="0">
+              <a:t>INTRA-SLEEP AWAKENINGS</a:t>
+            </a:r>
+            <a:endParaRPr lang="en-US" sz="1150" baseline="30000" dirty="0">
               <a:solidFill>
-                <a:schemeClr val="tx1"/>
+                <a:schemeClr val="bg1"/>
               </a:solidFill>
               <a:latin typeface="Helvetica Neue" panose="02000503000000020004" pitchFamily="50"/>
             </a:endParaRPr>
@@ -3097,11 +3089,13 @@
           <a:prstGeom prst="rect">
             <a:avLst/>
           </a:prstGeom>
-          <a:noFill/>
-          <a:ln w="12700">
+          <a:solidFill>
+            <a:srgbClr val="E8ECEB"/>
+          </a:solidFill>
+          <a:ln w="19050">
             <a:solidFill>
-              <a:schemeClr val="tx2">
-                <a:lumMod val="75000"/>
+              <a:schemeClr val="bg2">
+                <a:lumMod val="25000"/>
               </a:schemeClr>
             </a:solidFill>
           </a:ln>
@@ -3137,24 +3131,33 @@
               </a:lnSpc>
             </a:pPr>
             <a:r>
-              <a:rPr lang="en-US" sz="1100" b="1" dirty="0" smtClean="0">
+              <a:rPr lang="en-US" sz="1150" dirty="0" smtClean="0">
                 <a:solidFill>
                   <a:schemeClr val="tx1"/>
                 </a:solidFill>
                 <a:latin typeface="Helvetica Neue" panose="02000503000000020004" pitchFamily="50"/>
               </a:rPr>
-              <a:t>ENCODING</a:t>
-            </a:r>
-            <a:r>
-              <a:rPr lang="en-US" sz="1100" dirty="0" smtClean="0">
+              <a:t>ENCODING OF DREAM </a:t>
+            </a:r>
+            <a:r>
+              <a:rPr lang="en-US" sz="1150" dirty="0" smtClean="0">
                 <a:solidFill>
                   <a:schemeClr val="tx1"/>
                 </a:solidFill>
                 <a:latin typeface="Helvetica Neue" panose="02000503000000020004" pitchFamily="50"/>
               </a:rPr>
-              <a:t> OF DREAM IN LONG TERM MEMORY</a:t>
-            </a:r>
-            <a:endParaRPr lang="en-US" sz="1100" baseline="30000" dirty="0">
+              <a:t>CONTENT INTO </a:t>
+            </a:r>
+            <a:r>
+              <a:rPr lang="en-US" sz="1150" dirty="0" smtClean="0">
+                <a:solidFill>
+                  <a:schemeClr val="tx1"/>
+                </a:solidFill>
+                <a:latin typeface="Helvetica Neue" panose="02000503000000020004" pitchFamily="50"/>
+              </a:rPr>
+              <a:t>MEMORY</a:t>
+            </a:r>
+            <a:endParaRPr lang="en-US" sz="1150" baseline="30000" dirty="0">
               <a:solidFill>
                 <a:schemeClr val="tx1"/>
               </a:solidFill>
@@ -3172,7 +3175,7 @@
         <p:spPr>
           <a:xfrm>
             <a:off x="6266152" y="3908758"/>
-            <a:ext cx="763202" cy="461665"/>
+            <a:ext cx="763202" cy="477054"/>
           </a:xfrm>
           <a:prstGeom prst="rect">
             <a:avLst/>
@@ -3187,27 +3190,24 @@
           <a:p>
             <a:pPr algn="ctr"/>
             <a:r>
-              <a:rPr lang="en-US" sz="1200" dirty="0" smtClean="0">
+              <a:rPr lang="en-US" sz="1250" dirty="0" smtClean="0">
                 <a:latin typeface="Helvetica Neue" panose="02000503000000020004" pitchFamily="50"/>
               </a:rPr>
               <a:t>Sleep </a:t>
             </a:r>
-            <a:endParaRPr lang="en-US" sz="1200" dirty="0" smtClean="0">
+          </a:p>
+          <a:p>
+            <a:pPr algn="ctr"/>
+            <a:r>
+              <a:rPr lang="en-US" sz="1250" dirty="0" smtClean="0">
+                <a:latin typeface="Helvetica Neue" panose="02000503000000020004" pitchFamily="50"/>
+              </a:rPr>
+              <a:t>inertia</a:t>
+            </a:r>
+            <a:endParaRPr lang="en-US" sz="1250" baseline="30000" dirty="0">
               <a:latin typeface="Helvetica Neue" panose="02000503000000020004" pitchFamily="50"/>
             </a:endParaRPr>
           </a:p>
-          <a:p>
-            <a:pPr algn="ctr"/>
-            <a:r>
-              <a:rPr lang="en-US" sz="1200" dirty="0" smtClean="0">
-                <a:latin typeface="Helvetica Neue" panose="02000503000000020004" pitchFamily="50"/>
-              </a:rPr>
-              <a:t>inertia</a:t>
-            </a:r>
-            <a:endParaRPr lang="en-US" sz="1200" baseline="30000" dirty="0">
-              <a:latin typeface="Helvetica Neue" panose="02000503000000020004" pitchFamily="50"/>
-            </a:endParaRPr>
-          </a:p>
         </p:txBody>
       </p:sp>
       <p:sp>
@@ -3219,7 +3219,7 @@
         <p:spPr>
           <a:xfrm>
             <a:off x="6290523" y="4666701"/>
-            <a:ext cx="1735696" cy="276999"/>
+            <a:ext cx="1735696" cy="284693"/>
           </a:xfrm>
           <a:prstGeom prst="rect">
             <a:avLst/>
@@ -3234,12 +3234,12 @@
           <a:p>
             <a:pPr algn="ctr"/>
             <a:r>
-              <a:rPr lang="en-US" sz="1200" dirty="0" smtClean="0">
+              <a:rPr lang="en-US" sz="1250" dirty="0" smtClean="0">
                 <a:latin typeface="Helvetica Neue" panose="02000503000000020004" pitchFamily="50"/>
               </a:rPr>
               <a:t>Physiological context</a:t>
             </a:r>
-            <a:endParaRPr lang="en-US" sz="1200" baseline="30000" dirty="0">
+            <a:endParaRPr lang="en-US" sz="1250" baseline="30000" dirty="0">
               <a:latin typeface="Helvetica Neue" panose="02000503000000020004" pitchFamily="50"/>
             </a:endParaRPr>
           </a:p>
@@ -3337,12 +3337,12 @@
           <a:prstGeom prst="rect">
             <a:avLst/>
           </a:prstGeom>
-          <a:noFill/>
+          <a:solidFill>
+            <a:srgbClr val="222A29"/>
+          </a:solidFill>
           <a:ln w="12700">
             <a:solidFill>
-              <a:schemeClr val="tx2">
-                <a:lumMod val="75000"/>
-              </a:schemeClr>
+              <a:schemeClr val="tx1"/>
             </a:solidFill>
           </a:ln>
         </p:spPr>
@@ -3377,44 +3377,35 @@
               </a:lnSpc>
             </a:pPr>
             <a:r>
-              <a:rPr lang="en-US" sz="1150" b="1" dirty="0" smtClean="0">
+              <a:rPr lang="en-US" sz="1150" dirty="0" smtClean="0">
                 <a:solidFill>
-                  <a:schemeClr val="tx1"/>
+                  <a:schemeClr val="bg1"/>
                 </a:solidFill>
                 <a:latin typeface="Helvetica Neue" panose="02000503000000020004" pitchFamily="50"/>
               </a:rPr>
               <a:t>SALIENCE </a:t>
             </a:r>
             <a:r>
-              <a:rPr lang="en-US" sz="1150" b="1" dirty="0">
+              <a:rPr lang="en-US" sz="1150" dirty="0">
                 <a:solidFill>
-                  <a:schemeClr val="tx1"/>
+                  <a:schemeClr val="bg1"/>
                 </a:solidFill>
                 <a:latin typeface="Helvetica Neue" panose="02000503000000020004" pitchFamily="50"/>
               </a:rPr>
               <a:t> </a:t>
             </a:r>
             <a:r>
-              <a:rPr lang="en-US" sz="1150" b="1" dirty="0" smtClean="0">
+              <a:rPr lang="en-US" sz="1150" dirty="0" smtClean="0">
                 <a:solidFill>
-                  <a:schemeClr val="tx1"/>
+                  <a:schemeClr val="bg1"/>
                 </a:solidFill>
                 <a:latin typeface="Helvetica Neue" panose="02000503000000020004" pitchFamily="50"/>
               </a:rPr>
-              <a:t>        </a:t>
-            </a:r>
-            <a:r>
-              <a:rPr lang="en-US" sz="1150" dirty="0" smtClean="0">
-                <a:solidFill>
-                  <a:schemeClr val="tx1"/>
-                </a:solidFill>
-                <a:latin typeface="Helvetica Neue" panose="02000503000000020004" pitchFamily="50"/>
-              </a:rPr>
-              <a:t>OF DREAM CONTENT</a:t>
+              <a:t>        OF DREAM CONTENT</a:t>
             </a:r>
             <a:endParaRPr lang="en-US" sz="1150" baseline="30000" dirty="0">
               <a:solidFill>
-                <a:schemeClr val="tx1"/>
+                <a:schemeClr val="bg1"/>
               </a:solidFill>
               <a:latin typeface="Helvetica Neue" panose="02000503000000020004" pitchFamily="50"/>
             </a:endParaRPr>
@@ -3469,7 +3460,7 @@
         <p:spPr>
           <a:xfrm>
             <a:off x="6404697" y="2118416"/>
-            <a:ext cx="1502979" cy="276999"/>
+            <a:ext cx="1502979" cy="284693"/>
           </a:xfrm>
           <a:prstGeom prst="rect">
             <a:avLst/>
@@ -3484,12 +3475,12 @@
           <a:p>
             <a:pPr algn="ctr"/>
             <a:r>
-              <a:rPr lang="en-US" sz="1200" dirty="0" smtClean="0">
+              <a:rPr lang="en-US" sz="1250" dirty="0" smtClean="0">
                 <a:latin typeface="Helvetica Neue" panose="02000503000000020004" pitchFamily="50"/>
               </a:rPr>
               <a:t>Interference</a:t>
             </a:r>
-            <a:endParaRPr lang="en-US" sz="1200" dirty="0">
+            <a:endParaRPr lang="en-US" sz="1250" dirty="0">
               <a:latin typeface="Helvetica Neue" panose="02000503000000020004" pitchFamily="50"/>
             </a:endParaRPr>
           </a:p>
@@ -3662,6 +3653,1779 @@
         <p:spPr>
           <a:xfrm>
             <a:off x="6404697" y="1553739"/>
+            <a:ext cx="1502979" cy="284693"/>
+          </a:xfrm>
+          <a:prstGeom prst="rect">
+            <a:avLst/>
+          </a:prstGeom>
+          <a:noFill/>
+        </p:spPr>
+        <p:txBody>
+          <a:bodyPr wrap="square" rtlCol="0">
+            <a:spAutoFit/>
+          </a:bodyPr>
+          <a:lstStyle/>
+          <a:p>
+            <a:pPr algn="ctr"/>
+            <a:r>
+              <a:rPr lang="en-US" sz="1250" dirty="0" smtClean="0">
+                <a:latin typeface="Helvetica Neue" panose="02000503000000020004" pitchFamily="50"/>
+              </a:rPr>
+              <a:t>Interest in dreams</a:t>
+            </a:r>
+            <a:endParaRPr lang="en-US" sz="1250" baseline="30000" dirty="0">
+              <a:latin typeface="Helvetica Neue" panose="02000503000000020004" pitchFamily="50"/>
+            </a:endParaRPr>
+          </a:p>
+        </p:txBody>
+      </p:sp>
+      <p:cxnSp>
+        <p:nvCxnSpPr>
+          <p:cNvPr id="64" name="Connecteur droit avec flèche 63"/>
+          <p:cNvCxnSpPr/>
+          <p:nvPr/>
+        </p:nvCxnSpPr>
+        <p:spPr>
+          <a:xfrm>
+            <a:off x="3994260" y="2511861"/>
+            <a:ext cx="360000" cy="0"/>
+          </a:xfrm>
+          <a:prstGeom prst="straightConnector1">
+            <a:avLst/>
+          </a:prstGeom>
+          <a:ln w="28575">
+            <a:solidFill>
+              <a:schemeClr val="tx1">
+                <a:lumMod val="85000"/>
+                <a:lumOff val="15000"/>
+              </a:schemeClr>
+            </a:solidFill>
+            <a:tailEnd type="triangle"/>
+          </a:ln>
+        </p:spPr>
+        <p:style>
+          <a:lnRef idx="1">
+            <a:schemeClr val="dk1"/>
+          </a:lnRef>
+          <a:fillRef idx="0">
+            <a:schemeClr val="dk1"/>
+          </a:fillRef>
+          <a:effectRef idx="0">
+            <a:schemeClr val="dk1"/>
+          </a:effectRef>
+          <a:fontRef idx="minor">
+            <a:schemeClr val="tx1"/>
+          </a:fontRef>
+        </p:style>
+      </p:cxnSp>
+      <p:grpSp>
+        <p:nvGrpSpPr>
+          <p:cNvPr id="3" name="Groupe 2"/>
+          <p:cNvGrpSpPr/>
+          <p:nvPr/>
+        </p:nvGrpSpPr>
+        <p:grpSpPr>
+          <a:xfrm>
+            <a:off x="2600927" y="2070294"/>
+            <a:ext cx="1296000" cy="2160000"/>
+            <a:chOff x="2379431" y="2071934"/>
+            <a:chExt cx="1296000" cy="2142181"/>
+          </a:xfrm>
+          <a:noFill/>
+        </p:grpSpPr>
+        <p:grpSp>
+          <p:nvGrpSpPr>
+            <p:cNvPr id="2" name="Groupe 1"/>
+            <p:cNvGrpSpPr/>
+            <p:nvPr/>
+          </p:nvGrpSpPr>
+          <p:grpSpPr>
+            <a:xfrm>
+              <a:off x="2379431" y="2071934"/>
+              <a:ext cx="1296000" cy="2142181"/>
+              <a:chOff x="2256769" y="2709936"/>
+              <a:chExt cx="1502981" cy="2142181"/>
+            </a:xfrm>
+            <a:grpFill/>
+          </p:grpSpPr>
+          <p:sp>
+            <p:nvSpPr>
+              <p:cNvPr id="63" name="Rectangle 62"/>
+              <p:cNvSpPr/>
+              <p:nvPr/>
+            </p:nvSpPr>
+            <p:spPr>
+              <a:xfrm>
+                <a:off x="2256770" y="2709936"/>
+                <a:ext cx="1502980" cy="872358"/>
+              </a:xfrm>
+              <a:prstGeom prst="rect">
+                <a:avLst/>
+              </a:prstGeom>
+              <a:grpFill/>
+              <a:ln w="12700">
+                <a:solidFill>
+                  <a:srgbClr val="D3DBD9"/>
+                </a:solidFill>
+              </a:ln>
+            </p:spPr>
+            <p:style>
+              <a:lnRef idx="2">
+                <a:schemeClr val="accent1">
+                  <a:shade val="50000"/>
+                </a:schemeClr>
+              </a:lnRef>
+              <a:fillRef idx="1">
+                <a:schemeClr val="accent1"/>
+              </a:fillRef>
+              <a:effectRef idx="0">
+                <a:schemeClr val="accent1"/>
+              </a:effectRef>
+              <a:fontRef idx="minor">
+                <a:schemeClr val="lt1"/>
+              </a:fontRef>
+            </p:style>
+            <p:txBody>
+              <a:bodyPr rot="0" spcFirstLastPara="0" vertOverflow="overflow" horzOverflow="overflow" vert="horz" wrap="square" lIns="91440" tIns="45720" rIns="91440" bIns="45720" numCol="1" spcCol="0" rtlCol="0" fromWordArt="0" anchor="ctr" anchorCtr="0" forceAA="0" compatLnSpc="1">
+                <a:prstTxWarp prst="textNoShape">
+                  <a:avLst/>
+                </a:prstTxWarp>
+                <a:noAutofit/>
+              </a:bodyPr>
+              <a:lstStyle/>
+              <a:p>
+                <a:pPr algn="ctr">
+                  <a:lnSpc>
+                    <a:spcPct val="150000"/>
+                  </a:lnSpc>
+                </a:pPr>
+                <a:r>
+                  <a:rPr lang="en-US" sz="1150" dirty="0" smtClean="0">
+                    <a:solidFill>
+                      <a:schemeClr val="tx1"/>
+                    </a:solidFill>
+                    <a:latin typeface="Helvetica Neue" panose="02000503000000020004" pitchFamily="50"/>
+                  </a:rPr>
+                  <a:t>PERSONALITY, LIFE-STYLE, CREATIVITY</a:t>
+                </a:r>
+                <a:endParaRPr lang="en-US" sz="1150" baseline="30000" dirty="0">
+                  <a:solidFill>
+                    <a:schemeClr val="tx1"/>
+                  </a:solidFill>
+                  <a:latin typeface="Helvetica Neue" panose="02000503000000020004" pitchFamily="50"/>
+                </a:endParaRPr>
+              </a:p>
+            </p:txBody>
+          </p:sp>
+          <p:sp>
+            <p:nvSpPr>
+              <p:cNvPr id="25" name="Rectangle 24"/>
+              <p:cNvSpPr/>
+              <p:nvPr/>
+            </p:nvSpPr>
+            <p:spPr>
+              <a:xfrm>
+                <a:off x="2256769" y="3979759"/>
+                <a:ext cx="1502980" cy="872358"/>
+              </a:xfrm>
+              <a:prstGeom prst="rect">
+                <a:avLst/>
+              </a:prstGeom>
+              <a:grpFill/>
+              <a:ln w="12700">
+                <a:solidFill>
+                  <a:srgbClr val="D3DBD9"/>
+                </a:solidFill>
+              </a:ln>
+            </p:spPr>
+            <p:style>
+              <a:lnRef idx="2">
+                <a:schemeClr val="accent1">
+                  <a:shade val="50000"/>
+                </a:schemeClr>
+              </a:lnRef>
+              <a:fillRef idx="1">
+                <a:schemeClr val="accent1"/>
+              </a:fillRef>
+              <a:effectRef idx="0">
+                <a:schemeClr val="accent1"/>
+              </a:effectRef>
+              <a:fontRef idx="minor">
+                <a:schemeClr val="lt1"/>
+              </a:fontRef>
+            </p:style>
+            <p:txBody>
+              <a:bodyPr rot="0" spcFirstLastPara="0" vertOverflow="overflow" horzOverflow="overflow" vert="horz" wrap="square" lIns="91440" tIns="45720" rIns="91440" bIns="45720" numCol="1" spcCol="0" rtlCol="0" fromWordArt="0" anchor="ctr" anchorCtr="0" forceAA="0" compatLnSpc="1">
+                <a:prstTxWarp prst="textNoShape">
+                  <a:avLst/>
+                </a:prstTxWarp>
+                <a:noAutofit/>
+              </a:bodyPr>
+              <a:lstStyle/>
+              <a:p>
+                <a:pPr algn="ctr">
+                  <a:lnSpc>
+                    <a:spcPct val="150000"/>
+                  </a:lnSpc>
+                </a:pPr>
+                <a:r>
+                  <a:rPr lang="en-US" sz="1150" dirty="0" smtClean="0">
+                    <a:solidFill>
+                      <a:schemeClr val="tx1"/>
+                    </a:solidFill>
+                    <a:latin typeface="Helvetica Neue" panose="02000503000000020004" pitchFamily="50"/>
+                  </a:rPr>
+                  <a:t>DEFAULT NETWORK FUNCTIONING</a:t>
+                </a:r>
+                <a:endParaRPr lang="en-US" sz="1150" baseline="30000" dirty="0">
+                  <a:solidFill>
+                    <a:schemeClr val="tx1"/>
+                  </a:solidFill>
+                  <a:latin typeface="Helvetica Neue" panose="02000503000000020004" pitchFamily="50"/>
+                </a:endParaRPr>
+              </a:p>
+            </p:txBody>
+          </p:sp>
+        </p:grpSp>
+        <p:cxnSp>
+          <p:nvCxnSpPr>
+            <p:cNvPr id="29" name="Connecteur droit avec flèche 28"/>
+            <p:cNvCxnSpPr/>
+            <p:nvPr/>
+          </p:nvCxnSpPr>
+          <p:spPr>
+            <a:xfrm flipV="1">
+              <a:off x="3027430" y="2979638"/>
+              <a:ext cx="0" cy="326773"/>
+            </a:xfrm>
+            <a:prstGeom prst="straightConnector1">
+              <a:avLst/>
+            </a:prstGeom>
+            <a:grpFill/>
+            <a:ln w="28575">
+              <a:solidFill>
+                <a:schemeClr val="bg2">
+                  <a:lumMod val="25000"/>
+                </a:schemeClr>
+              </a:solidFill>
+              <a:headEnd type="triangle" w="med" len="med"/>
+              <a:tailEnd type="triangle" w="med" len="med"/>
+            </a:ln>
+          </p:spPr>
+          <p:style>
+            <a:lnRef idx="3">
+              <a:schemeClr val="dk1"/>
+            </a:lnRef>
+            <a:fillRef idx="0">
+              <a:schemeClr val="dk1"/>
+            </a:fillRef>
+            <a:effectRef idx="2">
+              <a:schemeClr val="dk1"/>
+            </a:effectRef>
+            <a:fontRef idx="minor">
+              <a:schemeClr val="tx1"/>
+            </a:fontRef>
+          </p:style>
+        </p:cxnSp>
+      </p:grpSp>
+      <p:cxnSp>
+        <p:nvCxnSpPr>
+          <p:cNvPr id="16" name="Connecteur droit avec flèche 15"/>
+          <p:cNvCxnSpPr/>
+          <p:nvPr/>
+        </p:nvCxnSpPr>
+        <p:spPr>
+          <a:xfrm>
+            <a:off x="7982857" y="3151599"/>
+            <a:ext cx="324000" cy="0"/>
+          </a:xfrm>
+          <a:prstGeom prst="straightConnector1">
+            <a:avLst/>
+          </a:prstGeom>
+          <a:ln w="28575">
+            <a:solidFill>
+              <a:schemeClr val="tx1">
+                <a:lumMod val="85000"/>
+                <a:lumOff val="15000"/>
+              </a:schemeClr>
+            </a:solidFill>
+            <a:tailEnd type="triangle"/>
+          </a:ln>
+        </p:spPr>
+        <p:style>
+          <a:lnRef idx="1">
+            <a:schemeClr val="dk1"/>
+          </a:lnRef>
+          <a:fillRef idx="0">
+            <a:schemeClr val="dk1"/>
+          </a:fillRef>
+          <a:effectRef idx="0">
+            <a:schemeClr val="dk1"/>
+          </a:effectRef>
+          <a:fontRef idx="minor">
+            <a:schemeClr val="tx1"/>
+          </a:fontRef>
+        </p:style>
+      </p:cxnSp>
+      <p:cxnSp>
+        <p:nvCxnSpPr>
+          <p:cNvPr id="33" name="Connecteur droit avec flèche 32"/>
+          <p:cNvCxnSpPr/>
+          <p:nvPr/>
+        </p:nvCxnSpPr>
+        <p:spPr>
+          <a:xfrm>
+            <a:off x="5961483" y="2517641"/>
+            <a:ext cx="370622" cy="191569"/>
+          </a:xfrm>
+          <a:prstGeom prst="straightConnector1">
+            <a:avLst/>
+          </a:prstGeom>
+          <a:ln w="28575">
+            <a:solidFill>
+              <a:schemeClr val="tx1">
+                <a:lumMod val="85000"/>
+                <a:lumOff val="15000"/>
+              </a:schemeClr>
+            </a:solidFill>
+            <a:tailEnd type="triangle"/>
+          </a:ln>
+        </p:spPr>
+        <p:style>
+          <a:lnRef idx="1">
+            <a:schemeClr val="dk1"/>
+          </a:lnRef>
+          <a:fillRef idx="0">
+            <a:schemeClr val="dk1"/>
+          </a:fillRef>
+          <a:effectRef idx="0">
+            <a:schemeClr val="dk1"/>
+          </a:effectRef>
+          <a:fontRef idx="minor">
+            <a:schemeClr val="tx1"/>
+          </a:fontRef>
+        </p:style>
+      </p:cxnSp>
+      <p:sp>
+        <p:nvSpPr>
+          <p:cNvPr id="31" name="ZoneTexte 30"/>
+          <p:cNvSpPr txBox="1"/>
+          <p:nvPr/>
+        </p:nvSpPr>
+        <p:spPr>
+          <a:xfrm>
+            <a:off x="7342961" y="3908758"/>
+            <a:ext cx="763202" cy="477054"/>
+          </a:xfrm>
+          <a:prstGeom prst="rect">
+            <a:avLst/>
+          </a:prstGeom>
+          <a:noFill/>
+        </p:spPr>
+        <p:txBody>
+          <a:bodyPr wrap="square" rtlCol="0">
+            <a:spAutoFit/>
+          </a:bodyPr>
+          <a:lstStyle/>
+          <a:p>
+            <a:pPr algn="ctr"/>
+            <a:r>
+              <a:rPr lang="en-US" sz="1250" dirty="0" smtClean="0">
+                <a:latin typeface="Helvetica Neue" panose="02000503000000020004" pitchFamily="50"/>
+              </a:rPr>
+              <a:t>Stage shift</a:t>
+            </a:r>
+            <a:endParaRPr lang="en-US" sz="1250" baseline="30000" dirty="0">
+              <a:latin typeface="Helvetica Neue" panose="02000503000000020004" pitchFamily="50"/>
+            </a:endParaRPr>
+          </a:p>
+        </p:txBody>
+      </p:sp>
+      <p:cxnSp>
+        <p:nvCxnSpPr>
+          <p:cNvPr id="34" name="Connecteur droit avec flèche 33"/>
+          <p:cNvCxnSpPr/>
+          <p:nvPr/>
+        </p:nvCxnSpPr>
+        <p:spPr>
+          <a:xfrm flipV="1">
+            <a:off x="7724217" y="3667014"/>
+            <a:ext cx="0" cy="216000"/>
+          </a:xfrm>
+          <a:prstGeom prst="straightConnector1">
+            <a:avLst/>
+          </a:prstGeom>
+          <a:ln w="12700">
+            <a:solidFill>
+              <a:schemeClr val="tx1">
+                <a:lumMod val="85000"/>
+                <a:lumOff val="15000"/>
+              </a:schemeClr>
+            </a:solidFill>
+            <a:tailEnd type="triangle"/>
+          </a:ln>
+        </p:spPr>
+        <p:style>
+          <a:lnRef idx="3">
+            <a:schemeClr val="dk1"/>
+          </a:lnRef>
+          <a:fillRef idx="0">
+            <a:schemeClr val="dk1"/>
+          </a:fillRef>
+          <a:effectRef idx="2">
+            <a:schemeClr val="dk1"/>
+          </a:effectRef>
+          <a:fontRef idx="minor">
+            <a:schemeClr val="tx1"/>
+          </a:fontRef>
+        </p:style>
+      </p:cxnSp>
+      <p:cxnSp>
+        <p:nvCxnSpPr>
+          <p:cNvPr id="35" name="Connecteur droit avec flèche 34"/>
+          <p:cNvCxnSpPr/>
+          <p:nvPr/>
+        </p:nvCxnSpPr>
+        <p:spPr>
+          <a:xfrm rot="16200000" flipV="1">
+            <a:off x="7204503" y="3922984"/>
+            <a:ext cx="0" cy="432000"/>
+          </a:xfrm>
+          <a:prstGeom prst="straightConnector1">
+            <a:avLst/>
+          </a:prstGeom>
+          <a:ln w="12700">
+            <a:solidFill>
+              <a:schemeClr val="tx1">
+                <a:lumMod val="85000"/>
+                <a:lumOff val="15000"/>
+              </a:schemeClr>
+            </a:solidFill>
+            <a:headEnd type="triangle" w="med" len="med"/>
+            <a:tailEnd type="triangle" w="med" len="med"/>
+          </a:ln>
+        </p:spPr>
+        <p:style>
+          <a:lnRef idx="3">
+            <a:schemeClr val="dk1"/>
+          </a:lnRef>
+          <a:fillRef idx="0">
+            <a:schemeClr val="dk1"/>
+          </a:fillRef>
+          <a:effectRef idx="2">
+            <a:schemeClr val="dk1"/>
+          </a:effectRef>
+          <a:fontRef idx="minor">
+            <a:schemeClr val="tx1"/>
+          </a:fontRef>
+        </p:style>
+      </p:cxnSp>
+      <p:cxnSp>
+        <p:nvCxnSpPr>
+          <p:cNvPr id="36" name="Connecteur droit avec flèche 35"/>
+          <p:cNvCxnSpPr/>
+          <p:nvPr/>
+        </p:nvCxnSpPr>
+        <p:spPr>
+          <a:xfrm flipV="1">
+            <a:off x="7724217" y="4412898"/>
+            <a:ext cx="0" cy="216000"/>
+          </a:xfrm>
+          <a:prstGeom prst="straightConnector1">
+            <a:avLst/>
+          </a:prstGeom>
+          <a:ln w="12700">
+            <a:solidFill>
+              <a:schemeClr val="tx1">
+                <a:lumMod val="85000"/>
+                <a:lumOff val="15000"/>
+              </a:schemeClr>
+            </a:solidFill>
+            <a:tailEnd type="triangle"/>
+          </a:ln>
+        </p:spPr>
+        <p:style>
+          <a:lnRef idx="3">
+            <a:schemeClr val="dk1"/>
+          </a:lnRef>
+          <a:fillRef idx="0">
+            <a:schemeClr val="dk1"/>
+          </a:fillRef>
+          <a:effectRef idx="2">
+            <a:schemeClr val="dk1"/>
+          </a:effectRef>
+          <a:fontRef idx="minor">
+            <a:schemeClr val="tx1"/>
+          </a:fontRef>
+        </p:style>
+      </p:cxnSp>
+      <p:sp>
+        <p:nvSpPr>
+          <p:cNvPr id="37" name="Rectangle 36"/>
+          <p:cNvSpPr/>
+          <p:nvPr/>
+        </p:nvSpPr>
+        <p:spPr>
+          <a:xfrm>
+            <a:off x="1321421" y="2721638"/>
+            <a:ext cx="866945" cy="879614"/>
+          </a:xfrm>
+          <a:prstGeom prst="rect">
+            <a:avLst/>
+          </a:prstGeom>
+          <a:noFill/>
+          <a:ln w="12700">
+            <a:noFill/>
+          </a:ln>
+        </p:spPr>
+        <p:style>
+          <a:lnRef idx="2">
+            <a:schemeClr val="accent1">
+              <a:shade val="50000"/>
+            </a:schemeClr>
+          </a:lnRef>
+          <a:fillRef idx="1">
+            <a:schemeClr val="accent1"/>
+          </a:fillRef>
+          <a:effectRef idx="0">
+            <a:schemeClr val="accent1"/>
+          </a:effectRef>
+          <a:fontRef idx="minor">
+            <a:schemeClr val="lt1"/>
+          </a:fontRef>
+        </p:style>
+        <p:txBody>
+          <a:bodyPr rot="0" spcFirstLastPara="0" vertOverflow="overflow" horzOverflow="overflow" vert="horz" wrap="square" lIns="91440" tIns="45720" rIns="91440" bIns="45720" numCol="1" spcCol="0" rtlCol="0" fromWordArt="0" anchor="ctr" anchorCtr="0" forceAA="0" compatLnSpc="1">
+            <a:prstTxWarp prst="textNoShape">
+              <a:avLst/>
+            </a:prstTxWarp>
+            <a:noAutofit/>
+          </a:bodyPr>
+          <a:lstStyle/>
+          <a:p>
+            <a:pPr algn="ctr">
+              <a:lnSpc>
+                <a:spcPct val="150000"/>
+              </a:lnSpc>
+            </a:pPr>
+            <a:r>
+              <a:rPr lang="en-US" sz="1200" dirty="0" smtClean="0">
+                <a:solidFill>
+                  <a:schemeClr val="tx1"/>
+                </a:solidFill>
+                <a:latin typeface="Helvetica Neue" panose="02000503000000020004" pitchFamily="50"/>
+              </a:rPr>
+              <a:t>AGE, </a:t>
+            </a:r>
+          </a:p>
+          <a:p>
+            <a:pPr algn="ctr">
+              <a:lnSpc>
+                <a:spcPct val="150000"/>
+              </a:lnSpc>
+            </a:pPr>
+            <a:r>
+              <a:rPr lang="en-US" sz="1200" dirty="0" smtClean="0">
+                <a:solidFill>
+                  <a:schemeClr val="tx1"/>
+                </a:solidFill>
+                <a:latin typeface="Helvetica Neue" panose="02000503000000020004" pitchFamily="50"/>
+              </a:rPr>
+              <a:t>SEX</a:t>
+            </a:r>
+            <a:endParaRPr lang="en-US" sz="1200" baseline="30000" dirty="0">
+              <a:solidFill>
+                <a:schemeClr val="tx1"/>
+              </a:solidFill>
+              <a:latin typeface="Helvetica Neue" panose="02000503000000020004" pitchFamily="50"/>
+            </a:endParaRPr>
+          </a:p>
+        </p:txBody>
+      </p:sp>
+      <p:cxnSp>
+        <p:nvCxnSpPr>
+          <p:cNvPr id="38" name="Connecteur droit avec flèche 37"/>
+          <p:cNvCxnSpPr/>
+          <p:nvPr/>
+        </p:nvCxnSpPr>
+        <p:spPr>
+          <a:xfrm flipV="1">
+            <a:off x="2115548" y="2709210"/>
+            <a:ext cx="361078" cy="216000"/>
+          </a:xfrm>
+          <a:prstGeom prst="straightConnector1">
+            <a:avLst/>
+          </a:prstGeom>
+          <a:ln w="28575">
+            <a:solidFill>
+              <a:schemeClr val="tx1">
+                <a:lumMod val="85000"/>
+                <a:lumOff val="15000"/>
+              </a:schemeClr>
+            </a:solidFill>
+            <a:tailEnd type="triangle"/>
+          </a:ln>
+        </p:spPr>
+        <p:style>
+          <a:lnRef idx="1">
+            <a:schemeClr val="dk1"/>
+          </a:lnRef>
+          <a:fillRef idx="0">
+            <a:schemeClr val="dk1"/>
+          </a:fillRef>
+          <a:effectRef idx="0">
+            <a:schemeClr val="dk1"/>
+          </a:effectRef>
+          <a:fontRef idx="minor">
+            <a:schemeClr val="tx1"/>
+          </a:fontRef>
+        </p:style>
+      </p:cxnSp>
+      <p:cxnSp>
+        <p:nvCxnSpPr>
+          <p:cNvPr id="39" name="Connecteur droit avec flèche 38"/>
+          <p:cNvCxnSpPr/>
+          <p:nvPr/>
+        </p:nvCxnSpPr>
+        <p:spPr>
+          <a:xfrm>
+            <a:off x="2113372" y="3421864"/>
+            <a:ext cx="361078" cy="216000"/>
+          </a:xfrm>
+          <a:prstGeom prst="straightConnector1">
+            <a:avLst/>
+          </a:prstGeom>
+          <a:ln w="28575">
+            <a:solidFill>
+              <a:schemeClr val="tx1">
+                <a:lumMod val="85000"/>
+                <a:lumOff val="15000"/>
+              </a:schemeClr>
+            </a:solidFill>
+            <a:tailEnd type="triangle"/>
+          </a:ln>
+        </p:spPr>
+        <p:style>
+          <a:lnRef idx="1">
+            <a:schemeClr val="dk1"/>
+          </a:lnRef>
+          <a:fillRef idx="0">
+            <a:schemeClr val="dk1"/>
+          </a:fillRef>
+          <a:effectRef idx="0">
+            <a:schemeClr val="dk1"/>
+          </a:effectRef>
+          <a:fontRef idx="minor">
+            <a:schemeClr val="tx1"/>
+          </a:fontRef>
+        </p:style>
+      </p:cxnSp>
+      <p:cxnSp>
+        <p:nvCxnSpPr>
+          <p:cNvPr id="40" name="Connecteur droit avec flèche 39"/>
+          <p:cNvCxnSpPr/>
+          <p:nvPr/>
+        </p:nvCxnSpPr>
+        <p:spPr>
+          <a:xfrm>
+            <a:off x="3994260" y="3788683"/>
+            <a:ext cx="360000" cy="0"/>
+          </a:xfrm>
+          <a:prstGeom prst="straightConnector1">
+            <a:avLst/>
+          </a:prstGeom>
+          <a:ln w="28575">
+            <a:solidFill>
+              <a:schemeClr val="tx1">
+                <a:lumMod val="85000"/>
+                <a:lumOff val="15000"/>
+              </a:schemeClr>
+            </a:solidFill>
+            <a:tailEnd type="triangle"/>
+          </a:ln>
+        </p:spPr>
+        <p:style>
+          <a:lnRef idx="1">
+            <a:schemeClr val="dk1"/>
+          </a:lnRef>
+          <a:fillRef idx="0">
+            <a:schemeClr val="dk1"/>
+          </a:fillRef>
+          <a:effectRef idx="0">
+            <a:schemeClr val="dk1"/>
+          </a:effectRef>
+          <a:fontRef idx="minor">
+            <a:schemeClr val="tx1"/>
+          </a:fontRef>
+        </p:style>
+      </p:cxnSp>
+      <p:cxnSp>
+        <p:nvCxnSpPr>
+          <p:cNvPr id="41" name="Connecteur droit avec flèche 40"/>
+          <p:cNvCxnSpPr/>
+          <p:nvPr/>
+        </p:nvCxnSpPr>
+        <p:spPr>
+          <a:xfrm flipV="1">
+            <a:off x="5961483" y="3593445"/>
+            <a:ext cx="370622" cy="191569"/>
+          </a:xfrm>
+          <a:prstGeom prst="straightConnector1">
+            <a:avLst/>
+          </a:prstGeom>
+          <a:ln w="28575">
+            <a:solidFill>
+              <a:schemeClr val="tx1">
+                <a:lumMod val="85000"/>
+                <a:lumOff val="15000"/>
+              </a:schemeClr>
+            </a:solidFill>
+            <a:tailEnd type="triangle"/>
+          </a:ln>
+        </p:spPr>
+        <p:style>
+          <a:lnRef idx="1">
+            <a:schemeClr val="dk1"/>
+          </a:lnRef>
+          <a:fillRef idx="0">
+            <a:schemeClr val="dk1"/>
+          </a:fillRef>
+          <a:effectRef idx="0">
+            <a:schemeClr val="dk1"/>
+          </a:effectRef>
+          <a:fontRef idx="minor">
+            <a:schemeClr val="tx1"/>
+          </a:fontRef>
+        </p:style>
+      </p:cxnSp>
+      <p:cxnSp>
+        <p:nvCxnSpPr>
+          <p:cNvPr id="50" name="Connecteur droit avec flèche 49"/>
+          <p:cNvCxnSpPr/>
+          <p:nvPr/>
+        </p:nvCxnSpPr>
+        <p:spPr>
+          <a:xfrm flipV="1">
+            <a:off x="3999876" y="3018077"/>
+            <a:ext cx="356224" cy="304852"/>
+          </a:xfrm>
+          <a:prstGeom prst="straightConnector1">
+            <a:avLst/>
+          </a:prstGeom>
+          <a:ln w="12700">
+            <a:solidFill>
+              <a:schemeClr val="tx1">
+                <a:lumMod val="75000"/>
+                <a:lumOff val="25000"/>
+              </a:schemeClr>
+            </a:solidFill>
+            <a:tailEnd type="triangle"/>
+          </a:ln>
+        </p:spPr>
+        <p:style>
+          <a:lnRef idx="1">
+            <a:schemeClr val="dk1"/>
+          </a:lnRef>
+          <a:fillRef idx="0">
+            <a:schemeClr val="dk1"/>
+          </a:fillRef>
+          <a:effectRef idx="0">
+            <a:schemeClr val="dk1"/>
+          </a:effectRef>
+          <a:fontRef idx="minor">
+            <a:schemeClr val="tx1"/>
+          </a:fontRef>
+        </p:style>
+      </p:cxnSp>
+      <p:cxnSp>
+        <p:nvCxnSpPr>
+          <p:cNvPr id="52" name="Connecteur droit avec flèche 51"/>
+          <p:cNvCxnSpPr/>
+          <p:nvPr/>
+        </p:nvCxnSpPr>
+        <p:spPr>
+          <a:xfrm>
+            <a:off x="3986935" y="3016774"/>
+            <a:ext cx="356224" cy="304852"/>
+          </a:xfrm>
+          <a:prstGeom prst="straightConnector1">
+            <a:avLst/>
+          </a:prstGeom>
+          <a:ln w="12700">
+            <a:solidFill>
+              <a:schemeClr val="tx1">
+                <a:lumMod val="75000"/>
+                <a:lumOff val="25000"/>
+              </a:schemeClr>
+            </a:solidFill>
+            <a:tailEnd type="triangle"/>
+          </a:ln>
+        </p:spPr>
+        <p:style>
+          <a:lnRef idx="1">
+            <a:schemeClr val="dk1"/>
+          </a:lnRef>
+          <a:fillRef idx="0">
+            <a:schemeClr val="dk1"/>
+          </a:fillRef>
+          <a:effectRef idx="0">
+            <a:schemeClr val="dk1"/>
+          </a:effectRef>
+          <a:fontRef idx="minor">
+            <a:schemeClr val="tx1"/>
+          </a:fontRef>
+        </p:style>
+      </p:cxnSp>
+      <p:grpSp>
+        <p:nvGrpSpPr>
+          <p:cNvPr id="18" name="Groupe 17"/>
+          <p:cNvGrpSpPr/>
+          <p:nvPr/>
+        </p:nvGrpSpPr>
+        <p:grpSpPr>
+          <a:xfrm>
+            <a:off x="1589054" y="4724763"/>
+            <a:ext cx="2307872" cy="360000"/>
+            <a:chOff x="2286000" y="4735281"/>
+            <a:chExt cx="2307872" cy="360000"/>
+          </a:xfrm>
+        </p:grpSpPr>
+        <p:sp>
+          <p:nvSpPr>
+            <p:cNvPr id="46" name="Rectangle 45"/>
+            <p:cNvSpPr/>
+            <p:nvPr/>
+          </p:nvSpPr>
+          <p:spPr>
+            <a:xfrm>
+              <a:off x="2388023" y="4807710"/>
+              <a:ext cx="216000" cy="216000"/>
+            </a:xfrm>
+            <a:prstGeom prst="rect">
+              <a:avLst/>
+            </a:prstGeom>
+            <a:solidFill>
+              <a:srgbClr val="222A29"/>
+            </a:solidFill>
+            <a:ln w="12700">
+              <a:solidFill>
+                <a:schemeClr val="tx1">
+                  <a:lumMod val="95000"/>
+                  <a:lumOff val="5000"/>
+                </a:schemeClr>
+              </a:solidFill>
+            </a:ln>
+          </p:spPr>
+          <p:style>
+            <a:lnRef idx="2">
+              <a:schemeClr val="accent1">
+                <a:shade val="50000"/>
+              </a:schemeClr>
+            </a:lnRef>
+            <a:fillRef idx="1">
+              <a:schemeClr val="accent1"/>
+            </a:fillRef>
+            <a:effectRef idx="0">
+              <a:schemeClr val="accent1"/>
+            </a:effectRef>
+            <a:fontRef idx="minor">
+              <a:schemeClr val="lt1"/>
+            </a:fontRef>
+          </p:style>
+          <p:txBody>
+            <a:bodyPr rot="0" spcFirstLastPara="0" vertOverflow="overflow" horzOverflow="overflow" vert="horz" wrap="square" lIns="91440" tIns="45720" rIns="91440" bIns="45720" numCol="1" spcCol="0" rtlCol="0" fromWordArt="0" anchor="ctr" anchorCtr="0" forceAA="0" compatLnSpc="1">
+              <a:prstTxWarp prst="textNoShape">
+                <a:avLst/>
+              </a:prstTxWarp>
+              <a:noAutofit/>
+            </a:bodyPr>
+            <a:lstStyle/>
+            <a:p>
+              <a:pPr algn="ctr">
+                <a:lnSpc>
+                  <a:spcPct val="150000"/>
+                </a:lnSpc>
+              </a:pPr>
+              <a:endParaRPr lang="en-US" sz="1000" dirty="0">
+                <a:solidFill>
+                  <a:schemeClr val="tx1"/>
+                </a:solidFill>
+                <a:latin typeface="Helvetica Neue" panose="02000503000000020004" pitchFamily="50"/>
+              </a:endParaRPr>
+            </a:p>
+          </p:txBody>
+        </p:sp>
+        <p:sp>
+          <p:nvSpPr>
+            <p:cNvPr id="47" name="ZoneTexte 46"/>
+            <p:cNvSpPr txBox="1"/>
+            <p:nvPr/>
+          </p:nvSpPr>
+          <p:spPr>
+            <a:xfrm>
+              <a:off x="2617899" y="4777210"/>
+              <a:ext cx="596638" cy="261610"/>
+            </a:xfrm>
+            <a:prstGeom prst="rect">
+              <a:avLst/>
+            </a:prstGeom>
+            <a:noFill/>
+          </p:spPr>
+          <p:txBody>
+            <a:bodyPr wrap="none" rtlCol="0">
+              <a:spAutoFit/>
+            </a:bodyPr>
+            <a:lstStyle/>
+            <a:p>
+              <a:r>
+                <a:rPr lang="en-US" sz="1100" dirty="0" smtClean="0">
+                  <a:latin typeface="Roboto Medium" panose="02000000000000000000" pitchFamily="2" charset="0"/>
+                  <a:ea typeface="Roboto Medium" panose="02000000000000000000" pitchFamily="2" charset="0"/>
+                </a:rPr>
+                <a:t>SLEEP</a:t>
+              </a:r>
+              <a:endParaRPr lang="en-US" sz="1100" dirty="0">
+                <a:latin typeface="Roboto Medium" panose="02000000000000000000" pitchFamily="2" charset="0"/>
+                <a:ea typeface="Roboto Medium" panose="02000000000000000000" pitchFamily="2" charset="0"/>
+              </a:endParaRPr>
+            </a:p>
+          </p:txBody>
+        </p:sp>
+        <p:sp>
+          <p:nvSpPr>
+            <p:cNvPr id="48" name="Rectangle 47"/>
+            <p:cNvSpPr/>
+            <p:nvPr/>
+          </p:nvSpPr>
+          <p:spPr>
+            <a:xfrm>
+              <a:off x="3289663" y="4807710"/>
+              <a:ext cx="216000" cy="216000"/>
+            </a:xfrm>
+            <a:prstGeom prst="rect">
+              <a:avLst/>
+            </a:prstGeom>
+            <a:solidFill>
+              <a:srgbClr val="E8ECEB"/>
+            </a:solidFill>
+            <a:ln w="19050">
+              <a:solidFill>
+                <a:schemeClr val="tx1">
+                  <a:lumMod val="85000"/>
+                  <a:lumOff val="15000"/>
+                </a:schemeClr>
+              </a:solidFill>
+            </a:ln>
+          </p:spPr>
+          <p:style>
+            <a:lnRef idx="2">
+              <a:schemeClr val="accent1">
+                <a:shade val="50000"/>
+              </a:schemeClr>
+            </a:lnRef>
+            <a:fillRef idx="1">
+              <a:schemeClr val="accent1"/>
+            </a:fillRef>
+            <a:effectRef idx="0">
+              <a:schemeClr val="accent1"/>
+            </a:effectRef>
+            <a:fontRef idx="minor">
+              <a:schemeClr val="lt1"/>
+            </a:fontRef>
+          </p:style>
+          <p:txBody>
+            <a:bodyPr rot="0" spcFirstLastPara="0" vertOverflow="overflow" horzOverflow="overflow" vert="horz" wrap="square" lIns="91440" tIns="45720" rIns="91440" bIns="45720" numCol="1" spcCol="0" rtlCol="0" fromWordArt="0" anchor="ctr" anchorCtr="0" forceAA="0" compatLnSpc="1">
+              <a:prstTxWarp prst="textNoShape">
+                <a:avLst/>
+              </a:prstTxWarp>
+              <a:noAutofit/>
+            </a:bodyPr>
+            <a:lstStyle/>
+            <a:p>
+              <a:pPr algn="ctr">
+                <a:lnSpc>
+                  <a:spcPct val="150000"/>
+                </a:lnSpc>
+              </a:pPr>
+              <a:endParaRPr lang="en-US" sz="1000" dirty="0">
+                <a:solidFill>
+                  <a:schemeClr val="tx1"/>
+                </a:solidFill>
+                <a:latin typeface="Helvetica Neue" panose="02000503000000020004" pitchFamily="50"/>
+              </a:endParaRPr>
+            </a:p>
+          </p:txBody>
+        </p:sp>
+        <p:sp>
+          <p:nvSpPr>
+            <p:cNvPr id="49" name="ZoneTexte 48"/>
+            <p:cNvSpPr txBox="1"/>
+            <p:nvPr/>
+          </p:nvSpPr>
+          <p:spPr>
+            <a:xfrm>
+              <a:off x="3519539" y="4777210"/>
+              <a:ext cx="1000595" cy="261610"/>
+            </a:xfrm>
+            <a:prstGeom prst="rect">
+              <a:avLst/>
+            </a:prstGeom>
+            <a:noFill/>
+          </p:spPr>
+          <p:txBody>
+            <a:bodyPr wrap="none" rtlCol="0">
+              <a:spAutoFit/>
+            </a:bodyPr>
+            <a:lstStyle/>
+            <a:p>
+              <a:r>
+                <a:rPr lang="en-US" sz="1100" dirty="0" smtClean="0">
+                  <a:latin typeface="Roboto Medium" panose="02000000000000000000" pitchFamily="2" charset="0"/>
+                  <a:ea typeface="Roboto Medium" panose="02000000000000000000" pitchFamily="2" charset="0"/>
+                </a:rPr>
+                <a:t>AWAKENING</a:t>
+              </a:r>
+              <a:endParaRPr lang="en-US" sz="1100" dirty="0">
+                <a:latin typeface="Roboto Medium" panose="02000000000000000000" pitchFamily="2" charset="0"/>
+                <a:ea typeface="Roboto Medium" panose="02000000000000000000" pitchFamily="2" charset="0"/>
+              </a:endParaRPr>
+            </a:p>
+          </p:txBody>
+        </p:sp>
+        <p:sp>
+          <p:nvSpPr>
+            <p:cNvPr id="17" name="Rectangle 16"/>
+            <p:cNvSpPr/>
+            <p:nvPr/>
+          </p:nvSpPr>
+          <p:spPr>
+            <a:xfrm>
+              <a:off x="2286000" y="4735281"/>
+              <a:ext cx="2307872" cy="360000"/>
+            </a:xfrm>
+            <a:prstGeom prst="rect">
+              <a:avLst/>
+            </a:prstGeom>
+            <a:noFill/>
+            <a:ln w="12700">
+              <a:solidFill>
+                <a:srgbClr val="343F3E"/>
+              </a:solidFill>
+              <a:prstDash val="sysDot"/>
+            </a:ln>
+          </p:spPr>
+          <p:style>
+            <a:lnRef idx="2">
+              <a:schemeClr val="accent1">
+                <a:shade val="50000"/>
+              </a:schemeClr>
+            </a:lnRef>
+            <a:fillRef idx="1">
+              <a:schemeClr val="accent1"/>
+            </a:fillRef>
+            <a:effectRef idx="0">
+              <a:schemeClr val="accent1"/>
+            </a:effectRef>
+            <a:fontRef idx="minor">
+              <a:schemeClr val="lt1"/>
+            </a:fontRef>
+          </p:style>
+          <p:txBody>
+            <a:bodyPr rtlCol="0" anchor="ctr"/>
+            <a:lstStyle/>
+            <a:p>
+              <a:pPr algn="ctr"/>
+              <a:endParaRPr lang="en-US"/>
+            </a:p>
+          </p:txBody>
+        </p:sp>
+      </p:grpSp>
+    </p:spTree>
+    <p:extLst>
+      <p:ext uri="{BB962C8B-B14F-4D97-AF65-F5344CB8AC3E}">
+        <p14:creationId xmlns:p14="http://schemas.microsoft.com/office/powerpoint/2010/main" val="232368218"/>
+      </p:ext>
+    </p:extLst>
+  </p:cSld>
+  <p:clrMapOvr>
+    <a:masterClrMapping/>
+  </p:clrMapOvr>
+</p:sld>
+</file>
+
+<file path=ppt/slides/slide2.xml><?xml version="1.0" encoding="utf-8"?>
+<p:sld xmlns:a="http://schemas.openxmlformats.org/drawingml/2006/main" xmlns:r="http://schemas.openxmlformats.org/officeDocument/2006/relationships" xmlns:p="http://schemas.openxmlformats.org/presentationml/2006/main">
+  <p:cSld>
+    <p:spTree>
+      <p:nvGrpSpPr>
+        <p:cNvPr id="1" name=""/>
+        <p:cNvGrpSpPr/>
+        <p:nvPr/>
+      </p:nvGrpSpPr>
+      <p:grpSpPr>
+        <a:xfrm>
+          <a:off x="0" y="0"/>
+          <a:ext cx="0" cy="0"/>
+          <a:chOff x="0" y="0"/>
+          <a:chExt cx="0" cy="0"/>
+        </a:xfrm>
+      </p:grpSpPr>
+      <p:sp>
+        <p:nvSpPr>
+          <p:cNvPr id="4" name="Rectangle 3"/>
+          <p:cNvSpPr/>
+          <p:nvPr/>
+        </p:nvSpPr>
+        <p:spPr>
+          <a:xfrm>
+            <a:off x="4436668" y="3353029"/>
+            <a:ext cx="1440000" cy="872358"/>
+          </a:xfrm>
+          <a:prstGeom prst="rect">
+            <a:avLst/>
+          </a:prstGeom>
+          <a:noFill/>
+          <a:ln w="12700">
+            <a:solidFill>
+              <a:schemeClr val="tx2">
+                <a:lumMod val="75000"/>
+              </a:schemeClr>
+            </a:solidFill>
+          </a:ln>
+        </p:spPr>
+        <p:style>
+          <a:lnRef idx="2">
+            <a:schemeClr val="accent1">
+              <a:shade val="50000"/>
+            </a:schemeClr>
+          </a:lnRef>
+          <a:fillRef idx="1">
+            <a:schemeClr val="accent1"/>
+          </a:fillRef>
+          <a:effectRef idx="0">
+            <a:schemeClr val="accent1"/>
+          </a:effectRef>
+          <a:fontRef idx="minor">
+            <a:schemeClr val="lt1"/>
+          </a:fontRef>
+        </p:style>
+        <p:txBody>
+          <a:bodyPr rot="0" spcFirstLastPara="0" vertOverflow="overflow" horzOverflow="overflow" vert="horz" wrap="square" lIns="91440" tIns="45720" rIns="91440" bIns="45720" numCol="1" spcCol="0" rtlCol="0" fromWordArt="0" anchor="ctr" anchorCtr="0" forceAA="0" compatLnSpc="1">
+            <a:prstTxWarp prst="textNoShape">
+              <a:avLst/>
+            </a:prstTxWarp>
+            <a:noAutofit/>
+          </a:bodyPr>
+          <a:lstStyle/>
+          <a:p>
+            <a:pPr algn="ctr">
+              <a:lnSpc>
+                <a:spcPct val="150000"/>
+              </a:lnSpc>
+            </a:pPr>
+            <a:r>
+              <a:rPr lang="en-US" sz="1150" dirty="0" smtClean="0">
+                <a:solidFill>
+                  <a:schemeClr val="tx1"/>
+                </a:solidFill>
+                <a:latin typeface="Helvetica Neue" panose="02000503000000020004" pitchFamily="50"/>
+              </a:rPr>
+              <a:t>INTRA-SLEEP </a:t>
+            </a:r>
+            <a:r>
+              <a:rPr lang="en-US" sz="1150" b="1" dirty="0" smtClean="0">
+                <a:solidFill>
+                  <a:schemeClr val="tx1"/>
+                </a:solidFill>
+                <a:latin typeface="Helvetica Neue" panose="02000503000000020004" pitchFamily="50"/>
+              </a:rPr>
+              <a:t>AWAKENINGS</a:t>
+            </a:r>
+            <a:endParaRPr lang="en-US" sz="1150" b="1" baseline="30000" dirty="0">
+              <a:solidFill>
+                <a:schemeClr val="tx1"/>
+              </a:solidFill>
+              <a:latin typeface="Helvetica Neue" panose="02000503000000020004" pitchFamily="50"/>
+            </a:endParaRPr>
+          </a:p>
+        </p:txBody>
+      </p:sp>
+      <p:sp>
+        <p:nvSpPr>
+          <p:cNvPr id="7" name="Rectangle 6"/>
+          <p:cNvSpPr/>
+          <p:nvPr/>
+        </p:nvSpPr>
+        <p:spPr>
+          <a:xfrm>
+            <a:off x="6404699" y="2721087"/>
+            <a:ext cx="1502980" cy="872358"/>
+          </a:xfrm>
+          <a:prstGeom prst="rect">
+            <a:avLst/>
+          </a:prstGeom>
+          <a:noFill/>
+          <a:ln w="12700">
+            <a:solidFill>
+              <a:schemeClr val="tx2">
+                <a:lumMod val="75000"/>
+              </a:schemeClr>
+            </a:solidFill>
+          </a:ln>
+        </p:spPr>
+        <p:style>
+          <a:lnRef idx="2">
+            <a:schemeClr val="accent1">
+              <a:shade val="50000"/>
+            </a:schemeClr>
+          </a:lnRef>
+          <a:fillRef idx="1">
+            <a:schemeClr val="accent1"/>
+          </a:fillRef>
+          <a:effectRef idx="0">
+            <a:schemeClr val="accent1"/>
+          </a:effectRef>
+          <a:fontRef idx="minor">
+            <a:schemeClr val="lt1"/>
+          </a:fontRef>
+        </p:style>
+        <p:txBody>
+          <a:bodyPr rot="0" spcFirstLastPara="0" vertOverflow="overflow" horzOverflow="overflow" vert="horz" wrap="square" lIns="91440" tIns="45720" rIns="91440" bIns="45720" numCol="1" spcCol="0" rtlCol="0" fromWordArt="0" anchor="ctr" anchorCtr="0" forceAA="0" compatLnSpc="1">
+            <a:prstTxWarp prst="textNoShape">
+              <a:avLst/>
+            </a:prstTxWarp>
+            <a:noAutofit/>
+          </a:bodyPr>
+          <a:lstStyle/>
+          <a:p>
+            <a:pPr algn="ctr">
+              <a:lnSpc>
+                <a:spcPct val="150000"/>
+              </a:lnSpc>
+            </a:pPr>
+            <a:r>
+              <a:rPr lang="en-US" sz="1100" b="1" dirty="0" smtClean="0">
+                <a:solidFill>
+                  <a:schemeClr val="tx1"/>
+                </a:solidFill>
+                <a:latin typeface="Helvetica Neue" panose="02000503000000020004" pitchFamily="50"/>
+              </a:rPr>
+              <a:t>ENCODING</a:t>
+            </a:r>
+            <a:r>
+              <a:rPr lang="en-US" sz="1100" dirty="0" smtClean="0">
+                <a:solidFill>
+                  <a:schemeClr val="tx1"/>
+                </a:solidFill>
+                <a:latin typeface="Helvetica Neue" panose="02000503000000020004" pitchFamily="50"/>
+              </a:rPr>
+              <a:t> OF DREAM IN LONG TERM MEMORY</a:t>
+            </a:r>
+            <a:endParaRPr lang="en-US" sz="1100" baseline="30000" dirty="0">
+              <a:solidFill>
+                <a:schemeClr val="tx1"/>
+              </a:solidFill>
+              <a:latin typeface="Helvetica Neue" panose="02000503000000020004" pitchFamily="50"/>
+            </a:endParaRPr>
+          </a:p>
+        </p:txBody>
+      </p:sp>
+      <p:sp>
+        <p:nvSpPr>
+          <p:cNvPr id="8" name="ZoneTexte 7"/>
+          <p:cNvSpPr txBox="1"/>
+          <p:nvPr/>
+        </p:nvSpPr>
+        <p:spPr>
+          <a:xfrm>
+            <a:off x="6266152" y="3908758"/>
+            <a:ext cx="763202" cy="461665"/>
+          </a:xfrm>
+          <a:prstGeom prst="rect">
+            <a:avLst/>
+          </a:prstGeom>
+          <a:noFill/>
+        </p:spPr>
+        <p:txBody>
+          <a:bodyPr wrap="square" rtlCol="0">
+            <a:spAutoFit/>
+          </a:bodyPr>
+          <a:lstStyle/>
+          <a:p>
+            <a:pPr algn="ctr"/>
+            <a:r>
+              <a:rPr lang="en-US" sz="1200" dirty="0" smtClean="0">
+                <a:latin typeface="Helvetica Neue" panose="02000503000000020004" pitchFamily="50"/>
+              </a:rPr>
+              <a:t>Sleep </a:t>
+            </a:r>
+          </a:p>
+          <a:p>
+            <a:pPr algn="ctr"/>
+            <a:r>
+              <a:rPr lang="en-US" sz="1200" dirty="0" smtClean="0">
+                <a:latin typeface="Helvetica Neue" panose="02000503000000020004" pitchFamily="50"/>
+              </a:rPr>
+              <a:t>inertia</a:t>
+            </a:r>
+            <a:endParaRPr lang="en-US" sz="1200" baseline="30000" dirty="0">
+              <a:latin typeface="Helvetica Neue" panose="02000503000000020004" pitchFamily="50"/>
+            </a:endParaRPr>
+          </a:p>
+        </p:txBody>
+      </p:sp>
+      <p:sp>
+        <p:nvSpPr>
+          <p:cNvPr id="9" name="ZoneTexte 8"/>
+          <p:cNvSpPr txBox="1"/>
+          <p:nvPr/>
+        </p:nvSpPr>
+        <p:spPr>
+          <a:xfrm>
+            <a:off x="6290523" y="4666701"/>
+            <a:ext cx="1735696" cy="276999"/>
+          </a:xfrm>
+          <a:prstGeom prst="rect">
+            <a:avLst/>
+          </a:prstGeom>
+          <a:noFill/>
+        </p:spPr>
+        <p:txBody>
+          <a:bodyPr wrap="square" rtlCol="0">
+            <a:spAutoFit/>
+          </a:bodyPr>
+          <a:lstStyle/>
+          <a:p>
+            <a:pPr algn="ctr"/>
+            <a:r>
+              <a:rPr lang="en-US" sz="1200" dirty="0" smtClean="0">
+                <a:latin typeface="Helvetica Neue" panose="02000503000000020004" pitchFamily="50"/>
+              </a:rPr>
+              <a:t>Physiological context</a:t>
+            </a:r>
+            <a:endParaRPr lang="en-US" sz="1200" baseline="30000" dirty="0">
+              <a:latin typeface="Helvetica Neue" panose="02000503000000020004" pitchFamily="50"/>
+            </a:endParaRPr>
+          </a:p>
+        </p:txBody>
+      </p:sp>
+      <p:cxnSp>
+        <p:nvCxnSpPr>
+          <p:cNvPr id="19" name="Connecteur droit avec flèche 18"/>
+          <p:cNvCxnSpPr/>
+          <p:nvPr/>
+        </p:nvCxnSpPr>
+        <p:spPr>
+          <a:xfrm flipV="1">
+            <a:off x="6640797" y="4412898"/>
+            <a:ext cx="0" cy="216000"/>
+          </a:xfrm>
+          <a:prstGeom prst="straightConnector1">
+            <a:avLst/>
+          </a:prstGeom>
+          <a:ln w="12700">
+            <a:solidFill>
+              <a:schemeClr val="tx1">
+                <a:lumMod val="85000"/>
+                <a:lumOff val="15000"/>
+              </a:schemeClr>
+            </a:solidFill>
+            <a:tailEnd type="triangle"/>
+          </a:ln>
+        </p:spPr>
+        <p:style>
+          <a:lnRef idx="3">
+            <a:schemeClr val="dk1"/>
+          </a:lnRef>
+          <a:fillRef idx="0">
+            <a:schemeClr val="dk1"/>
+          </a:fillRef>
+          <a:effectRef idx="2">
+            <a:schemeClr val="dk1"/>
+          </a:effectRef>
+          <a:fontRef idx="minor">
+            <a:schemeClr val="tx1"/>
+          </a:fontRef>
+        </p:style>
+      </p:cxnSp>
+      <p:cxnSp>
+        <p:nvCxnSpPr>
+          <p:cNvPr id="20" name="Connecteur droit avec flèche 19"/>
+          <p:cNvCxnSpPr/>
+          <p:nvPr/>
+        </p:nvCxnSpPr>
+        <p:spPr>
+          <a:xfrm flipV="1">
+            <a:off x="6647408" y="3667014"/>
+            <a:ext cx="0" cy="216000"/>
+          </a:xfrm>
+          <a:prstGeom prst="straightConnector1">
+            <a:avLst/>
+          </a:prstGeom>
+          <a:ln w="12700">
+            <a:solidFill>
+              <a:schemeClr val="tx1">
+                <a:lumMod val="85000"/>
+                <a:lumOff val="15000"/>
+              </a:schemeClr>
+            </a:solidFill>
+            <a:tailEnd type="triangle"/>
+          </a:ln>
+        </p:spPr>
+        <p:style>
+          <a:lnRef idx="3">
+            <a:schemeClr val="dk1"/>
+          </a:lnRef>
+          <a:fillRef idx="0">
+            <a:schemeClr val="dk1"/>
+          </a:fillRef>
+          <a:effectRef idx="2">
+            <a:schemeClr val="dk1"/>
+          </a:effectRef>
+          <a:fontRef idx="minor">
+            <a:schemeClr val="tx1"/>
+          </a:fontRef>
+        </p:style>
+      </p:cxnSp>
+      <p:sp>
+        <p:nvSpPr>
+          <p:cNvPr id="26" name="Rectangle 25"/>
+          <p:cNvSpPr/>
+          <p:nvPr/>
+        </p:nvSpPr>
+        <p:spPr>
+          <a:xfrm>
+            <a:off x="4436668" y="2083206"/>
+            <a:ext cx="1440000" cy="872358"/>
+          </a:xfrm>
+          <a:prstGeom prst="rect">
+            <a:avLst/>
+          </a:prstGeom>
+          <a:noFill/>
+          <a:ln w="12700">
+            <a:solidFill>
+              <a:schemeClr val="tx2">
+                <a:lumMod val="75000"/>
+              </a:schemeClr>
+            </a:solidFill>
+          </a:ln>
+        </p:spPr>
+        <p:style>
+          <a:lnRef idx="2">
+            <a:schemeClr val="accent1">
+              <a:shade val="50000"/>
+            </a:schemeClr>
+          </a:lnRef>
+          <a:fillRef idx="1">
+            <a:schemeClr val="accent1"/>
+          </a:fillRef>
+          <a:effectRef idx="0">
+            <a:schemeClr val="accent1"/>
+          </a:effectRef>
+          <a:fontRef idx="minor">
+            <a:schemeClr val="lt1"/>
+          </a:fontRef>
+        </p:style>
+        <p:txBody>
+          <a:bodyPr rot="0" spcFirstLastPara="0" vertOverflow="overflow" horzOverflow="overflow" vert="horz" wrap="square" lIns="91440" tIns="45720" rIns="91440" bIns="45720" numCol="1" spcCol="0" rtlCol="0" fromWordArt="0" anchor="ctr" anchorCtr="0" forceAA="0" compatLnSpc="1">
+            <a:prstTxWarp prst="textNoShape">
+              <a:avLst/>
+            </a:prstTxWarp>
+            <a:noAutofit/>
+          </a:bodyPr>
+          <a:lstStyle/>
+          <a:p>
+            <a:pPr algn="ctr">
+              <a:lnSpc>
+                <a:spcPct val="150000"/>
+              </a:lnSpc>
+            </a:pPr>
+            <a:r>
+              <a:rPr lang="en-US" sz="1150" b="1" dirty="0" smtClean="0">
+                <a:solidFill>
+                  <a:schemeClr val="tx1"/>
+                </a:solidFill>
+                <a:latin typeface="Helvetica Neue" panose="02000503000000020004" pitchFamily="50"/>
+              </a:rPr>
+              <a:t>SALIENCE </a:t>
+            </a:r>
+            <a:r>
+              <a:rPr lang="en-US" sz="1150" b="1" dirty="0">
+                <a:solidFill>
+                  <a:schemeClr val="tx1"/>
+                </a:solidFill>
+                <a:latin typeface="Helvetica Neue" panose="02000503000000020004" pitchFamily="50"/>
+              </a:rPr>
+              <a:t> </a:t>
+            </a:r>
+            <a:r>
+              <a:rPr lang="en-US" sz="1150" b="1" dirty="0" smtClean="0">
+                <a:solidFill>
+                  <a:schemeClr val="tx1"/>
+                </a:solidFill>
+                <a:latin typeface="Helvetica Neue" panose="02000503000000020004" pitchFamily="50"/>
+              </a:rPr>
+              <a:t>        </a:t>
+            </a:r>
+            <a:r>
+              <a:rPr lang="en-US" sz="1150" dirty="0" smtClean="0">
+                <a:solidFill>
+                  <a:schemeClr val="tx1"/>
+                </a:solidFill>
+                <a:latin typeface="Helvetica Neue" panose="02000503000000020004" pitchFamily="50"/>
+              </a:rPr>
+              <a:t>OF DREAM CONTENT</a:t>
+            </a:r>
+            <a:endParaRPr lang="en-US" sz="1150" baseline="30000" dirty="0">
+              <a:solidFill>
+                <a:schemeClr val="tx1"/>
+              </a:solidFill>
+              <a:latin typeface="Helvetica Neue" panose="02000503000000020004" pitchFamily="50"/>
+            </a:endParaRPr>
+          </a:p>
+        </p:txBody>
+      </p:sp>
+      <p:cxnSp>
+        <p:nvCxnSpPr>
+          <p:cNvPr id="42" name="Connecteur droit avec flèche 41"/>
+          <p:cNvCxnSpPr/>
+          <p:nvPr/>
+        </p:nvCxnSpPr>
+        <p:spPr>
+          <a:xfrm>
+            <a:off x="7157229" y="2409641"/>
+            <a:ext cx="0" cy="216000"/>
+          </a:xfrm>
+          <a:prstGeom prst="straightConnector1">
+            <a:avLst/>
+          </a:prstGeom>
+          <a:ln w="12700">
+            <a:solidFill>
+              <a:schemeClr val="tx1">
+                <a:lumMod val="85000"/>
+                <a:lumOff val="15000"/>
+              </a:schemeClr>
+            </a:solidFill>
+            <a:tailEnd type="triangle"/>
+          </a:ln>
+        </p:spPr>
+        <p:style>
+          <a:lnRef idx="3">
+            <a:schemeClr val="dk1"/>
+          </a:lnRef>
+          <a:fillRef idx="0">
+            <a:schemeClr val="dk1"/>
+          </a:fillRef>
+          <a:effectRef idx="2">
+            <a:schemeClr val="dk1"/>
+          </a:effectRef>
+          <a:fontRef idx="minor">
+            <a:schemeClr val="tx1"/>
+          </a:fontRef>
+        </p:style>
+      </p:cxnSp>
+      <p:sp>
+        <p:nvSpPr>
+          <p:cNvPr id="43" name="ZoneTexte 42"/>
+          <p:cNvSpPr txBox="1"/>
+          <p:nvPr/>
+        </p:nvSpPr>
+        <p:spPr>
+          <a:xfrm>
+            <a:off x="6404697" y="2118416"/>
+            <a:ext cx="1502979" cy="276999"/>
+          </a:xfrm>
+          <a:prstGeom prst="rect">
+            <a:avLst/>
+          </a:prstGeom>
+          <a:noFill/>
+        </p:spPr>
+        <p:txBody>
+          <a:bodyPr wrap="square" rtlCol="0">
+            <a:spAutoFit/>
+          </a:bodyPr>
+          <a:lstStyle/>
+          <a:p>
+            <a:pPr algn="ctr"/>
+            <a:r>
+              <a:rPr lang="en-US" sz="1200" dirty="0" smtClean="0">
+                <a:latin typeface="Helvetica Neue" panose="02000503000000020004" pitchFamily="50"/>
+              </a:rPr>
+              <a:t>Interference</a:t>
+            </a:r>
+            <a:endParaRPr lang="en-US" sz="1200" dirty="0">
+              <a:latin typeface="Helvetica Neue" panose="02000503000000020004" pitchFamily="50"/>
+            </a:endParaRPr>
+          </a:p>
+        </p:txBody>
+      </p:sp>
+      <p:grpSp>
+        <p:nvGrpSpPr>
+          <p:cNvPr id="55" name="Groupe 54"/>
+          <p:cNvGrpSpPr/>
+          <p:nvPr/>
+        </p:nvGrpSpPr>
+        <p:grpSpPr>
+          <a:xfrm>
+            <a:off x="8246920" y="2129987"/>
+            <a:ext cx="1311519" cy="1463458"/>
+            <a:chOff x="10828802" y="1497165"/>
+            <a:chExt cx="1311519" cy="1463458"/>
+          </a:xfrm>
+        </p:grpSpPr>
+        <p:pic>
+          <p:nvPicPr>
+            <p:cNvPr id="56" name="Image 55"/>
+            <p:cNvPicPr>
+              <a:picLocks noChangeAspect="1"/>
+            </p:cNvPicPr>
+            <p:nvPr/>
+          </p:nvPicPr>
+          <p:blipFill>
+            <a:blip r:embed="rId2" cstate="print">
+              <a:extLst>
+                <a:ext uri="{BEBA8EAE-BF5A-486C-A8C5-ECC9F3942E4B}">
+                  <a14:imgProps xmlns:a14="http://schemas.microsoft.com/office/drawing/2010/main">
+                    <a14:imgLayer r:embed="rId3">
+                      <a14:imgEffect>
+                        <a14:saturation sat="0"/>
+                      </a14:imgEffect>
+                    </a14:imgLayer>
+                  </a14:imgProps>
+                </a:ext>
+                <a:ext uri="{28A0092B-C50C-407E-A947-70E740481C1C}">
+                  <a14:useLocalDpi xmlns:a14="http://schemas.microsoft.com/office/drawing/2010/main" val="0"/>
+                </a:ext>
+              </a:extLst>
+            </a:blip>
+            <a:stretch>
+              <a:fillRect/>
+            </a:stretch>
+          </p:blipFill>
+          <p:spPr>
+            <a:xfrm>
+              <a:off x="11060321" y="1497165"/>
+              <a:ext cx="1080000" cy="1080000"/>
+            </a:xfrm>
+            <a:prstGeom prst="rect">
+              <a:avLst/>
+            </a:prstGeom>
+          </p:spPr>
+        </p:pic>
+        <p:sp>
+          <p:nvSpPr>
+            <p:cNvPr id="57" name="Rectangle 56"/>
+            <p:cNvSpPr/>
+            <p:nvPr/>
+          </p:nvSpPr>
+          <p:spPr>
+            <a:xfrm>
+              <a:off x="10828802" y="2528623"/>
+              <a:ext cx="1224000" cy="432000"/>
+            </a:xfrm>
+            <a:prstGeom prst="rect">
+              <a:avLst/>
+            </a:prstGeom>
+            <a:solidFill>
+              <a:schemeClr val="bg1"/>
+            </a:solidFill>
+            <a:ln w="19050">
+              <a:noFill/>
+            </a:ln>
+          </p:spPr>
+          <p:style>
+            <a:lnRef idx="2">
+              <a:schemeClr val="accent1">
+                <a:shade val="50000"/>
+              </a:schemeClr>
+            </a:lnRef>
+            <a:fillRef idx="1">
+              <a:schemeClr val="accent1"/>
+            </a:fillRef>
+            <a:effectRef idx="0">
+              <a:schemeClr val="accent1"/>
+            </a:effectRef>
+            <a:fontRef idx="minor">
+              <a:schemeClr val="lt1"/>
+            </a:fontRef>
+          </p:style>
+          <p:txBody>
+            <a:bodyPr rot="0" spcFirstLastPara="0" vertOverflow="overflow" horzOverflow="overflow" vert="horz" wrap="square" lIns="91440" tIns="45720" rIns="91440" bIns="45720" numCol="1" spcCol="0" rtlCol="0" fromWordArt="0" anchor="t" anchorCtr="0" forceAA="0" compatLnSpc="1">
+              <a:prstTxWarp prst="textNoShape">
+                <a:avLst/>
+              </a:prstTxWarp>
+              <a:noAutofit/>
+            </a:bodyPr>
+            <a:lstStyle/>
+            <a:p>
+              <a:pPr algn="ctr"/>
+              <a:r>
+                <a:rPr lang="en-US" sz="1200" b="1" dirty="0" smtClean="0">
+                  <a:solidFill>
+                    <a:schemeClr val="tx1"/>
+                  </a:solidFill>
+                  <a:latin typeface="Helvetica Neue" panose="02000503000000020004" pitchFamily="50"/>
+                </a:rPr>
+                <a:t>DREAM RECALL</a:t>
+              </a:r>
+              <a:endParaRPr lang="en-US" sz="1200" b="1" dirty="0">
+                <a:solidFill>
+                  <a:schemeClr val="tx1"/>
+                </a:solidFill>
+                <a:latin typeface="Helvetica Neue" panose="02000503000000020004" pitchFamily="50"/>
+              </a:endParaRPr>
+            </a:p>
+          </p:txBody>
+        </p:sp>
+      </p:grpSp>
+      <p:cxnSp>
+        <p:nvCxnSpPr>
+          <p:cNvPr id="59" name="Connecteur droit avec flèche 58"/>
+          <p:cNvCxnSpPr/>
+          <p:nvPr/>
+        </p:nvCxnSpPr>
+        <p:spPr>
+          <a:xfrm>
+            <a:off x="7158047" y="1859827"/>
+            <a:ext cx="0" cy="216000"/>
+          </a:xfrm>
+          <a:prstGeom prst="straightConnector1">
+            <a:avLst/>
+          </a:prstGeom>
+          <a:ln w="12700">
+            <a:solidFill>
+              <a:schemeClr val="tx1">
+                <a:lumMod val="85000"/>
+                <a:lumOff val="15000"/>
+              </a:schemeClr>
+            </a:solidFill>
+            <a:tailEnd type="triangle"/>
+          </a:ln>
+        </p:spPr>
+        <p:style>
+          <a:lnRef idx="3">
+            <a:schemeClr val="dk1"/>
+          </a:lnRef>
+          <a:fillRef idx="0">
+            <a:schemeClr val="dk1"/>
+          </a:fillRef>
+          <a:effectRef idx="2">
+            <a:schemeClr val="dk1"/>
+          </a:effectRef>
+          <a:fontRef idx="minor">
+            <a:schemeClr val="tx1"/>
+          </a:fontRef>
+        </p:style>
+      </p:cxnSp>
+      <p:sp>
+        <p:nvSpPr>
+          <p:cNvPr id="60" name="ZoneTexte 59"/>
+          <p:cNvSpPr txBox="1"/>
+          <p:nvPr/>
+        </p:nvSpPr>
+        <p:spPr>
+          <a:xfrm>
+            <a:off x="6404697" y="1553739"/>
             <a:ext cx="1502979" cy="276999"/>
           </a:xfrm>
           <a:prstGeom prst="rect">
@@ -3815,25 +5579,7 @@
                     </a:solidFill>
                     <a:latin typeface="Helvetica Neue" panose="02000503000000020004" pitchFamily="50"/>
                   </a:rPr>
-                  <a:t>PERSONALITY, </a:t>
-                </a:r>
-                <a:r>
-                  <a:rPr lang="en-US" sz="1150" dirty="0" smtClean="0">
-                    <a:solidFill>
-                      <a:schemeClr val="tx1"/>
-                    </a:solidFill>
-                    <a:latin typeface="Helvetica Neue" panose="02000503000000020004" pitchFamily="50"/>
-                  </a:rPr>
-                  <a:t>LIFE-STYLE, </a:t>
-                </a:r>
-                <a:r>
-                  <a:rPr lang="en-US" sz="1150" b="1" dirty="0" smtClean="0">
-                    <a:solidFill>
-                      <a:schemeClr val="tx1"/>
-                    </a:solidFill>
-                    <a:latin typeface="Helvetica Neue" panose="02000503000000020004" pitchFamily="50"/>
-                  </a:rPr>
-                  <a:t>CREATIVITY</a:t>
+                  <a:t>PERSONALITY, LIFE-STYLE, CREATIVITY</a:t>
                 </a:r>
                 <a:endParaRPr lang="en-US" sz="1150" b="1" baseline="30000" dirty="0">
                   <a:solidFill>
@@ -4205,7 +5951,7 @@
         </p:nvSpPr>
         <p:spPr>
           <a:xfrm>
-            <a:off x="1249503" y="2721638"/>
+            <a:off x="1321421" y="2721638"/>
             <a:ext cx="866945" cy="879614"/>
           </a:xfrm>
           <a:prstGeom prst="rect">
@@ -4517,7 +6263,7 @@
     </p:spTree>
     <p:extLst>
       <p:ext uri="{BB962C8B-B14F-4D97-AF65-F5344CB8AC3E}">
-        <p14:creationId xmlns:p14="http://schemas.microsoft.com/office/powerpoint/2010/main" val="232368218"/>
+        <p14:creationId xmlns:p14="http://schemas.microsoft.com/office/powerpoint/2010/main" val="1360584295"/>
       </p:ext>
     </p:extLst>
   </p:cSld>
@@ -4527,7 +6273,7 @@
 </p:sld>
 </file>
 
-<file path=ppt/slides/slide2.xml><?xml version="1.0" encoding="utf-8"?>
+<file path=ppt/slides/slide3.xml><?xml version="1.0" encoding="utf-8"?>
 <p:sld xmlns:a="http://schemas.openxmlformats.org/drawingml/2006/main" xmlns:r="http://schemas.openxmlformats.org/officeDocument/2006/relationships" xmlns:p="http://schemas.openxmlformats.org/presentationml/2006/main">
   <p:cSld>
     <p:spTree>
@@ -5795,7 +7541,7 @@
 </p:sld>
 </file>
 
-<file path=ppt/slides/slide3.xml><?xml version="1.0" encoding="utf-8"?>
+<file path=ppt/slides/slide4.xml><?xml version="1.0" encoding="utf-8"?>
 <p:sld xmlns:a="http://schemas.openxmlformats.org/drawingml/2006/main" xmlns:r="http://schemas.openxmlformats.org/officeDocument/2006/relationships" xmlns:p="http://schemas.openxmlformats.org/presentationml/2006/main">
   <p:cSld>
     <p:spTree>
@@ -6982,7 +8728,7 @@
 </p:sld>
 </file>
 
-<file path=ppt/slides/slide4.xml><?xml version="1.0" encoding="utf-8"?>
+<file path=ppt/slides/slide5.xml><?xml version="1.0" encoding="utf-8"?>
 <p:sld xmlns:a="http://schemas.openxmlformats.org/drawingml/2006/main" xmlns:r="http://schemas.openxmlformats.org/officeDocument/2006/relationships" xmlns:p="http://schemas.openxmlformats.org/presentationml/2006/main">
   <p:cSld>
     <p:spTree>
@@ -8902,7 +10648,7 @@
 </p:sld>
 </file>
 
-<file path=ppt/slides/slide5.xml><?xml version="1.0" encoding="utf-8"?>
+<file path=ppt/slides/slide6.xml><?xml version="1.0" encoding="utf-8"?>
 <p:sld xmlns:a="http://schemas.openxmlformats.org/drawingml/2006/main" xmlns:r="http://schemas.openxmlformats.org/officeDocument/2006/relationships" xmlns:p="http://schemas.openxmlformats.org/presentationml/2006/main">
   <p:cSld>
     <p:spTree>

</xml_diff>